<commit_message>
Add Confusion matrix for depth 2 decision tree, cross validation data set
</commit_message>
<xml_diff>
--- a/Notes/Decision_Trees.pptx
+++ b/Notes/Decision_Trees.pptx
@@ -243,7 +243,7 @@
           <a:p>
             <a:fld id="{0BFC49C2-91E2-4019-9562-07422A279DAF}" type="datetimeFigureOut">
               <a:rPr lang="en-US" smtClean="0"/>
-              <a:t>9/4/2023</a:t>
+              <a:t>9/5/2023</a:t>
             </a:fld>
             <a:endParaRPr lang="en-US"/>
           </a:p>
@@ -420,7 +420,7 @@
           <a:p>
             <a:fld id="{1FEA3286-221C-418A-ABA5-8CBD2C4A5B25}" type="datetimeFigureOut">
               <a:rPr lang="en-US" smtClean="0"/>
-              <a:t>9/4/2023</a:t>
+              <a:t>9/5/2023</a:t>
             </a:fld>
             <a:endParaRPr lang="en-US"/>
           </a:p>
@@ -834,7 +834,7 @@
           <a:p>
             <a:fld id="{C536D5AE-0547-4B22-9FF1-61DC50066B07}" type="datetime1">
               <a:rPr lang="en-US" smtClean="0"/>
-              <a:t>9/4/2023</a:t>
+              <a:t>9/5/2023</a:t>
             </a:fld>
             <a:endParaRPr lang="en-US"/>
           </a:p>
@@ -1035,7 +1035,7 @@
           <a:p>
             <a:fld id="{340B8BF2-BD8A-41AE-9C1D-EB089E94831C}" type="datetime1">
               <a:rPr lang="en-US" smtClean="0"/>
-              <a:t>9/4/2023</a:t>
+              <a:t>9/5/2023</a:t>
             </a:fld>
             <a:endParaRPr lang="en-US"/>
           </a:p>
@@ -1246,7 +1246,7 @@
           <a:p>
             <a:fld id="{3EFD6C31-EB7B-4A64-ABE1-F0AB246A850A}" type="datetime1">
               <a:rPr lang="en-US" smtClean="0"/>
-              <a:t>9/4/2023</a:t>
+              <a:t>9/5/2023</a:t>
             </a:fld>
             <a:endParaRPr lang="en-US"/>
           </a:p>
@@ -1447,7 +1447,7 @@
           <a:p>
             <a:fld id="{668B0DC0-B3F2-439A-9114-5F53D4377D45}" type="datetime1">
               <a:rPr lang="en-US" smtClean="0"/>
-              <a:t>9/4/2023</a:t>
+              <a:t>9/5/2023</a:t>
             </a:fld>
             <a:endParaRPr lang="en-US"/>
           </a:p>
@@ -1725,7 +1725,7 @@
           <a:p>
             <a:fld id="{320A5CD0-6878-49B6-96F5-F20F192C0B0C}" type="datetime1">
               <a:rPr lang="en-US" smtClean="0"/>
-              <a:t>9/4/2023</a:t>
+              <a:t>9/5/2023</a:t>
             </a:fld>
             <a:endParaRPr lang="en-US"/>
           </a:p>
@@ -1993,7 +1993,7 @@
           <a:p>
             <a:fld id="{0FA53E43-3A16-4047-B486-C7A15A332A3C}" type="datetime1">
               <a:rPr lang="en-US" smtClean="0"/>
-              <a:t>9/4/2023</a:t>
+              <a:t>9/5/2023</a:t>
             </a:fld>
             <a:endParaRPr lang="en-US"/>
           </a:p>
@@ -2408,7 +2408,7 @@
           <a:p>
             <a:fld id="{47026F2D-B854-4AB5-B7E3-3EA6EE97A89A}" type="datetime1">
               <a:rPr lang="en-US" smtClean="0"/>
-              <a:t>9/4/2023</a:t>
+              <a:t>9/5/2023</a:t>
             </a:fld>
             <a:endParaRPr lang="en-US"/>
           </a:p>
@@ -2552,7 +2552,7 @@
           <a:p>
             <a:fld id="{E9234E8A-3332-401A-B443-35F0A68A1277}" type="datetime1">
               <a:rPr lang="en-US" smtClean="0"/>
-              <a:t>9/4/2023</a:t>
+              <a:t>9/5/2023</a:t>
             </a:fld>
             <a:endParaRPr lang="en-US"/>
           </a:p>
@@ -2668,7 +2668,7 @@
           <a:p>
             <a:fld id="{ACF48743-21A8-4AA2-9F78-5E14E55EAB74}" type="datetime1">
               <a:rPr lang="en-US" smtClean="0"/>
-              <a:t>9/4/2023</a:t>
+              <a:t>9/5/2023</a:t>
             </a:fld>
             <a:endParaRPr lang="en-US"/>
           </a:p>
@@ -2982,7 +2982,7 @@
           <a:p>
             <a:fld id="{45C93320-C53B-4F9C-A839-A4EECC5AEF8C}" type="datetime1">
               <a:rPr lang="en-US" smtClean="0"/>
-              <a:t>9/4/2023</a:t>
+              <a:t>9/5/2023</a:t>
             </a:fld>
             <a:endParaRPr lang="en-US"/>
           </a:p>
@@ -3273,7 +3273,7 @@
           <a:p>
             <a:fld id="{F967DE46-3299-4D41-94F8-85A67C9B0629}" type="datetime1">
               <a:rPr lang="en-US" smtClean="0"/>
-              <a:t>9/4/2023</a:t>
+              <a:t>9/5/2023</a:t>
             </a:fld>
             <a:endParaRPr lang="en-US"/>
           </a:p>
@@ -3517,7 +3517,7 @@
           <a:p>
             <a:fld id="{91D75FF1-919D-4037-93C8-1AE086EC194D}" type="datetime1">
               <a:rPr lang="en-US" smtClean="0"/>
-              <a:t>9/4/2023</a:t>
+              <a:t>9/5/2023</a:t>
             </a:fld>
             <a:endParaRPr lang="en-US"/>
           </a:p>
@@ -23949,7 +23949,7 @@
         </p:blipFill>
         <p:spPr>
           <a:xfrm>
-            <a:off x="9311143" y="3016251"/>
+            <a:off x="9245619" y="3009251"/>
             <a:ext cx="2732764" cy="2328508"/>
           </a:xfrm>
           <a:prstGeom prst="rect">
@@ -23985,46 +23985,6 @@
           </a:p>
         </p:txBody>
       </p:sp>
-      <p:pic>
-        <p:nvPicPr>
-          <p:cNvPr id="6" name="Picture 5">
-            <a:extLst>
-              <a:ext uri="{FF2B5EF4-FFF2-40B4-BE49-F238E27FC236}">
-                <a16:creationId xmlns:a16="http://schemas.microsoft.com/office/drawing/2014/main" id="{0DCD09F7-0338-013D-D242-F52AF8C2430C}"/>
-              </a:ext>
-            </a:extLst>
-          </p:cNvPr>
-          <p:cNvPicPr>
-            <a:picLocks noChangeAspect="1"/>
-          </p:cNvPicPr>
-          <p:nvPr/>
-        </p:nvPicPr>
-        <p:blipFill rotWithShape="1">
-          <a:blip r:embed="rId3">
-            <a:clrChange>
-              <a:clrFrom>
-                <a:srgbClr val="FFFFFF"/>
-              </a:clrFrom>
-              <a:clrTo>
-                <a:srgbClr val="FFFFFF">
-                  <a:alpha val="0"/>
-                </a:srgbClr>
-              </a:clrTo>
-            </a:clrChange>
-          </a:blip>
-          <a:srcRect l="3675" t="10299" r="3564" b="10414"/>
-          <a:stretch/>
-        </p:blipFill>
-        <p:spPr>
-          <a:xfrm>
-            <a:off x="1640917" y="1793213"/>
-            <a:ext cx="7934325" cy="4774584"/>
-          </a:xfrm>
-          <a:prstGeom prst="rect">
-            <a:avLst/>
-          </a:prstGeom>
-        </p:spPr>
-      </p:pic>
       <p:sp>
         <p:nvSpPr>
           <p:cNvPr id="11" name="TextBox 10">
@@ -24039,7 +23999,7 @@
         </p:nvSpPr>
         <p:spPr>
           <a:xfrm>
-            <a:off x="8100557" y="1560821"/>
+            <a:off x="9245619" y="1667426"/>
             <a:ext cx="3943350" cy="1200329"/>
           </a:xfrm>
           <a:prstGeom prst="rect">
@@ -24113,783 +24073,1060 @@
           <a:lstStyle/>
           <a:p>
             <a:r>
-              <a:rPr lang="en-US"/>
+              <a:rPr lang="en-US" dirty="0"/>
               <a:t>M. Meenakshi Sundaram, S. Ganesh</a:t>
             </a:r>
           </a:p>
         </p:txBody>
       </p:sp>
-      <mc:AlternateContent xmlns:mc="http://schemas.openxmlformats.org/markup-compatibility/2006">
-        <mc:Choice xmlns:a14="http://schemas.microsoft.com/office/drawing/2010/main" Requires="a14">
-          <p:sp>
-            <p:nvSpPr>
-              <p:cNvPr id="4" name="TextBox 3">
-                <a:extLst>
-                  <a:ext uri="{FF2B5EF4-FFF2-40B4-BE49-F238E27FC236}">
-                    <a16:creationId xmlns:a16="http://schemas.microsoft.com/office/drawing/2014/main" id="{53634838-459F-7A46-D2E4-3C0DF67EA9FB}"/>
-                  </a:ext>
-                </a:extLst>
-              </p:cNvPr>
-              <p:cNvSpPr txBox="1"/>
-              <p:nvPr/>
-            </p:nvSpPr>
-            <p:spPr>
-              <a:xfrm>
-                <a:off x="1640917" y="1366391"/>
-                <a:ext cx="1906548" cy="646331"/>
-              </a:xfrm>
-              <a:prstGeom prst="rect">
-                <a:avLst/>
-              </a:prstGeom>
-              <a:ln w="19050"/>
-            </p:spPr>
-            <p:style>
-              <a:lnRef idx="2">
-                <a:schemeClr val="accent1"/>
-              </a:lnRef>
-              <a:fillRef idx="1">
-                <a:schemeClr val="lt1"/>
-              </a:fillRef>
-              <a:effectRef idx="0">
-                <a:schemeClr val="accent1"/>
-              </a:effectRef>
-              <a:fontRef idx="minor">
-                <a:schemeClr val="dk1"/>
-              </a:fontRef>
-            </p:style>
-            <p:txBody>
-              <a:bodyPr wrap="none" rtlCol="0">
-                <a:spAutoFit/>
-              </a:bodyPr>
-              <a:lstStyle/>
-              <a:p>
-                <a:pPr/>
-                <a14:m>
-                  <m:oMathPara xmlns:m="http://schemas.openxmlformats.org/officeDocument/2006/math">
-                    <m:oMathParaPr>
-                      <m:jc m:val="centerGroup"/>
-                    </m:oMathParaPr>
-                    <m:oMath xmlns:m="http://schemas.openxmlformats.org/officeDocument/2006/math">
-                      <m:r>
-                        <a:rPr lang="en-US" b="0" i="1" dirty="0" smtClean="0">
-                          <a:latin typeface="Cambria Math" panose="02040503050406030204" pitchFamily="18" charset="0"/>
-                        </a:rPr>
-                        <m:t>𝐺𝑙𝑢𝑐𝑜𝑠𝑒</m:t>
-                      </m:r>
-                      <m:r>
-                        <a:rPr lang="en-US" i="1" dirty="0" smtClean="0">
-                          <a:latin typeface="Cambria Math" panose="02040503050406030204" pitchFamily="18" charset="0"/>
-                        </a:rPr>
-                        <m:t>≤</m:t>
-                      </m:r>
-                      <m:r>
-                        <a:rPr lang="en-US" b="0" i="1" dirty="0" smtClean="0">
-                          <a:latin typeface="Cambria Math" panose="02040503050406030204" pitchFamily="18" charset="0"/>
-                        </a:rPr>
-                        <m:t>1</m:t>
-                      </m:r>
-                      <m:r>
-                        <a:rPr lang="en-US" i="1" dirty="0" smtClean="0">
-                          <a:latin typeface="Cambria Math" panose="02040503050406030204" pitchFamily="18" charset="0"/>
-                        </a:rPr>
-                        <m:t>2</m:t>
-                      </m:r>
-                      <m:r>
-                        <a:rPr lang="en-US" b="0" i="1" dirty="0" smtClean="0">
-                          <a:latin typeface="Cambria Math" panose="02040503050406030204" pitchFamily="18" charset="0"/>
-                        </a:rPr>
-                        <m:t>3</m:t>
-                      </m:r>
-                      <m:r>
-                        <a:rPr lang="en-US" i="1" dirty="0" smtClean="0">
-                          <a:latin typeface="Cambria Math" panose="02040503050406030204" pitchFamily="18" charset="0"/>
-                        </a:rPr>
-                        <m:t>.5</m:t>
-                      </m:r>
-                    </m:oMath>
-                  </m:oMathPara>
-                </a14:m>
-                <a:endParaRPr lang="en-US" dirty="0"/>
-              </a:p>
-              <a:p>
-                <a:pPr/>
-                <a14:m>
-                  <m:oMathPara xmlns:m="http://schemas.openxmlformats.org/officeDocument/2006/math">
-                    <m:oMathParaPr>
-                      <m:jc m:val="centerGroup"/>
-                    </m:oMathParaPr>
-                    <m:oMath xmlns:m="http://schemas.openxmlformats.org/officeDocument/2006/math">
-                      <m:r>
-                        <a:rPr lang="en-US" i="1" dirty="0" smtClean="0">
-                          <a:latin typeface="Cambria Math" panose="02040503050406030204" pitchFamily="18" charset="0"/>
-                        </a:rPr>
-                        <m:t>𝐸𝑛𝑡𝑟𝑜𝑝𝑦</m:t>
-                      </m:r>
-                      <m:r>
-                        <a:rPr lang="en-US" i="1" dirty="0" smtClean="0">
-                          <a:latin typeface="Cambria Math" panose="02040503050406030204" pitchFamily="18" charset="0"/>
-                        </a:rPr>
-                        <m:t> =1.0</m:t>
-                      </m:r>
-                    </m:oMath>
-                  </m:oMathPara>
-                </a14:m>
-                <a:endParaRPr lang="en-US" dirty="0"/>
-              </a:p>
-            </p:txBody>
-          </p:sp>
-        </mc:Choice>
-        <mc:Fallback>
-          <p:sp>
-            <p:nvSpPr>
-              <p:cNvPr id="4" name="TextBox 3">
-                <a:extLst>
-                  <a:ext uri="{FF2B5EF4-FFF2-40B4-BE49-F238E27FC236}">
-                    <a16:creationId xmlns:a16="http://schemas.microsoft.com/office/drawing/2014/main" id="{53634838-459F-7A46-D2E4-3C0DF67EA9FB}"/>
-                  </a:ext>
-                </a:extLst>
-              </p:cNvPr>
-              <p:cNvSpPr txBox="1">
-                <a:spLocks noRot="1" noChangeAspect="1" noMove="1" noResize="1" noEditPoints="1" noAdjustHandles="1" noChangeArrowheads="1" noChangeShapeType="1" noTextEdit="1"/>
-              </p:cNvSpPr>
-              <p:nvPr/>
-            </p:nvSpPr>
-            <p:spPr>
-              <a:xfrm>
-                <a:off x="1640917" y="1366391"/>
-                <a:ext cx="1906548" cy="646331"/>
-              </a:xfrm>
-              <a:prstGeom prst="rect">
-                <a:avLst/>
-              </a:prstGeom>
-              <a:blipFill>
-                <a:blip r:embed="rId4"/>
-                <a:stretch>
-                  <a:fillRect b="-4587"/>
-                </a:stretch>
-              </a:blipFill>
-              <a:ln w="19050"/>
-            </p:spPr>
-            <p:txBody>
-              <a:bodyPr/>
-              <a:lstStyle/>
-              <a:p>
-                <a:r>
-                  <a:rPr lang="en-US">
-                    <a:noFill/>
-                  </a:rPr>
-                  <a:t> </a:t>
-                </a:r>
-              </a:p>
-            </p:txBody>
-          </p:sp>
-        </mc:Fallback>
-      </mc:AlternateContent>
-      <mc:AlternateContent xmlns:mc="http://schemas.openxmlformats.org/markup-compatibility/2006">
-        <mc:Choice xmlns:a14="http://schemas.microsoft.com/office/drawing/2010/main" Requires="a14">
-          <p:sp>
-            <p:nvSpPr>
-              <p:cNvPr id="5" name="TextBox 4">
-                <a:extLst>
-                  <a:ext uri="{FF2B5EF4-FFF2-40B4-BE49-F238E27FC236}">
-                    <a16:creationId xmlns:a16="http://schemas.microsoft.com/office/drawing/2014/main" id="{A8770969-E353-3CA4-2EA3-1A3A20A82E76}"/>
-                  </a:ext>
-                </a:extLst>
-              </p:cNvPr>
-              <p:cNvSpPr txBox="1"/>
-              <p:nvPr/>
-            </p:nvSpPr>
-            <p:spPr>
-              <a:xfrm>
-                <a:off x="148093" y="3335714"/>
-                <a:ext cx="1859420" cy="646331"/>
-              </a:xfrm>
-              <a:prstGeom prst="rect">
-                <a:avLst/>
-              </a:prstGeom>
-              <a:ln w="19050"/>
-            </p:spPr>
-            <p:style>
-              <a:lnRef idx="2">
-                <a:schemeClr val="accent1"/>
-              </a:lnRef>
-              <a:fillRef idx="1">
-                <a:schemeClr val="lt1"/>
-              </a:fillRef>
-              <a:effectRef idx="0">
-                <a:schemeClr val="accent1"/>
-              </a:effectRef>
-              <a:fontRef idx="minor">
-                <a:schemeClr val="dk1"/>
-              </a:fontRef>
-            </p:style>
-            <p:txBody>
-              <a:bodyPr wrap="none" rtlCol="0">
-                <a:spAutoFit/>
-              </a:bodyPr>
-              <a:lstStyle/>
-              <a:p>
-                <a:pPr/>
-                <a14:m>
-                  <m:oMathPara xmlns:m="http://schemas.openxmlformats.org/officeDocument/2006/math">
-                    <m:oMathParaPr>
-                      <m:jc m:val="centerGroup"/>
-                    </m:oMathParaPr>
-                    <m:oMath xmlns:m="http://schemas.openxmlformats.org/officeDocument/2006/math">
-                      <m:r>
-                        <a:rPr lang="en-US" b="0" i="1" dirty="0" smtClean="0">
-                          <a:latin typeface="Cambria Math" panose="02040503050406030204" pitchFamily="18" charset="0"/>
-                        </a:rPr>
-                        <m:t>𝐵𝑀𝐼</m:t>
-                      </m:r>
-                      <m:r>
-                        <a:rPr lang="en-US" b="0" i="1" dirty="0" smtClean="0">
-                          <a:latin typeface="Cambria Math" panose="02040503050406030204" pitchFamily="18" charset="0"/>
-                        </a:rPr>
-                        <m:t>≤26.45</m:t>
-                      </m:r>
-                    </m:oMath>
-                  </m:oMathPara>
-                </a14:m>
-                <a:endParaRPr lang="en-US" b="0" i="1" dirty="0">
-                  <a:latin typeface="Cambria Math" panose="02040503050406030204" pitchFamily="18" charset="0"/>
-                </a:endParaRPr>
-              </a:p>
-              <a:p>
-                <a:pPr/>
-                <a:r>
-                  <a:rPr lang="en-US" i="1" dirty="0">
-                    <a:latin typeface="Cambria Math" panose="02040503050406030204" pitchFamily="18" charset="0"/>
-                  </a:rPr>
-                  <a:t>Entropy = 0.872</a:t>
-                </a:r>
-              </a:p>
-            </p:txBody>
-          </p:sp>
-        </mc:Choice>
-        <mc:Fallback>
-          <p:sp>
-            <p:nvSpPr>
-              <p:cNvPr id="5" name="TextBox 4">
-                <a:extLst>
-                  <a:ext uri="{FF2B5EF4-FFF2-40B4-BE49-F238E27FC236}">
-                    <a16:creationId xmlns:a16="http://schemas.microsoft.com/office/drawing/2014/main" id="{A8770969-E353-3CA4-2EA3-1A3A20A82E76}"/>
-                  </a:ext>
-                </a:extLst>
-              </p:cNvPr>
-              <p:cNvSpPr txBox="1">
-                <a:spLocks noRot="1" noChangeAspect="1" noMove="1" noResize="1" noEditPoints="1" noAdjustHandles="1" noChangeArrowheads="1" noChangeShapeType="1" noTextEdit="1"/>
-              </p:cNvSpPr>
-              <p:nvPr/>
-            </p:nvSpPr>
-            <p:spPr>
-              <a:xfrm>
-                <a:off x="148093" y="3335714"/>
-                <a:ext cx="1859420" cy="646331"/>
-              </a:xfrm>
-              <a:prstGeom prst="rect">
-                <a:avLst/>
-              </a:prstGeom>
-              <a:blipFill>
-                <a:blip r:embed="rId5"/>
-                <a:stretch>
-                  <a:fillRect l="-2273" b="-11009"/>
-                </a:stretch>
-              </a:blipFill>
-              <a:ln w="19050"/>
-            </p:spPr>
-            <p:txBody>
-              <a:bodyPr/>
-              <a:lstStyle/>
-              <a:p>
-                <a:r>
-                  <a:rPr lang="en-US">
-                    <a:noFill/>
-                  </a:rPr>
-                  <a:t> </a:t>
-                </a:r>
-              </a:p>
-            </p:txBody>
-          </p:sp>
-        </mc:Fallback>
-      </mc:AlternateContent>
-      <mc:AlternateContent xmlns:mc="http://schemas.openxmlformats.org/markup-compatibility/2006">
-        <mc:Choice xmlns:a14="http://schemas.microsoft.com/office/drawing/2010/main" Requires="a14">
-          <p:sp>
-            <p:nvSpPr>
-              <p:cNvPr id="7" name="TextBox 6">
-                <a:extLst>
-                  <a:ext uri="{FF2B5EF4-FFF2-40B4-BE49-F238E27FC236}">
-                    <a16:creationId xmlns:a16="http://schemas.microsoft.com/office/drawing/2014/main" id="{E50B4321-7BC9-0C9A-5769-7E95B40B37EC}"/>
-                  </a:ext>
-                </a:extLst>
-              </p:cNvPr>
-              <p:cNvSpPr txBox="1"/>
-              <p:nvPr/>
-            </p:nvSpPr>
-            <p:spPr>
-              <a:xfrm>
-                <a:off x="3298723" y="3335714"/>
-                <a:ext cx="1963166" cy="646331"/>
-              </a:xfrm>
-              <a:prstGeom prst="rect">
-                <a:avLst/>
-              </a:prstGeom>
-              <a:ln w="19050"/>
-            </p:spPr>
-            <p:style>
-              <a:lnRef idx="2">
-                <a:schemeClr val="accent1"/>
-              </a:lnRef>
-              <a:fillRef idx="1">
-                <a:schemeClr val="lt1"/>
-              </a:fillRef>
-              <a:effectRef idx="0">
-                <a:schemeClr val="accent1"/>
-              </a:effectRef>
-              <a:fontRef idx="minor">
-                <a:schemeClr val="dk1"/>
-              </a:fontRef>
-            </p:style>
-            <p:txBody>
-              <a:bodyPr wrap="none" rtlCol="0">
-                <a:spAutoFit/>
-              </a:bodyPr>
-              <a:lstStyle/>
-              <a:p>
-                <a:pPr/>
-                <a14:m>
-                  <m:oMathPara xmlns:m="http://schemas.openxmlformats.org/officeDocument/2006/math">
-                    <m:oMathParaPr>
-                      <m:jc m:val="centerGroup"/>
-                    </m:oMathParaPr>
-                    <m:oMath xmlns:m="http://schemas.openxmlformats.org/officeDocument/2006/math">
-                      <m:r>
-                        <a:rPr lang="en-US" b="0" i="1" dirty="0" smtClean="0">
-                          <a:latin typeface="Cambria Math" panose="02040503050406030204" pitchFamily="18" charset="0"/>
-                        </a:rPr>
-                        <m:t>𝐺𝑙𝑢𝑐𝑜𝑠𝑒</m:t>
-                      </m:r>
-                      <m:r>
-                        <a:rPr lang="en-US" b="0" i="1" dirty="0" smtClean="0">
-                          <a:latin typeface="Cambria Math" panose="02040503050406030204" pitchFamily="18" charset="0"/>
-                        </a:rPr>
-                        <m:t>≤154.5</m:t>
-                      </m:r>
-                    </m:oMath>
-                  </m:oMathPara>
-                </a14:m>
-                <a:endParaRPr lang="en-US" dirty="0"/>
-              </a:p>
-              <a:p>
-                <a:pPr/>
-                <a14:m>
-                  <m:oMathPara xmlns:m="http://schemas.openxmlformats.org/officeDocument/2006/math">
-                    <m:oMathParaPr>
-                      <m:jc m:val="centerGroup"/>
-                    </m:oMathParaPr>
-                    <m:oMath xmlns:m="http://schemas.openxmlformats.org/officeDocument/2006/math">
-                      <m:r>
-                        <a:rPr lang="en-US" b="0" i="1" dirty="0" smtClean="0">
-                          <a:latin typeface="Cambria Math" panose="02040503050406030204" pitchFamily="18" charset="0"/>
-                        </a:rPr>
-                        <m:t>𝐸𝑛𝑡𝑟𝑜𝑝𝑦</m:t>
-                      </m:r>
-                      <m:r>
-                        <a:rPr lang="en-US" b="0" i="1" dirty="0" smtClean="0">
-                          <a:latin typeface="Cambria Math" panose="02040503050406030204" pitchFamily="18" charset="0"/>
-                        </a:rPr>
-                        <m:t>=0.865</m:t>
-                      </m:r>
-                    </m:oMath>
-                  </m:oMathPara>
-                </a14:m>
-                <a:endParaRPr lang="en-US" dirty="0"/>
-              </a:p>
-            </p:txBody>
-          </p:sp>
-        </mc:Choice>
-        <mc:Fallback>
-          <p:sp>
-            <p:nvSpPr>
-              <p:cNvPr id="7" name="TextBox 6">
-                <a:extLst>
-                  <a:ext uri="{FF2B5EF4-FFF2-40B4-BE49-F238E27FC236}">
-                    <a16:creationId xmlns:a16="http://schemas.microsoft.com/office/drawing/2014/main" id="{E50B4321-7BC9-0C9A-5769-7E95B40B37EC}"/>
-                  </a:ext>
-                </a:extLst>
-              </p:cNvPr>
-              <p:cNvSpPr txBox="1">
-                <a:spLocks noRot="1" noChangeAspect="1" noMove="1" noResize="1" noEditPoints="1" noAdjustHandles="1" noChangeArrowheads="1" noChangeShapeType="1" noTextEdit="1"/>
-              </p:cNvSpPr>
-              <p:nvPr/>
-            </p:nvSpPr>
-            <p:spPr>
-              <a:xfrm>
-                <a:off x="3298723" y="3335714"/>
-                <a:ext cx="1963166" cy="646331"/>
-              </a:xfrm>
-              <a:prstGeom prst="rect">
-                <a:avLst/>
-              </a:prstGeom>
-              <a:blipFill>
-                <a:blip r:embed="rId6"/>
-                <a:stretch>
-                  <a:fillRect b="-4587"/>
-                </a:stretch>
-              </a:blipFill>
-              <a:ln w="19050"/>
-            </p:spPr>
-            <p:txBody>
-              <a:bodyPr/>
-              <a:lstStyle/>
-              <a:p>
-                <a:r>
-                  <a:rPr lang="en-US">
-                    <a:noFill/>
-                  </a:rPr>
-                  <a:t> </a:t>
-                </a:r>
-              </a:p>
-            </p:txBody>
-          </p:sp>
-        </mc:Fallback>
-      </mc:AlternateContent>
-      <p:cxnSp>
-        <p:nvCxnSpPr>
-          <p:cNvPr id="8" name="Straight Arrow Connector 7">
+      <p:grpSp>
+        <p:nvGrpSpPr>
+          <p:cNvPr id="16" name="Group 15">
             <a:extLst>
               <a:ext uri="{FF2B5EF4-FFF2-40B4-BE49-F238E27FC236}">
-                <a16:creationId xmlns:a16="http://schemas.microsoft.com/office/drawing/2014/main" id="{E9DC2C04-5AFD-3D1C-73E6-218A7859CB55}"/>
+                <a16:creationId xmlns:a16="http://schemas.microsoft.com/office/drawing/2014/main" id="{623951DE-4257-F702-96FC-1E676E64FE83}"/>
               </a:ext>
             </a:extLst>
           </p:cNvPr>
-          <p:cNvCxnSpPr>
-            <a:stCxn id="4" idx="2"/>
-            <a:endCxn id="5" idx="0"/>
-          </p:cNvCxnSpPr>
+          <p:cNvGrpSpPr/>
           <p:nvPr/>
-        </p:nvCxnSpPr>
-        <p:spPr>
-          <a:xfrm flipH="1">
-            <a:off x="1077803" y="2012722"/>
-            <a:ext cx="1516388" cy="1322992"/>
+        </p:nvGrpSpPr>
+        <p:grpSpPr>
+          <a:xfrm>
+            <a:off x="838200" y="1705072"/>
+            <a:ext cx="8997598" cy="4300120"/>
+            <a:chOff x="-1756209" y="1366391"/>
+            <a:chExt cx="8997598" cy="4300120"/>
           </a:xfrm>
-          <a:prstGeom prst="straightConnector1">
-            <a:avLst/>
-          </a:prstGeom>
-          <a:ln w="19050">
-            <a:tailEnd type="triangle"/>
-          </a:ln>
-        </p:spPr>
-        <p:style>
-          <a:lnRef idx="1">
-            <a:schemeClr val="accent1"/>
-          </a:lnRef>
-          <a:fillRef idx="0">
-            <a:schemeClr val="accent1"/>
-          </a:fillRef>
-          <a:effectRef idx="0">
-            <a:schemeClr val="accent1"/>
-          </a:effectRef>
-          <a:fontRef idx="minor">
-            <a:schemeClr val="tx1"/>
-          </a:fontRef>
-        </p:style>
-      </p:cxnSp>
-      <p:cxnSp>
-        <p:nvCxnSpPr>
-          <p:cNvPr id="10" name="Straight Arrow Connector 9">
-            <a:extLst>
-              <a:ext uri="{FF2B5EF4-FFF2-40B4-BE49-F238E27FC236}">
-                <a16:creationId xmlns:a16="http://schemas.microsoft.com/office/drawing/2014/main" id="{A5DDBE92-E5D1-EC99-138E-CAB70E50438E}"/>
-              </a:ext>
-            </a:extLst>
-          </p:cNvPr>
-          <p:cNvCxnSpPr>
-            <a:stCxn id="4" idx="2"/>
-            <a:endCxn id="7" idx="0"/>
-          </p:cNvCxnSpPr>
-          <p:nvPr/>
-        </p:nvCxnSpPr>
-        <p:spPr>
-          <a:xfrm>
-            <a:off x="2594191" y="2012722"/>
-            <a:ext cx="1686115" cy="1322992"/>
-          </a:xfrm>
-          <a:prstGeom prst="straightConnector1">
-            <a:avLst/>
-          </a:prstGeom>
-          <a:ln w="19050">
-            <a:tailEnd type="triangle"/>
-          </a:ln>
-        </p:spPr>
-        <p:style>
-          <a:lnRef idx="1">
-            <a:schemeClr val="accent1"/>
-          </a:lnRef>
-          <a:fillRef idx="0">
-            <a:schemeClr val="accent1"/>
-          </a:fillRef>
-          <a:effectRef idx="0">
-            <a:schemeClr val="accent1"/>
-          </a:effectRef>
-          <a:fontRef idx="minor">
-            <a:schemeClr val="tx1"/>
-          </a:fontRef>
-        </p:style>
-      </p:cxnSp>
-      <p:sp>
-        <p:nvSpPr>
-          <p:cNvPr id="12" name="TextBox 11">
-            <a:extLst>
-              <a:ext uri="{FF2B5EF4-FFF2-40B4-BE49-F238E27FC236}">
-                <a16:creationId xmlns:a16="http://schemas.microsoft.com/office/drawing/2014/main" id="{0F89A906-0768-6242-24DB-901A4B6EDB59}"/>
-              </a:ext>
-            </a:extLst>
-          </p:cNvPr>
-          <p:cNvSpPr txBox="1"/>
-          <p:nvPr/>
-        </p:nvSpPr>
-        <p:spPr>
-          <a:xfrm>
-            <a:off x="1963787" y="5297179"/>
-            <a:ext cx="1817742" cy="369332"/>
-          </a:xfrm>
-          <a:prstGeom prst="rect">
-            <a:avLst/>
-          </a:prstGeom>
-          <a:ln w="19050"/>
-        </p:spPr>
-        <p:style>
-          <a:lnRef idx="2">
-            <a:schemeClr val="accent1"/>
-          </a:lnRef>
-          <a:fillRef idx="1">
-            <a:schemeClr val="lt1"/>
-          </a:fillRef>
-          <a:effectRef idx="0">
-            <a:schemeClr val="accent1"/>
-          </a:effectRef>
-          <a:fontRef idx="minor">
-            <a:schemeClr val="dk1"/>
-          </a:fontRef>
-        </p:style>
-        <p:txBody>
-          <a:bodyPr wrap="none" rtlCol="0">
-            <a:spAutoFit/>
-          </a:bodyPr>
-          <a:lstStyle/>
-          <a:p>
-            <a:pPr/>
-            <a:r>
-              <a:rPr lang="en-US" i="1" dirty="0">
-                <a:latin typeface="Cambria Math" panose="02040503050406030204" pitchFamily="18" charset="0"/>
-              </a:rPr>
-              <a:t>Entropy = 0.974</a:t>
-            </a:r>
-          </a:p>
-        </p:txBody>
-      </p:sp>
-      <mc:AlternateContent xmlns:mc="http://schemas.openxmlformats.org/markup-compatibility/2006">
-        <mc:Choice xmlns:a14="http://schemas.microsoft.com/office/drawing/2010/main" Requires="a14">
-          <p:sp>
-            <p:nvSpPr>
-              <p:cNvPr id="13" name="TextBox 12">
-                <a:extLst>
-                  <a:ext uri="{FF2B5EF4-FFF2-40B4-BE49-F238E27FC236}">
-                    <a16:creationId xmlns:a16="http://schemas.microsoft.com/office/drawing/2014/main" id="{0D183355-57BD-5E45-5D67-6ED37915B225}"/>
-                  </a:ext>
-                </a:extLst>
-              </p:cNvPr>
-              <p:cNvSpPr txBox="1"/>
-              <p:nvPr/>
-            </p:nvSpPr>
-            <p:spPr>
-              <a:xfrm>
-                <a:off x="5114417" y="5297179"/>
-                <a:ext cx="1963166" cy="369332"/>
-              </a:xfrm>
-              <a:prstGeom prst="rect">
-                <a:avLst/>
-              </a:prstGeom>
-              <a:ln w="19050"/>
-            </p:spPr>
-            <p:style>
-              <a:lnRef idx="2">
-                <a:schemeClr val="accent1"/>
-              </a:lnRef>
-              <a:fillRef idx="1">
-                <a:schemeClr val="lt1"/>
-              </a:fillRef>
-              <a:effectRef idx="0">
-                <a:schemeClr val="accent1"/>
-              </a:effectRef>
-              <a:fontRef idx="minor">
-                <a:schemeClr val="dk1"/>
-              </a:fontRef>
-            </p:style>
-            <p:txBody>
-              <a:bodyPr wrap="none" rtlCol="0">
-                <a:spAutoFit/>
-              </a:bodyPr>
-              <a:lstStyle/>
-              <a:p>
-                <a:pPr/>
-                <a14:m>
-                  <m:oMathPara xmlns:m="http://schemas.openxmlformats.org/officeDocument/2006/math">
-                    <m:oMathParaPr>
-                      <m:jc m:val="centerGroup"/>
-                    </m:oMathParaPr>
-                    <m:oMath xmlns:m="http://schemas.openxmlformats.org/officeDocument/2006/math">
-                      <m:r>
-                        <a:rPr lang="en-US" b="0" i="1" dirty="0" smtClean="0">
-                          <a:latin typeface="Cambria Math" panose="02040503050406030204" pitchFamily="18" charset="0"/>
-                        </a:rPr>
-                        <m:t>𝐸𝑛𝑡𝑟𝑜𝑝𝑦</m:t>
-                      </m:r>
-                      <m:r>
-                        <a:rPr lang="en-US" b="0" i="1" dirty="0" smtClean="0">
-                          <a:latin typeface="Cambria Math" panose="02040503050406030204" pitchFamily="18" charset="0"/>
-                        </a:rPr>
-                        <m:t>=0.537</m:t>
-                      </m:r>
-                    </m:oMath>
-                  </m:oMathPara>
-                </a14:m>
-                <a:endParaRPr lang="en-US" dirty="0"/>
-              </a:p>
-            </p:txBody>
-          </p:sp>
-        </mc:Choice>
-        <mc:Fallback>
-          <p:sp>
-            <p:nvSpPr>
-              <p:cNvPr id="13" name="TextBox 12">
-                <a:extLst>
-                  <a:ext uri="{FF2B5EF4-FFF2-40B4-BE49-F238E27FC236}">
-                    <a16:creationId xmlns:a16="http://schemas.microsoft.com/office/drawing/2014/main" id="{0D183355-57BD-5E45-5D67-6ED37915B225}"/>
-                  </a:ext>
-                </a:extLst>
-              </p:cNvPr>
-              <p:cNvSpPr txBox="1">
-                <a:spLocks noRot="1" noChangeAspect="1" noMove="1" noResize="1" noEditPoints="1" noAdjustHandles="1" noChangeArrowheads="1" noChangeShapeType="1" noTextEdit="1"/>
-              </p:cNvSpPr>
-              <p:nvPr/>
-            </p:nvSpPr>
-            <p:spPr>
-              <a:xfrm>
-                <a:off x="5114417" y="5297179"/>
-                <a:ext cx="1963166" cy="369332"/>
-              </a:xfrm>
-              <a:prstGeom prst="rect">
-                <a:avLst/>
-              </a:prstGeom>
-              <a:blipFill>
-                <a:blip r:embed="rId7"/>
-                <a:stretch>
-                  <a:fillRect b="-7813"/>
-                </a:stretch>
-              </a:blipFill>
-              <a:ln w="19050"/>
-            </p:spPr>
-            <p:txBody>
-              <a:bodyPr/>
-              <a:lstStyle/>
-              <a:p>
-                <a:r>
-                  <a:rPr lang="en-US">
-                    <a:noFill/>
-                  </a:rPr>
-                  <a:t> </a:t>
-                </a:r>
-              </a:p>
-            </p:txBody>
-          </p:sp>
-        </mc:Fallback>
-      </mc:AlternateContent>
-      <p:cxnSp>
-        <p:nvCxnSpPr>
-          <p:cNvPr id="14" name="Straight Arrow Connector 13">
-            <a:extLst>
-              <a:ext uri="{FF2B5EF4-FFF2-40B4-BE49-F238E27FC236}">
-                <a16:creationId xmlns:a16="http://schemas.microsoft.com/office/drawing/2014/main" id="{0C6167E6-E638-4DEA-5248-988B740A16E6}"/>
-              </a:ext>
-            </a:extLst>
-          </p:cNvPr>
-          <p:cNvCxnSpPr>
-            <a:endCxn id="12" idx="0"/>
-          </p:cNvCxnSpPr>
-          <p:nvPr/>
-        </p:nvCxnSpPr>
-        <p:spPr>
-          <a:xfrm flipH="1">
-            <a:off x="2872658" y="3974187"/>
-            <a:ext cx="1537227" cy="1322992"/>
-          </a:xfrm>
-          <a:prstGeom prst="straightConnector1">
-            <a:avLst/>
-          </a:prstGeom>
-          <a:ln w="19050">
-            <a:tailEnd type="triangle"/>
-          </a:ln>
-        </p:spPr>
-        <p:style>
-          <a:lnRef idx="1">
-            <a:schemeClr val="accent1"/>
-          </a:lnRef>
-          <a:fillRef idx="0">
-            <a:schemeClr val="accent1"/>
-          </a:fillRef>
-          <a:effectRef idx="0">
-            <a:schemeClr val="accent1"/>
-          </a:effectRef>
-          <a:fontRef idx="minor">
-            <a:schemeClr val="tx1"/>
-          </a:fontRef>
-        </p:style>
-      </p:cxnSp>
-      <p:cxnSp>
-        <p:nvCxnSpPr>
-          <p:cNvPr id="15" name="Straight Arrow Connector 14">
-            <a:extLst>
-              <a:ext uri="{FF2B5EF4-FFF2-40B4-BE49-F238E27FC236}">
-                <a16:creationId xmlns:a16="http://schemas.microsoft.com/office/drawing/2014/main" id="{3ACC5DDF-5A4B-9B63-2954-720DE65739EB}"/>
-              </a:ext>
-            </a:extLst>
-          </p:cNvPr>
-          <p:cNvCxnSpPr>
-            <a:endCxn id="13" idx="0"/>
-          </p:cNvCxnSpPr>
-          <p:nvPr/>
-        </p:nvCxnSpPr>
-        <p:spPr>
-          <a:xfrm>
-            <a:off x="4409885" y="3974187"/>
-            <a:ext cx="1686115" cy="1322992"/>
-          </a:xfrm>
-          <a:prstGeom prst="straightConnector1">
-            <a:avLst/>
-          </a:prstGeom>
-          <a:ln w="19050">
-            <a:tailEnd type="triangle"/>
-          </a:ln>
-        </p:spPr>
-        <p:style>
-          <a:lnRef idx="1">
-            <a:schemeClr val="accent1"/>
-          </a:lnRef>
-          <a:fillRef idx="0">
-            <a:schemeClr val="accent1"/>
-          </a:fillRef>
-          <a:effectRef idx="0">
-            <a:schemeClr val="accent1"/>
-          </a:effectRef>
-          <a:fontRef idx="minor">
-            <a:schemeClr val="tx1"/>
-          </a:fontRef>
-        </p:style>
-      </p:cxnSp>
+        </p:grpSpPr>
+        <mc:AlternateContent xmlns:mc="http://schemas.openxmlformats.org/markup-compatibility/2006">
+          <mc:Choice xmlns:a14="http://schemas.microsoft.com/office/drawing/2010/main" Requires="a14">
+            <p:sp>
+              <p:nvSpPr>
+                <p:cNvPr id="4" name="TextBox 3">
+                  <a:extLst>
+                    <a:ext uri="{FF2B5EF4-FFF2-40B4-BE49-F238E27FC236}">
+                      <a16:creationId xmlns:a16="http://schemas.microsoft.com/office/drawing/2014/main" id="{53634838-459F-7A46-D2E4-3C0DF67EA9FB}"/>
+                    </a:ext>
+                  </a:extLst>
+                </p:cNvPr>
+                <p:cNvSpPr txBox="1"/>
+                <p:nvPr/>
+              </p:nvSpPr>
+              <p:spPr>
+                <a:xfrm>
+                  <a:off x="1640917" y="1366391"/>
+                  <a:ext cx="1906548" cy="646331"/>
+                </a:xfrm>
+                <a:prstGeom prst="rect">
+                  <a:avLst/>
+                </a:prstGeom>
+                <a:ln w="19050"/>
+              </p:spPr>
+              <p:style>
+                <a:lnRef idx="2">
+                  <a:schemeClr val="accent1"/>
+                </a:lnRef>
+                <a:fillRef idx="1">
+                  <a:schemeClr val="lt1"/>
+                </a:fillRef>
+                <a:effectRef idx="0">
+                  <a:schemeClr val="accent1"/>
+                </a:effectRef>
+                <a:fontRef idx="minor">
+                  <a:schemeClr val="dk1"/>
+                </a:fontRef>
+              </p:style>
+              <p:txBody>
+                <a:bodyPr wrap="none" rtlCol="0">
+                  <a:spAutoFit/>
+                </a:bodyPr>
+                <a:lstStyle/>
+                <a:p>
+                  <a:pPr/>
+                  <a14:m>
+                    <m:oMathPara xmlns:m="http://schemas.openxmlformats.org/officeDocument/2006/math">
+                      <m:oMathParaPr>
+                        <m:jc m:val="centerGroup"/>
+                      </m:oMathParaPr>
+                      <m:oMath xmlns:m="http://schemas.openxmlformats.org/officeDocument/2006/math">
+                        <m:r>
+                          <a:rPr lang="en-US" b="0" i="1" dirty="0" smtClean="0">
+                            <a:latin typeface="Cambria Math" panose="02040503050406030204" pitchFamily="18" charset="0"/>
+                          </a:rPr>
+                          <m:t>𝐺𝑙𝑢𝑐𝑜𝑠𝑒</m:t>
+                        </m:r>
+                        <m:r>
+                          <a:rPr lang="en-US" i="1" dirty="0" smtClean="0">
+                            <a:latin typeface="Cambria Math" panose="02040503050406030204" pitchFamily="18" charset="0"/>
+                          </a:rPr>
+                          <m:t>≤</m:t>
+                        </m:r>
+                        <m:r>
+                          <a:rPr lang="en-US" b="0" i="1" dirty="0" smtClean="0">
+                            <a:latin typeface="Cambria Math" panose="02040503050406030204" pitchFamily="18" charset="0"/>
+                          </a:rPr>
+                          <m:t>1</m:t>
+                        </m:r>
+                        <m:r>
+                          <a:rPr lang="en-US" i="1" dirty="0" smtClean="0">
+                            <a:latin typeface="Cambria Math" panose="02040503050406030204" pitchFamily="18" charset="0"/>
+                          </a:rPr>
+                          <m:t>2</m:t>
+                        </m:r>
+                        <m:r>
+                          <a:rPr lang="en-US" b="0" i="1" dirty="0" smtClean="0">
+                            <a:latin typeface="Cambria Math" panose="02040503050406030204" pitchFamily="18" charset="0"/>
+                          </a:rPr>
+                          <m:t>3</m:t>
+                        </m:r>
+                        <m:r>
+                          <a:rPr lang="en-US" i="1" dirty="0" smtClean="0">
+                            <a:latin typeface="Cambria Math" panose="02040503050406030204" pitchFamily="18" charset="0"/>
+                          </a:rPr>
+                          <m:t>.5</m:t>
+                        </m:r>
+                      </m:oMath>
+                    </m:oMathPara>
+                  </a14:m>
+                  <a:endParaRPr lang="en-US" dirty="0"/>
+                </a:p>
+                <a:p>
+                  <a:pPr/>
+                  <a14:m>
+                    <m:oMathPara xmlns:m="http://schemas.openxmlformats.org/officeDocument/2006/math">
+                      <m:oMathParaPr>
+                        <m:jc m:val="centerGroup"/>
+                      </m:oMathParaPr>
+                      <m:oMath xmlns:m="http://schemas.openxmlformats.org/officeDocument/2006/math">
+                        <m:r>
+                          <a:rPr lang="en-US" i="1" dirty="0" smtClean="0">
+                            <a:latin typeface="Cambria Math" panose="02040503050406030204" pitchFamily="18" charset="0"/>
+                          </a:rPr>
+                          <m:t>𝐸𝑛𝑡𝑟𝑜𝑝𝑦</m:t>
+                        </m:r>
+                        <m:r>
+                          <a:rPr lang="en-US" i="1" dirty="0" smtClean="0">
+                            <a:latin typeface="Cambria Math" panose="02040503050406030204" pitchFamily="18" charset="0"/>
+                          </a:rPr>
+                          <m:t> =1.0</m:t>
+                        </m:r>
+                      </m:oMath>
+                    </m:oMathPara>
+                  </a14:m>
+                  <a:endParaRPr lang="en-US" dirty="0"/>
+                </a:p>
+              </p:txBody>
+            </p:sp>
+          </mc:Choice>
+          <mc:Fallback>
+            <p:sp>
+              <p:nvSpPr>
+                <p:cNvPr id="4" name="TextBox 3">
+                  <a:extLst>
+                    <a:ext uri="{FF2B5EF4-FFF2-40B4-BE49-F238E27FC236}">
+                      <a16:creationId xmlns:a16="http://schemas.microsoft.com/office/drawing/2014/main" id="{53634838-459F-7A46-D2E4-3C0DF67EA9FB}"/>
+                    </a:ext>
+                  </a:extLst>
+                </p:cNvPr>
+                <p:cNvSpPr txBox="1">
+                  <a:spLocks noRot="1" noChangeAspect="1" noMove="1" noResize="1" noEditPoints="1" noAdjustHandles="1" noChangeArrowheads="1" noChangeShapeType="1" noTextEdit="1"/>
+                </p:cNvSpPr>
+                <p:nvPr/>
+              </p:nvSpPr>
+              <p:spPr>
+                <a:xfrm>
+                  <a:off x="1640917" y="1366391"/>
+                  <a:ext cx="1906548" cy="646331"/>
+                </a:xfrm>
+                <a:prstGeom prst="rect">
+                  <a:avLst/>
+                </a:prstGeom>
+                <a:blipFill>
+                  <a:blip r:embed="rId3"/>
+                  <a:stretch>
+                    <a:fillRect b="-4587"/>
+                  </a:stretch>
+                </a:blipFill>
+                <a:ln w="19050"/>
+              </p:spPr>
+              <p:txBody>
+                <a:bodyPr/>
+                <a:lstStyle/>
+                <a:p>
+                  <a:r>
+                    <a:rPr lang="en-AU">
+                      <a:noFill/>
+                    </a:rPr>
+                    <a:t> </a:t>
+                  </a:r>
+                </a:p>
+              </p:txBody>
+            </p:sp>
+          </mc:Fallback>
+        </mc:AlternateContent>
+        <mc:AlternateContent xmlns:mc="http://schemas.openxmlformats.org/markup-compatibility/2006">
+          <mc:Choice xmlns:a14="http://schemas.microsoft.com/office/drawing/2010/main" Requires="a14">
+            <p:sp>
+              <p:nvSpPr>
+                <p:cNvPr id="5" name="TextBox 4">
+                  <a:extLst>
+                    <a:ext uri="{FF2B5EF4-FFF2-40B4-BE49-F238E27FC236}">
+                      <a16:creationId xmlns:a16="http://schemas.microsoft.com/office/drawing/2014/main" id="{A8770969-E353-3CA4-2EA3-1A3A20A82E76}"/>
+                    </a:ext>
+                  </a:extLst>
+                </p:cNvPr>
+                <p:cNvSpPr txBox="1"/>
+                <p:nvPr/>
+              </p:nvSpPr>
+              <p:spPr>
+                <a:xfrm>
+                  <a:off x="-750206" y="3328419"/>
+                  <a:ext cx="1859420" cy="646331"/>
+                </a:xfrm>
+                <a:prstGeom prst="rect">
+                  <a:avLst/>
+                </a:prstGeom>
+                <a:ln w="19050"/>
+              </p:spPr>
+              <p:style>
+                <a:lnRef idx="2">
+                  <a:schemeClr val="accent1"/>
+                </a:lnRef>
+                <a:fillRef idx="1">
+                  <a:schemeClr val="lt1"/>
+                </a:fillRef>
+                <a:effectRef idx="0">
+                  <a:schemeClr val="accent1"/>
+                </a:effectRef>
+                <a:fontRef idx="minor">
+                  <a:schemeClr val="dk1"/>
+                </a:fontRef>
+              </p:style>
+              <p:txBody>
+                <a:bodyPr wrap="none" rtlCol="0">
+                  <a:spAutoFit/>
+                </a:bodyPr>
+                <a:lstStyle/>
+                <a:p>
+                  <a:pPr/>
+                  <a14:m>
+                    <m:oMathPara xmlns:m="http://schemas.openxmlformats.org/officeDocument/2006/math">
+                      <m:oMathParaPr>
+                        <m:jc m:val="centerGroup"/>
+                      </m:oMathParaPr>
+                      <m:oMath xmlns:m="http://schemas.openxmlformats.org/officeDocument/2006/math">
+                        <m:r>
+                          <a:rPr lang="en-US" b="0" i="1" dirty="0" smtClean="0">
+                            <a:latin typeface="Cambria Math" panose="02040503050406030204" pitchFamily="18" charset="0"/>
+                          </a:rPr>
+                          <m:t>𝐵𝑀𝐼</m:t>
+                        </m:r>
+                        <m:r>
+                          <a:rPr lang="en-US" b="0" i="1" dirty="0" smtClean="0">
+                            <a:latin typeface="Cambria Math" panose="02040503050406030204" pitchFamily="18" charset="0"/>
+                          </a:rPr>
+                          <m:t>≤26.45</m:t>
+                        </m:r>
+                      </m:oMath>
+                    </m:oMathPara>
+                  </a14:m>
+                  <a:endParaRPr lang="en-US" b="0" i="1" dirty="0">
+                    <a:latin typeface="Cambria Math" panose="02040503050406030204" pitchFamily="18" charset="0"/>
+                  </a:endParaRPr>
+                </a:p>
+                <a:p>
+                  <a:r>
+                    <a:rPr lang="en-US" i="1" dirty="0">
+                      <a:latin typeface="Cambria Math" panose="02040503050406030204" pitchFamily="18" charset="0"/>
+                    </a:rPr>
+                    <a:t>Entropy = 0.872</a:t>
+                  </a:r>
+                </a:p>
+              </p:txBody>
+            </p:sp>
+          </mc:Choice>
+          <mc:Fallback>
+            <p:sp>
+              <p:nvSpPr>
+                <p:cNvPr id="5" name="TextBox 4">
+                  <a:extLst>
+                    <a:ext uri="{FF2B5EF4-FFF2-40B4-BE49-F238E27FC236}">
+                      <a16:creationId xmlns:a16="http://schemas.microsoft.com/office/drawing/2014/main" id="{A8770969-E353-3CA4-2EA3-1A3A20A82E76}"/>
+                    </a:ext>
+                  </a:extLst>
+                </p:cNvPr>
+                <p:cNvSpPr txBox="1">
+                  <a:spLocks noRot="1" noChangeAspect="1" noMove="1" noResize="1" noEditPoints="1" noAdjustHandles="1" noChangeArrowheads="1" noChangeShapeType="1" noTextEdit="1"/>
+                </p:cNvSpPr>
+                <p:nvPr/>
+              </p:nvSpPr>
+              <p:spPr>
+                <a:xfrm>
+                  <a:off x="-750206" y="3328419"/>
+                  <a:ext cx="1859420" cy="646331"/>
+                </a:xfrm>
+                <a:prstGeom prst="rect">
+                  <a:avLst/>
+                </a:prstGeom>
+                <a:blipFill>
+                  <a:blip r:embed="rId4"/>
+                  <a:stretch>
+                    <a:fillRect l="-2597" b="-11009"/>
+                  </a:stretch>
+                </a:blipFill>
+                <a:ln w="19050"/>
+              </p:spPr>
+              <p:txBody>
+                <a:bodyPr/>
+                <a:lstStyle/>
+                <a:p>
+                  <a:r>
+                    <a:rPr lang="en-AU">
+                      <a:noFill/>
+                    </a:rPr>
+                    <a:t> </a:t>
+                  </a:r>
+                </a:p>
+              </p:txBody>
+            </p:sp>
+          </mc:Fallback>
+        </mc:AlternateContent>
+        <mc:AlternateContent xmlns:mc="http://schemas.openxmlformats.org/markup-compatibility/2006">
+          <mc:Choice xmlns:a14="http://schemas.microsoft.com/office/drawing/2010/main" Requires="a14">
+            <p:sp>
+              <p:nvSpPr>
+                <p:cNvPr id="7" name="TextBox 6">
+                  <a:extLst>
+                    <a:ext uri="{FF2B5EF4-FFF2-40B4-BE49-F238E27FC236}">
+                      <a16:creationId xmlns:a16="http://schemas.microsoft.com/office/drawing/2014/main" id="{E50B4321-7BC9-0C9A-5769-7E95B40B37EC}"/>
+                    </a:ext>
+                  </a:extLst>
+                </p:cNvPr>
+                <p:cNvSpPr txBox="1"/>
+                <p:nvPr/>
+              </p:nvSpPr>
+              <p:spPr>
+                <a:xfrm>
+                  <a:off x="4232926" y="3328419"/>
+                  <a:ext cx="1963166" cy="646331"/>
+                </a:xfrm>
+                <a:prstGeom prst="rect">
+                  <a:avLst/>
+                </a:prstGeom>
+                <a:ln w="19050"/>
+              </p:spPr>
+              <p:style>
+                <a:lnRef idx="2">
+                  <a:schemeClr val="accent1"/>
+                </a:lnRef>
+                <a:fillRef idx="1">
+                  <a:schemeClr val="lt1"/>
+                </a:fillRef>
+                <a:effectRef idx="0">
+                  <a:schemeClr val="accent1"/>
+                </a:effectRef>
+                <a:fontRef idx="minor">
+                  <a:schemeClr val="dk1"/>
+                </a:fontRef>
+              </p:style>
+              <p:txBody>
+                <a:bodyPr wrap="none" rtlCol="0">
+                  <a:spAutoFit/>
+                </a:bodyPr>
+                <a:lstStyle/>
+                <a:p>
+                  <a:pPr/>
+                  <a14:m>
+                    <m:oMathPara xmlns:m="http://schemas.openxmlformats.org/officeDocument/2006/math">
+                      <m:oMathParaPr>
+                        <m:jc m:val="centerGroup"/>
+                      </m:oMathParaPr>
+                      <m:oMath xmlns:m="http://schemas.openxmlformats.org/officeDocument/2006/math">
+                        <m:r>
+                          <a:rPr lang="en-US" b="0" i="1" dirty="0" smtClean="0">
+                            <a:latin typeface="Cambria Math" panose="02040503050406030204" pitchFamily="18" charset="0"/>
+                          </a:rPr>
+                          <m:t>𝐺𝑙𝑢𝑐𝑜𝑠𝑒</m:t>
+                        </m:r>
+                        <m:r>
+                          <a:rPr lang="en-US" b="0" i="1" dirty="0" smtClean="0">
+                            <a:latin typeface="Cambria Math" panose="02040503050406030204" pitchFamily="18" charset="0"/>
+                          </a:rPr>
+                          <m:t>≤154.5</m:t>
+                        </m:r>
+                      </m:oMath>
+                    </m:oMathPara>
+                  </a14:m>
+                  <a:endParaRPr lang="en-US" dirty="0"/>
+                </a:p>
+                <a:p>
+                  <a:pPr/>
+                  <a14:m>
+                    <m:oMathPara xmlns:m="http://schemas.openxmlformats.org/officeDocument/2006/math">
+                      <m:oMathParaPr>
+                        <m:jc m:val="centerGroup"/>
+                      </m:oMathParaPr>
+                      <m:oMath xmlns:m="http://schemas.openxmlformats.org/officeDocument/2006/math">
+                        <m:r>
+                          <a:rPr lang="en-US" b="0" i="1" dirty="0" smtClean="0">
+                            <a:latin typeface="Cambria Math" panose="02040503050406030204" pitchFamily="18" charset="0"/>
+                          </a:rPr>
+                          <m:t>𝐸𝑛𝑡𝑟𝑜𝑝𝑦</m:t>
+                        </m:r>
+                        <m:r>
+                          <a:rPr lang="en-US" b="0" i="1" dirty="0" smtClean="0">
+                            <a:latin typeface="Cambria Math" panose="02040503050406030204" pitchFamily="18" charset="0"/>
+                          </a:rPr>
+                          <m:t>=0.865</m:t>
+                        </m:r>
+                      </m:oMath>
+                    </m:oMathPara>
+                  </a14:m>
+                  <a:endParaRPr lang="en-US" dirty="0"/>
+                </a:p>
+              </p:txBody>
+            </p:sp>
+          </mc:Choice>
+          <mc:Fallback>
+            <p:sp>
+              <p:nvSpPr>
+                <p:cNvPr id="7" name="TextBox 6">
+                  <a:extLst>
+                    <a:ext uri="{FF2B5EF4-FFF2-40B4-BE49-F238E27FC236}">
+                      <a16:creationId xmlns:a16="http://schemas.microsoft.com/office/drawing/2014/main" id="{E50B4321-7BC9-0C9A-5769-7E95B40B37EC}"/>
+                    </a:ext>
+                  </a:extLst>
+                </p:cNvPr>
+                <p:cNvSpPr txBox="1">
+                  <a:spLocks noRot="1" noChangeAspect="1" noMove="1" noResize="1" noEditPoints="1" noAdjustHandles="1" noChangeArrowheads="1" noChangeShapeType="1" noTextEdit="1"/>
+                </p:cNvSpPr>
+                <p:nvPr/>
+              </p:nvSpPr>
+              <p:spPr>
+                <a:xfrm>
+                  <a:off x="4232926" y="3328419"/>
+                  <a:ext cx="1963166" cy="646331"/>
+                </a:xfrm>
+                <a:prstGeom prst="rect">
+                  <a:avLst/>
+                </a:prstGeom>
+                <a:blipFill>
+                  <a:blip r:embed="rId5"/>
+                  <a:stretch>
+                    <a:fillRect b="-4587"/>
+                  </a:stretch>
+                </a:blipFill>
+                <a:ln w="19050"/>
+              </p:spPr>
+              <p:txBody>
+                <a:bodyPr/>
+                <a:lstStyle/>
+                <a:p>
+                  <a:r>
+                    <a:rPr lang="en-AU">
+                      <a:noFill/>
+                    </a:rPr>
+                    <a:t> </a:t>
+                  </a:r>
+                </a:p>
+              </p:txBody>
+            </p:sp>
+          </mc:Fallback>
+        </mc:AlternateContent>
+        <p:cxnSp>
+          <p:nvCxnSpPr>
+            <p:cNvPr id="8" name="Straight Arrow Connector 7">
+              <a:extLst>
+                <a:ext uri="{FF2B5EF4-FFF2-40B4-BE49-F238E27FC236}">
+                  <a16:creationId xmlns:a16="http://schemas.microsoft.com/office/drawing/2014/main" id="{E9DC2C04-5AFD-3D1C-73E6-218A7859CB55}"/>
+                </a:ext>
+              </a:extLst>
+            </p:cNvPr>
+            <p:cNvCxnSpPr>
+              <a:stCxn id="4" idx="2"/>
+              <a:endCxn id="5" idx="0"/>
+            </p:cNvCxnSpPr>
+            <p:nvPr/>
+          </p:nvCxnSpPr>
+          <p:spPr>
+            <a:xfrm flipH="1">
+              <a:off x="179504" y="2012722"/>
+              <a:ext cx="2414687" cy="1315697"/>
+            </a:xfrm>
+            <a:prstGeom prst="straightConnector1">
+              <a:avLst/>
+            </a:prstGeom>
+            <a:ln w="19050">
+              <a:tailEnd type="triangle"/>
+            </a:ln>
+          </p:spPr>
+          <p:style>
+            <a:lnRef idx="1">
+              <a:schemeClr val="accent1"/>
+            </a:lnRef>
+            <a:fillRef idx="0">
+              <a:schemeClr val="accent1"/>
+            </a:fillRef>
+            <a:effectRef idx="0">
+              <a:schemeClr val="accent1"/>
+            </a:effectRef>
+            <a:fontRef idx="minor">
+              <a:schemeClr val="tx1"/>
+            </a:fontRef>
+          </p:style>
+        </p:cxnSp>
+        <p:cxnSp>
+          <p:nvCxnSpPr>
+            <p:cNvPr id="10" name="Straight Arrow Connector 9">
+              <a:extLst>
+                <a:ext uri="{FF2B5EF4-FFF2-40B4-BE49-F238E27FC236}">
+                  <a16:creationId xmlns:a16="http://schemas.microsoft.com/office/drawing/2014/main" id="{A5DDBE92-E5D1-EC99-138E-CAB70E50438E}"/>
+                </a:ext>
+              </a:extLst>
+            </p:cNvPr>
+            <p:cNvCxnSpPr>
+              <a:stCxn id="4" idx="2"/>
+              <a:endCxn id="7" idx="0"/>
+            </p:cNvCxnSpPr>
+            <p:nvPr/>
+          </p:nvCxnSpPr>
+          <p:spPr>
+            <a:xfrm>
+              <a:off x="2594191" y="2012722"/>
+              <a:ext cx="2620318" cy="1315697"/>
+            </a:xfrm>
+            <a:prstGeom prst="straightConnector1">
+              <a:avLst/>
+            </a:prstGeom>
+            <a:ln w="19050">
+              <a:tailEnd type="triangle"/>
+            </a:ln>
+          </p:spPr>
+          <p:style>
+            <a:lnRef idx="1">
+              <a:schemeClr val="accent1"/>
+            </a:lnRef>
+            <a:fillRef idx="0">
+              <a:schemeClr val="accent1"/>
+            </a:fillRef>
+            <a:effectRef idx="0">
+              <a:schemeClr val="accent1"/>
+            </a:effectRef>
+            <a:fontRef idx="minor">
+              <a:schemeClr val="tx1"/>
+            </a:fontRef>
+          </p:style>
+        </p:cxnSp>
+        <p:sp>
+          <p:nvSpPr>
+            <p:cNvPr id="12" name="TextBox 11">
+              <a:extLst>
+                <a:ext uri="{FF2B5EF4-FFF2-40B4-BE49-F238E27FC236}">
+                  <a16:creationId xmlns:a16="http://schemas.microsoft.com/office/drawing/2014/main" id="{0F89A906-0768-6242-24DB-901A4B6EDB59}"/>
+                </a:ext>
+              </a:extLst>
+            </p:cNvPr>
+            <p:cNvSpPr txBox="1"/>
+            <p:nvPr/>
+          </p:nvSpPr>
+          <p:spPr>
+            <a:xfrm>
+              <a:off x="3298268" y="5280947"/>
+              <a:ext cx="1817742" cy="369332"/>
+            </a:xfrm>
+            <a:prstGeom prst="rect">
+              <a:avLst/>
+            </a:prstGeom>
+            <a:ln w="19050"/>
+          </p:spPr>
+          <p:style>
+            <a:lnRef idx="2">
+              <a:schemeClr val="accent1"/>
+            </a:lnRef>
+            <a:fillRef idx="1">
+              <a:schemeClr val="lt1"/>
+            </a:fillRef>
+            <a:effectRef idx="0">
+              <a:schemeClr val="accent1"/>
+            </a:effectRef>
+            <a:fontRef idx="minor">
+              <a:schemeClr val="dk1"/>
+            </a:fontRef>
+          </p:style>
+          <p:txBody>
+            <a:bodyPr wrap="none" rtlCol="0">
+              <a:spAutoFit/>
+            </a:bodyPr>
+            <a:lstStyle/>
+            <a:p>
+              <a:r>
+                <a:rPr lang="en-US" i="1" dirty="0">
+                  <a:latin typeface="Cambria Math" panose="02040503050406030204" pitchFamily="18" charset="0"/>
+                </a:rPr>
+                <a:t>Entropy = 0.974</a:t>
+              </a:r>
+            </a:p>
+          </p:txBody>
+        </p:sp>
+        <mc:AlternateContent xmlns:mc="http://schemas.openxmlformats.org/markup-compatibility/2006">
+          <mc:Choice xmlns:a14="http://schemas.microsoft.com/office/drawing/2010/main" Requires="a14">
+            <p:sp>
+              <p:nvSpPr>
+                <p:cNvPr id="13" name="TextBox 12">
+                  <a:extLst>
+                    <a:ext uri="{FF2B5EF4-FFF2-40B4-BE49-F238E27FC236}">
+                      <a16:creationId xmlns:a16="http://schemas.microsoft.com/office/drawing/2014/main" id="{0D183355-57BD-5E45-5D67-6ED37915B225}"/>
+                    </a:ext>
+                  </a:extLst>
+                </p:cNvPr>
+                <p:cNvSpPr txBox="1"/>
+                <p:nvPr/>
+              </p:nvSpPr>
+              <p:spPr>
+                <a:xfrm>
+                  <a:off x="5278223" y="5266204"/>
+                  <a:ext cx="1963166" cy="369332"/>
+                </a:xfrm>
+                <a:prstGeom prst="rect">
+                  <a:avLst/>
+                </a:prstGeom>
+                <a:ln w="19050"/>
+              </p:spPr>
+              <p:style>
+                <a:lnRef idx="2">
+                  <a:schemeClr val="accent1"/>
+                </a:lnRef>
+                <a:fillRef idx="1">
+                  <a:schemeClr val="lt1"/>
+                </a:fillRef>
+                <a:effectRef idx="0">
+                  <a:schemeClr val="accent1"/>
+                </a:effectRef>
+                <a:fontRef idx="minor">
+                  <a:schemeClr val="dk1"/>
+                </a:fontRef>
+              </p:style>
+              <p:txBody>
+                <a:bodyPr wrap="none" rtlCol="0">
+                  <a:spAutoFit/>
+                </a:bodyPr>
+                <a:lstStyle/>
+                <a:p>
+                  <a:pPr/>
+                  <a14:m>
+                    <m:oMathPara xmlns:m="http://schemas.openxmlformats.org/officeDocument/2006/math">
+                      <m:oMathParaPr>
+                        <m:jc m:val="centerGroup"/>
+                      </m:oMathParaPr>
+                      <m:oMath xmlns:m="http://schemas.openxmlformats.org/officeDocument/2006/math">
+                        <m:r>
+                          <a:rPr lang="en-US" b="0" i="1" dirty="0" smtClean="0">
+                            <a:latin typeface="Cambria Math" panose="02040503050406030204" pitchFamily="18" charset="0"/>
+                          </a:rPr>
+                          <m:t>𝐸𝑛𝑡𝑟𝑜𝑝𝑦</m:t>
+                        </m:r>
+                        <m:r>
+                          <a:rPr lang="en-US" b="0" i="1" dirty="0" smtClean="0">
+                            <a:latin typeface="Cambria Math" panose="02040503050406030204" pitchFamily="18" charset="0"/>
+                          </a:rPr>
+                          <m:t>=0.537</m:t>
+                        </m:r>
+                      </m:oMath>
+                    </m:oMathPara>
+                  </a14:m>
+                  <a:endParaRPr lang="en-US" dirty="0"/>
+                </a:p>
+              </p:txBody>
+            </p:sp>
+          </mc:Choice>
+          <mc:Fallback>
+            <p:sp>
+              <p:nvSpPr>
+                <p:cNvPr id="13" name="TextBox 12">
+                  <a:extLst>
+                    <a:ext uri="{FF2B5EF4-FFF2-40B4-BE49-F238E27FC236}">
+                      <a16:creationId xmlns:a16="http://schemas.microsoft.com/office/drawing/2014/main" id="{0D183355-57BD-5E45-5D67-6ED37915B225}"/>
+                    </a:ext>
+                  </a:extLst>
+                </p:cNvPr>
+                <p:cNvSpPr txBox="1">
+                  <a:spLocks noRot="1" noChangeAspect="1" noMove="1" noResize="1" noEditPoints="1" noAdjustHandles="1" noChangeArrowheads="1" noChangeShapeType="1" noTextEdit="1"/>
+                </p:cNvSpPr>
+                <p:nvPr/>
+              </p:nvSpPr>
+              <p:spPr>
+                <a:xfrm>
+                  <a:off x="5278223" y="5266204"/>
+                  <a:ext cx="1963166" cy="369332"/>
+                </a:xfrm>
+                <a:prstGeom prst="rect">
+                  <a:avLst/>
+                </a:prstGeom>
+                <a:blipFill>
+                  <a:blip r:embed="rId6"/>
+                  <a:stretch>
+                    <a:fillRect b="-7813"/>
+                  </a:stretch>
+                </a:blipFill>
+                <a:ln w="19050"/>
+              </p:spPr>
+              <p:txBody>
+                <a:bodyPr/>
+                <a:lstStyle/>
+                <a:p>
+                  <a:r>
+                    <a:rPr lang="en-AU">
+                      <a:noFill/>
+                    </a:rPr>
+                    <a:t> </a:t>
+                  </a:r>
+                </a:p>
+              </p:txBody>
+            </p:sp>
+          </mc:Fallback>
+        </mc:AlternateContent>
+        <p:cxnSp>
+          <p:nvCxnSpPr>
+            <p:cNvPr id="14" name="Straight Arrow Connector 13">
+              <a:extLst>
+                <a:ext uri="{FF2B5EF4-FFF2-40B4-BE49-F238E27FC236}">
+                  <a16:creationId xmlns:a16="http://schemas.microsoft.com/office/drawing/2014/main" id="{0C6167E6-E638-4DEA-5248-988B740A16E6}"/>
+                </a:ext>
+              </a:extLst>
+            </p:cNvPr>
+            <p:cNvCxnSpPr>
+              <a:cxnSpLocks/>
+              <a:stCxn id="7" idx="2"/>
+              <a:endCxn id="12" idx="0"/>
+            </p:cNvCxnSpPr>
+            <p:nvPr/>
+          </p:nvCxnSpPr>
+          <p:spPr>
+            <a:xfrm flipH="1">
+              <a:off x="4207139" y="3974750"/>
+              <a:ext cx="1007370" cy="1306197"/>
+            </a:xfrm>
+            <a:prstGeom prst="straightConnector1">
+              <a:avLst/>
+            </a:prstGeom>
+            <a:ln w="19050">
+              <a:tailEnd type="triangle"/>
+            </a:ln>
+          </p:spPr>
+          <p:style>
+            <a:lnRef idx="1">
+              <a:schemeClr val="accent1"/>
+            </a:lnRef>
+            <a:fillRef idx="0">
+              <a:schemeClr val="accent1"/>
+            </a:fillRef>
+            <a:effectRef idx="0">
+              <a:schemeClr val="accent1"/>
+            </a:effectRef>
+            <a:fontRef idx="minor">
+              <a:schemeClr val="tx1"/>
+            </a:fontRef>
+          </p:style>
+        </p:cxnSp>
+        <p:cxnSp>
+          <p:nvCxnSpPr>
+            <p:cNvPr id="15" name="Straight Arrow Connector 14">
+              <a:extLst>
+                <a:ext uri="{FF2B5EF4-FFF2-40B4-BE49-F238E27FC236}">
+                  <a16:creationId xmlns:a16="http://schemas.microsoft.com/office/drawing/2014/main" id="{3ACC5DDF-5A4B-9B63-2954-720DE65739EB}"/>
+                </a:ext>
+              </a:extLst>
+            </p:cNvPr>
+            <p:cNvCxnSpPr>
+              <a:cxnSpLocks/>
+              <a:stCxn id="7" idx="2"/>
+              <a:endCxn id="13" idx="0"/>
+            </p:cNvCxnSpPr>
+            <p:nvPr/>
+          </p:nvCxnSpPr>
+          <p:spPr>
+            <a:xfrm>
+              <a:off x="5214509" y="3974750"/>
+              <a:ext cx="1045297" cy="1291454"/>
+            </a:xfrm>
+            <a:prstGeom prst="straightConnector1">
+              <a:avLst/>
+            </a:prstGeom>
+            <a:ln w="19050">
+              <a:tailEnd type="triangle"/>
+            </a:ln>
+          </p:spPr>
+          <p:style>
+            <a:lnRef idx="1">
+              <a:schemeClr val="accent1"/>
+            </a:lnRef>
+            <a:fillRef idx="0">
+              <a:schemeClr val="accent1"/>
+            </a:fillRef>
+            <a:effectRef idx="0">
+              <a:schemeClr val="accent1"/>
+            </a:effectRef>
+            <a:fontRef idx="minor">
+              <a:schemeClr val="tx1"/>
+            </a:fontRef>
+          </p:style>
+        </p:cxnSp>
+        <p:sp>
+          <p:nvSpPr>
+            <p:cNvPr id="17" name="TextBox 16">
+              <a:extLst>
+                <a:ext uri="{FF2B5EF4-FFF2-40B4-BE49-F238E27FC236}">
+                  <a16:creationId xmlns:a16="http://schemas.microsoft.com/office/drawing/2014/main" id="{8EBCD9BF-37A8-8805-A1D9-053D3D1F74AB}"/>
+                </a:ext>
+              </a:extLst>
+            </p:cNvPr>
+            <p:cNvSpPr txBox="1"/>
+            <p:nvPr/>
+          </p:nvSpPr>
+          <p:spPr>
+            <a:xfrm>
+              <a:off x="-1756209" y="5297179"/>
+              <a:ext cx="1817742" cy="369332"/>
+            </a:xfrm>
+            <a:prstGeom prst="rect">
+              <a:avLst/>
+            </a:prstGeom>
+            <a:ln w="19050"/>
+          </p:spPr>
+          <p:style>
+            <a:lnRef idx="2">
+              <a:schemeClr val="accent1"/>
+            </a:lnRef>
+            <a:fillRef idx="1">
+              <a:schemeClr val="lt1"/>
+            </a:fillRef>
+            <a:effectRef idx="0">
+              <a:schemeClr val="accent1"/>
+            </a:effectRef>
+            <a:fontRef idx="minor">
+              <a:schemeClr val="dk1"/>
+            </a:fontRef>
+          </p:style>
+          <p:txBody>
+            <a:bodyPr wrap="none" rtlCol="0">
+              <a:spAutoFit/>
+            </a:bodyPr>
+            <a:lstStyle/>
+            <a:p>
+              <a:r>
+                <a:rPr lang="en-US" i="1" dirty="0">
+                  <a:latin typeface="Cambria Math" panose="02040503050406030204" pitchFamily="18" charset="0"/>
+                </a:rPr>
+                <a:t>Entropy = 0.144</a:t>
+              </a:r>
+            </a:p>
+          </p:txBody>
+        </p:sp>
+        <mc:AlternateContent xmlns:mc="http://schemas.openxmlformats.org/markup-compatibility/2006">
+          <mc:Choice xmlns:a14="http://schemas.microsoft.com/office/drawing/2010/main" Requires="a14">
+            <p:sp>
+              <p:nvSpPr>
+                <p:cNvPr id="18" name="TextBox 17">
+                  <a:extLst>
+                    <a:ext uri="{FF2B5EF4-FFF2-40B4-BE49-F238E27FC236}">
+                      <a16:creationId xmlns:a16="http://schemas.microsoft.com/office/drawing/2014/main" id="{FB2B96DE-8C80-9BC1-831D-EDBF98B0FBA5}"/>
+                    </a:ext>
+                  </a:extLst>
+                </p:cNvPr>
+                <p:cNvSpPr txBox="1"/>
+                <p:nvPr/>
+              </p:nvSpPr>
+              <p:spPr>
+                <a:xfrm>
+                  <a:off x="223746" y="5295237"/>
+                  <a:ext cx="1963166" cy="369332"/>
+                </a:xfrm>
+                <a:prstGeom prst="rect">
+                  <a:avLst/>
+                </a:prstGeom>
+                <a:ln w="19050"/>
+              </p:spPr>
+              <p:style>
+                <a:lnRef idx="2">
+                  <a:schemeClr val="accent1"/>
+                </a:lnRef>
+                <a:fillRef idx="1">
+                  <a:schemeClr val="lt1"/>
+                </a:fillRef>
+                <a:effectRef idx="0">
+                  <a:schemeClr val="accent1"/>
+                </a:effectRef>
+                <a:fontRef idx="minor">
+                  <a:schemeClr val="dk1"/>
+                </a:fontRef>
+              </p:style>
+              <p:txBody>
+                <a:bodyPr wrap="none" rtlCol="0">
+                  <a:spAutoFit/>
+                </a:bodyPr>
+                <a:lstStyle/>
+                <a:p>
+                  <a:pPr/>
+                  <a14:m>
+                    <m:oMathPara xmlns:m="http://schemas.openxmlformats.org/officeDocument/2006/math">
+                      <m:oMathParaPr>
+                        <m:jc m:val="centerGroup"/>
+                      </m:oMathParaPr>
+                      <m:oMath xmlns:m="http://schemas.openxmlformats.org/officeDocument/2006/math">
+                        <m:r>
+                          <a:rPr lang="en-US" b="0" i="1" dirty="0" smtClean="0">
+                            <a:latin typeface="Cambria Math" panose="02040503050406030204" pitchFamily="18" charset="0"/>
+                          </a:rPr>
+                          <m:t>𝐸𝑛𝑡𝑟𝑜𝑝𝑦</m:t>
+                        </m:r>
+                        <m:r>
+                          <a:rPr lang="en-US" b="0" i="1" dirty="0" smtClean="0">
+                            <a:latin typeface="Cambria Math" panose="02040503050406030204" pitchFamily="18" charset="0"/>
+                          </a:rPr>
+                          <m:t>=0.957</m:t>
+                        </m:r>
+                      </m:oMath>
+                    </m:oMathPara>
+                  </a14:m>
+                  <a:endParaRPr lang="en-US" dirty="0"/>
+                </a:p>
+              </p:txBody>
+            </p:sp>
+          </mc:Choice>
+          <mc:Fallback>
+            <p:sp>
+              <p:nvSpPr>
+                <p:cNvPr id="18" name="TextBox 17">
+                  <a:extLst>
+                    <a:ext uri="{FF2B5EF4-FFF2-40B4-BE49-F238E27FC236}">
+                      <a16:creationId xmlns:a16="http://schemas.microsoft.com/office/drawing/2014/main" id="{FB2B96DE-8C80-9BC1-831D-EDBF98B0FBA5}"/>
+                    </a:ext>
+                  </a:extLst>
+                </p:cNvPr>
+                <p:cNvSpPr txBox="1">
+                  <a:spLocks noRot="1" noChangeAspect="1" noMove="1" noResize="1" noEditPoints="1" noAdjustHandles="1" noChangeArrowheads="1" noChangeShapeType="1" noTextEdit="1"/>
+                </p:cNvSpPr>
+                <p:nvPr/>
+              </p:nvSpPr>
+              <p:spPr>
+                <a:xfrm>
+                  <a:off x="223746" y="5295237"/>
+                  <a:ext cx="1963166" cy="369332"/>
+                </a:xfrm>
+                <a:prstGeom prst="rect">
+                  <a:avLst/>
+                </a:prstGeom>
+                <a:blipFill>
+                  <a:blip r:embed="rId7"/>
+                  <a:stretch>
+                    <a:fillRect b="-7813"/>
+                  </a:stretch>
+                </a:blipFill>
+                <a:ln w="19050"/>
+              </p:spPr>
+              <p:txBody>
+                <a:bodyPr/>
+                <a:lstStyle/>
+                <a:p>
+                  <a:r>
+                    <a:rPr lang="en-AU">
+                      <a:noFill/>
+                    </a:rPr>
+                    <a:t> </a:t>
+                  </a:r>
+                </a:p>
+              </p:txBody>
+            </p:sp>
+          </mc:Fallback>
+        </mc:AlternateContent>
+        <p:cxnSp>
+          <p:nvCxnSpPr>
+            <p:cNvPr id="19" name="Straight Arrow Connector 18">
+              <a:extLst>
+                <a:ext uri="{FF2B5EF4-FFF2-40B4-BE49-F238E27FC236}">
+                  <a16:creationId xmlns:a16="http://schemas.microsoft.com/office/drawing/2014/main" id="{917B5954-D0FC-753A-7AEE-4A7D5DB20BD5}"/>
+                </a:ext>
+              </a:extLst>
+            </p:cNvPr>
+            <p:cNvCxnSpPr>
+              <a:cxnSpLocks/>
+              <a:stCxn id="5" idx="2"/>
+              <a:endCxn id="17" idx="0"/>
+            </p:cNvCxnSpPr>
+            <p:nvPr/>
+          </p:nvCxnSpPr>
+          <p:spPr>
+            <a:xfrm flipH="1">
+              <a:off x="-847338" y="3974750"/>
+              <a:ext cx="1026842" cy="1322429"/>
+            </a:xfrm>
+            <a:prstGeom prst="straightConnector1">
+              <a:avLst/>
+            </a:prstGeom>
+            <a:ln w="19050">
+              <a:tailEnd type="triangle"/>
+            </a:ln>
+          </p:spPr>
+          <p:style>
+            <a:lnRef idx="1">
+              <a:schemeClr val="accent1"/>
+            </a:lnRef>
+            <a:fillRef idx="0">
+              <a:schemeClr val="accent1"/>
+            </a:fillRef>
+            <a:effectRef idx="0">
+              <a:schemeClr val="accent1"/>
+            </a:effectRef>
+            <a:fontRef idx="minor">
+              <a:schemeClr val="tx1"/>
+            </a:fontRef>
+          </p:style>
+        </p:cxnSp>
+        <p:cxnSp>
+          <p:nvCxnSpPr>
+            <p:cNvPr id="20" name="Straight Arrow Connector 19">
+              <a:extLst>
+                <a:ext uri="{FF2B5EF4-FFF2-40B4-BE49-F238E27FC236}">
+                  <a16:creationId xmlns:a16="http://schemas.microsoft.com/office/drawing/2014/main" id="{BB933174-D4B6-02F1-9889-B4F44CAEAD0C}"/>
+                </a:ext>
+              </a:extLst>
+            </p:cNvPr>
+            <p:cNvCxnSpPr>
+              <a:cxnSpLocks/>
+              <a:stCxn id="5" idx="2"/>
+              <a:endCxn id="18" idx="0"/>
+            </p:cNvCxnSpPr>
+            <p:nvPr/>
+          </p:nvCxnSpPr>
+          <p:spPr>
+            <a:xfrm>
+              <a:off x="179504" y="3974750"/>
+              <a:ext cx="1025825" cy="1320487"/>
+            </a:xfrm>
+            <a:prstGeom prst="straightConnector1">
+              <a:avLst/>
+            </a:prstGeom>
+            <a:ln w="19050">
+              <a:tailEnd type="triangle"/>
+            </a:ln>
+          </p:spPr>
+          <p:style>
+            <a:lnRef idx="1">
+              <a:schemeClr val="accent1"/>
+            </a:lnRef>
+            <a:fillRef idx="0">
+              <a:schemeClr val="accent1"/>
+            </a:fillRef>
+            <a:effectRef idx="0">
+              <a:schemeClr val="accent1"/>
+            </a:effectRef>
+            <a:fontRef idx="minor">
+              <a:schemeClr val="tx1"/>
+            </a:fontRef>
+          </p:style>
+        </p:cxnSp>
+      </p:grpSp>
     </p:spTree>
     <p:extLst>
       <p:ext uri="{BB962C8B-B14F-4D97-AF65-F5344CB8AC3E}">

</xml_diff>

<commit_message>
Fixed Bias Variance Computation for Diabetes Data
</commit_message>
<xml_diff>
--- a/Notes/Decision_Trees.pptx
+++ b/Notes/Decision_Trees.pptx
@@ -243,7 +243,7 @@
           <a:p>
             <a:fld id="{0BFC49C2-91E2-4019-9562-07422A279DAF}" type="datetimeFigureOut">
               <a:rPr lang="en-US" smtClean="0"/>
-              <a:t>9/5/2023</a:t>
+              <a:t>9/11/2023</a:t>
             </a:fld>
             <a:endParaRPr lang="en-US"/>
           </a:p>
@@ -420,7 +420,7 @@
           <a:p>
             <a:fld id="{1FEA3286-221C-418A-ABA5-8CBD2C4A5B25}" type="datetimeFigureOut">
               <a:rPr lang="en-US" smtClean="0"/>
-              <a:t>9/5/2023</a:t>
+              <a:t>9/11/2023</a:t>
             </a:fld>
             <a:endParaRPr lang="en-US"/>
           </a:p>
@@ -834,7 +834,7 @@
           <a:p>
             <a:fld id="{C536D5AE-0547-4B22-9FF1-61DC50066B07}" type="datetime1">
               <a:rPr lang="en-US" smtClean="0"/>
-              <a:t>9/5/2023</a:t>
+              <a:t>9/11/2023</a:t>
             </a:fld>
             <a:endParaRPr lang="en-US"/>
           </a:p>
@@ -1035,7 +1035,7 @@
           <a:p>
             <a:fld id="{340B8BF2-BD8A-41AE-9C1D-EB089E94831C}" type="datetime1">
               <a:rPr lang="en-US" smtClean="0"/>
-              <a:t>9/5/2023</a:t>
+              <a:t>9/11/2023</a:t>
             </a:fld>
             <a:endParaRPr lang="en-US"/>
           </a:p>
@@ -1246,7 +1246,7 @@
           <a:p>
             <a:fld id="{3EFD6C31-EB7B-4A64-ABE1-F0AB246A850A}" type="datetime1">
               <a:rPr lang="en-US" smtClean="0"/>
-              <a:t>9/5/2023</a:t>
+              <a:t>9/11/2023</a:t>
             </a:fld>
             <a:endParaRPr lang="en-US"/>
           </a:p>
@@ -1447,7 +1447,7 @@
           <a:p>
             <a:fld id="{668B0DC0-B3F2-439A-9114-5F53D4377D45}" type="datetime1">
               <a:rPr lang="en-US" smtClean="0"/>
-              <a:t>9/5/2023</a:t>
+              <a:t>9/11/2023</a:t>
             </a:fld>
             <a:endParaRPr lang="en-US"/>
           </a:p>
@@ -1725,7 +1725,7 @@
           <a:p>
             <a:fld id="{320A5CD0-6878-49B6-96F5-F20F192C0B0C}" type="datetime1">
               <a:rPr lang="en-US" smtClean="0"/>
-              <a:t>9/5/2023</a:t>
+              <a:t>9/11/2023</a:t>
             </a:fld>
             <a:endParaRPr lang="en-US"/>
           </a:p>
@@ -1993,7 +1993,7 @@
           <a:p>
             <a:fld id="{0FA53E43-3A16-4047-B486-C7A15A332A3C}" type="datetime1">
               <a:rPr lang="en-US" smtClean="0"/>
-              <a:t>9/5/2023</a:t>
+              <a:t>9/11/2023</a:t>
             </a:fld>
             <a:endParaRPr lang="en-US"/>
           </a:p>
@@ -2408,7 +2408,7 @@
           <a:p>
             <a:fld id="{47026F2D-B854-4AB5-B7E3-3EA6EE97A89A}" type="datetime1">
               <a:rPr lang="en-US" smtClean="0"/>
-              <a:t>9/5/2023</a:t>
+              <a:t>9/11/2023</a:t>
             </a:fld>
             <a:endParaRPr lang="en-US"/>
           </a:p>
@@ -2552,7 +2552,7 @@
           <a:p>
             <a:fld id="{E9234E8A-3332-401A-B443-35F0A68A1277}" type="datetime1">
               <a:rPr lang="en-US" smtClean="0"/>
-              <a:t>9/5/2023</a:t>
+              <a:t>9/11/2023</a:t>
             </a:fld>
             <a:endParaRPr lang="en-US"/>
           </a:p>
@@ -2668,7 +2668,7 @@
           <a:p>
             <a:fld id="{ACF48743-21A8-4AA2-9F78-5E14E55EAB74}" type="datetime1">
               <a:rPr lang="en-US" smtClean="0"/>
-              <a:t>9/5/2023</a:t>
+              <a:t>9/11/2023</a:t>
             </a:fld>
             <a:endParaRPr lang="en-US"/>
           </a:p>
@@ -2982,7 +2982,7 @@
           <a:p>
             <a:fld id="{45C93320-C53B-4F9C-A839-A4EECC5AEF8C}" type="datetime1">
               <a:rPr lang="en-US" smtClean="0"/>
-              <a:t>9/5/2023</a:t>
+              <a:t>9/11/2023</a:t>
             </a:fld>
             <a:endParaRPr lang="en-US"/>
           </a:p>
@@ -3273,7 +3273,7 @@
           <a:p>
             <a:fld id="{F967DE46-3299-4D41-94F8-85A67C9B0629}" type="datetime1">
               <a:rPr lang="en-US" smtClean="0"/>
-              <a:t>9/5/2023</a:t>
+              <a:t>9/11/2023</a:t>
             </a:fld>
             <a:endParaRPr lang="en-US"/>
           </a:p>
@@ -3517,7 +3517,7 @@
           <a:p>
             <a:fld id="{91D75FF1-919D-4037-93C8-1AE086EC194D}" type="datetime1">
               <a:rPr lang="en-US" smtClean="0"/>
-              <a:t>9/5/2023</a:t>
+              <a:t>9/11/2023</a:t>
             </a:fld>
             <a:endParaRPr lang="en-US"/>
           </a:p>
@@ -23382,6 +23382,36 @@
           <a:chExt cx="0" cy="0"/>
         </a:xfrm>
       </p:grpSpPr>
+      <p:pic>
+        <p:nvPicPr>
+          <p:cNvPr id="5" name="Picture 4">
+            <a:extLst>
+              <a:ext uri="{FF2B5EF4-FFF2-40B4-BE49-F238E27FC236}">
+                <a16:creationId xmlns:a16="http://schemas.microsoft.com/office/drawing/2014/main" id="{78BAC438-5076-7355-4F59-6C93117ADF1E}"/>
+              </a:ext>
+            </a:extLst>
+          </p:cNvPr>
+          <p:cNvPicPr>
+            <a:picLocks noChangeAspect="1"/>
+          </p:cNvPicPr>
+          <p:nvPr/>
+        </p:nvPicPr>
+        <p:blipFill>
+          <a:blip r:embed="rId2"/>
+          <a:stretch>
+            <a:fillRect/>
+          </a:stretch>
+        </p:blipFill>
+        <p:spPr>
+          <a:xfrm>
+            <a:off x="2988585" y="1690688"/>
+            <a:ext cx="5189982" cy="4653666"/>
+          </a:xfrm>
+          <a:prstGeom prst="rect">
+            <a:avLst/>
+          </a:prstGeom>
+        </p:spPr>
+      </p:pic>
       <p:sp>
         <p:nvSpPr>
           <p:cNvPr id="2" name="Title 1">
@@ -23417,36 +23447,6 @@
           </a:p>
         </p:txBody>
       </p:sp>
-      <p:pic>
-        <p:nvPicPr>
-          <p:cNvPr id="8" name="Picture 7">
-            <a:extLst>
-              <a:ext uri="{FF2B5EF4-FFF2-40B4-BE49-F238E27FC236}">
-                <a16:creationId xmlns:a16="http://schemas.microsoft.com/office/drawing/2014/main" id="{DC78D4D6-0722-A9A5-2404-7E1EA0BF2B3C}"/>
-              </a:ext>
-            </a:extLst>
-          </p:cNvPr>
-          <p:cNvPicPr>
-            <a:picLocks noChangeAspect="1"/>
-          </p:cNvPicPr>
-          <p:nvPr/>
-        </p:nvPicPr>
-        <p:blipFill>
-          <a:blip r:embed="rId2"/>
-          <a:stretch>
-            <a:fillRect/>
-          </a:stretch>
-        </p:blipFill>
-        <p:spPr>
-          <a:xfrm>
-            <a:off x="3325915" y="1476611"/>
-            <a:ext cx="5540170" cy="5016264"/>
-          </a:xfrm>
-          <a:prstGeom prst="rect">
-            <a:avLst/>
-          </a:prstGeom>
-        </p:spPr>
-      </p:pic>
       <p:sp>
         <p:nvSpPr>
           <p:cNvPr id="9" name="TextBox 8">
@@ -23461,8 +23461,8 @@
         </p:nvSpPr>
         <p:spPr>
           <a:xfrm>
-            <a:off x="9334500" y="2743200"/>
-            <a:ext cx="2438400" cy="2585323"/>
+            <a:off x="9109752" y="2184657"/>
+            <a:ext cx="2438400" cy="3416320"/>
           </a:xfrm>
           <a:prstGeom prst="rect">
             <a:avLst/>
@@ -23477,7 +23477,7 @@
           <a:p>
             <a:r>
               <a:rPr lang="en-US" dirty="0"/>
-              <a:t>We see that the lowest variance is at depth 2 with low prediction error. </a:t>
+              <a:t>We see that the low variance and low bias is between depth 2 - 7 with low prediction error. </a:t>
             </a:r>
           </a:p>
           <a:p>
@@ -23486,7 +23486,7 @@
           <a:p>
             <a:r>
               <a:rPr lang="en-US" dirty="0"/>
-              <a:t>While bias grows lower with increasing depth we will be in higher variance territory. </a:t>
+              <a:t>While bias grows lower with increasing depth &gt;7 we will be in higher variance territory and higher generalization error. </a:t>
             </a:r>
           </a:p>
         </p:txBody>
@@ -23564,7 +23564,7 @@
         </p:nvCxnSpPr>
         <p:spPr>
           <a:xfrm>
-            <a:off x="6229350" y="1811573"/>
+            <a:off x="4853556" y="1752867"/>
             <a:ext cx="0" cy="4337050"/>
           </a:xfrm>
           <a:prstGeom prst="line">
@@ -23606,7 +23606,7 @@
         </p:nvSpPr>
         <p:spPr>
           <a:xfrm>
-            <a:off x="6910716" y="3788120"/>
+            <a:off x="6757228" y="3066481"/>
             <a:ext cx="1040093" cy="461665"/>
           </a:xfrm>
           <a:prstGeom prst="rect">
@@ -23620,12 +23620,14 @@
           </a:bodyPr>
           <a:lstStyle/>
           <a:p>
+            <a:pPr algn="ctr"/>
             <a:r>
               <a:rPr lang="en-US" sz="1200" dirty="0"/>
               <a:t>Low Bias</a:t>
             </a:r>
           </a:p>
           <a:p>
+            <a:pPr algn="ctr"/>
             <a:r>
               <a:rPr lang="en-US" sz="1200" dirty="0"/>
               <a:t>High Variance</a:t>
@@ -23649,7 +23651,7 @@
         </p:nvCxnSpPr>
         <p:spPr>
           <a:xfrm>
-            <a:off x="4210050" y="1868723"/>
+            <a:off x="3808245" y="1752867"/>
             <a:ext cx="0" cy="4279900"/>
           </a:xfrm>
           <a:prstGeom prst="line">
@@ -23714,7 +23716,7 @@
         </p:blipFill>
         <p:spPr bwMode="auto">
           <a:xfrm>
-            <a:off x="3828985" y="2353863"/>
+            <a:off x="3833412" y="2353863"/>
             <a:ext cx="773431" cy="777240"/>
           </a:xfrm>
           <a:prstGeom prst="rect">
@@ -23745,8 +23747,8 @@
           <p:nvPr/>
         </p:nvSpPr>
         <p:spPr>
-          <a:xfrm rot="16200000">
-            <a:off x="3688677" y="3574044"/>
+          <a:xfrm>
+            <a:off x="3852843" y="3159511"/>
             <a:ext cx="1012265" cy="461665"/>
           </a:xfrm>
           <a:prstGeom prst="rect">
@@ -23760,6 +23762,7 @@
           </a:bodyPr>
           <a:lstStyle/>
           <a:p>
+            <a:pPr algn="ctr"/>
             <a:r>
               <a:rPr lang="en-US" sz="1200" dirty="0"/>
               <a:t>Low Bias</a:t>
@@ -23810,7 +23813,7 @@
         </p:blipFill>
         <p:spPr bwMode="auto">
           <a:xfrm>
-            <a:off x="3390587" y="5371383"/>
+            <a:off x="3028627" y="5022701"/>
             <a:ext cx="773431" cy="777240"/>
           </a:xfrm>
           <a:prstGeom prst="rect">
@@ -23842,7 +23845,7 @@
         </p:nvSpPr>
         <p:spPr>
           <a:xfrm>
-            <a:off x="2402125" y="5628252"/>
+            <a:off x="1897259" y="5180488"/>
             <a:ext cx="1040093" cy="461665"/>
           </a:xfrm>
           <a:prstGeom prst="rect">
@@ -23856,6 +23859,7 @@
           </a:bodyPr>
           <a:lstStyle/>
           <a:p>
+            <a:pPr algn="ctr"/>
             <a:r>
               <a:rPr lang="en-US" sz="1200" dirty="0"/>
               <a:t>High Bias</a:t>
@@ -23927,36 +23931,6 @@
           <a:chExt cx="0" cy="0"/>
         </a:xfrm>
       </p:grpSpPr>
-      <p:pic>
-        <p:nvPicPr>
-          <p:cNvPr id="9" name="Picture 8">
-            <a:extLst>
-              <a:ext uri="{FF2B5EF4-FFF2-40B4-BE49-F238E27FC236}">
-                <a16:creationId xmlns:a16="http://schemas.microsoft.com/office/drawing/2014/main" id="{21CC3873-2B26-C420-60DB-BE65AC9C9C55}"/>
-              </a:ext>
-            </a:extLst>
-          </p:cNvPr>
-          <p:cNvPicPr>
-            <a:picLocks noChangeAspect="1"/>
-          </p:cNvPicPr>
-          <p:nvPr/>
-        </p:nvPicPr>
-        <p:blipFill>
-          <a:blip r:embed="rId2"/>
-          <a:stretch>
-            <a:fillRect/>
-          </a:stretch>
-        </p:blipFill>
-        <p:spPr>
-          <a:xfrm>
-            <a:off x="9245619" y="3009251"/>
-            <a:ext cx="2732764" cy="2328508"/>
-          </a:xfrm>
-          <a:prstGeom prst="rect">
-            <a:avLst/>
-          </a:prstGeom>
-        </p:spPr>
-      </p:pic>
       <p:sp>
         <p:nvSpPr>
           <p:cNvPr id="2" name="Title 1">
@@ -23980,74 +23954,8 @@
           <a:p>
             <a:r>
               <a:rPr lang="en-US" dirty="0"/>
-              <a:t>Low Bias Low Variance Tree</a:t>
+              <a:t>Entropy Loss Optimized Depth 4 Tree on a Training Data</a:t>
             </a:r>
-          </a:p>
-        </p:txBody>
-      </p:sp>
-      <p:sp>
-        <p:nvSpPr>
-          <p:cNvPr id="11" name="TextBox 10">
-            <a:extLst>
-              <a:ext uri="{FF2B5EF4-FFF2-40B4-BE49-F238E27FC236}">
-                <a16:creationId xmlns:a16="http://schemas.microsoft.com/office/drawing/2014/main" id="{5F0E3E63-6D7D-43BF-E36B-8956F197CAA6}"/>
-              </a:ext>
-            </a:extLst>
-          </p:cNvPr>
-          <p:cNvSpPr txBox="1"/>
-          <p:nvPr/>
-        </p:nvSpPr>
-        <p:spPr>
-          <a:xfrm>
-            <a:off x="9245619" y="1667426"/>
-            <a:ext cx="3943350" cy="1200329"/>
-          </a:xfrm>
-          <a:prstGeom prst="rect">
-            <a:avLst/>
-          </a:prstGeom>
-          <a:noFill/>
-        </p:spPr>
-        <p:txBody>
-          <a:bodyPr wrap="square">
-            <a:spAutoFit/>
-          </a:bodyPr>
-          <a:lstStyle/>
-          <a:p>
-            <a:r>
-              <a:rPr lang="en-US" b="0" i="0" dirty="0">
-                <a:effectLst/>
-                <a:latin typeface="Consolas" panose="020B0609020204030204" pitchFamily="49" charset="0"/>
-              </a:rPr>
-              <a:t>Accuracy 	- 74.35 </a:t>
-            </a:r>
-          </a:p>
-          <a:p>
-            <a:r>
-              <a:rPr lang="en-US" b="0" i="0" dirty="0">
-                <a:effectLst/>
-                <a:latin typeface="Consolas" panose="020B0609020204030204" pitchFamily="49" charset="0"/>
-              </a:rPr>
-              <a:t>Recall 		- 69.70 </a:t>
-            </a:r>
-          </a:p>
-          <a:p>
-            <a:r>
-              <a:rPr lang="en-US" b="0" i="0" dirty="0">
-                <a:effectLst/>
-                <a:latin typeface="Consolas" panose="020B0609020204030204" pitchFamily="49" charset="0"/>
-              </a:rPr>
-              <a:t>Precision 	- 54.12 </a:t>
-            </a:r>
-          </a:p>
-          <a:p>
-            <a:r>
-              <a:rPr lang="en-US" b="0" i="0" dirty="0">
-                <a:effectLst/>
-                <a:latin typeface="Consolas" panose="020B0609020204030204" pitchFamily="49" charset="0"/>
-              </a:rPr>
-              <a:t>FPR 		- 23.78</a:t>
-            </a:r>
-            <a:endParaRPr lang="en-US" dirty="0"/>
           </a:p>
         </p:txBody>
       </p:sp>
@@ -24079,1054 +23987,369 @@
           </a:p>
         </p:txBody>
       </p:sp>
-      <p:grpSp>
-        <p:nvGrpSpPr>
-          <p:cNvPr id="16" name="Group 15">
+      <p:pic>
+        <p:nvPicPr>
+          <p:cNvPr id="1829" name="Picture 1828">
             <a:extLst>
               <a:ext uri="{FF2B5EF4-FFF2-40B4-BE49-F238E27FC236}">
-                <a16:creationId xmlns:a16="http://schemas.microsoft.com/office/drawing/2014/main" id="{623951DE-4257-F702-96FC-1E676E64FE83}"/>
+                <a16:creationId xmlns:a16="http://schemas.microsoft.com/office/drawing/2014/main" id="{697AE9DD-C055-F6B8-A557-0CE5B051E2A0}"/>
               </a:ext>
             </a:extLst>
           </p:cNvPr>
-          <p:cNvGrpSpPr/>
+          <p:cNvPicPr>
+            <a:picLocks noChangeAspect="1"/>
+          </p:cNvPicPr>
           <p:nvPr/>
-        </p:nvGrpSpPr>
-        <p:grpSpPr>
+        </p:nvPicPr>
+        <p:blipFill>
+          <a:blip r:embed="rId2">
+            <a:clrChange>
+              <a:clrFrom>
+                <a:srgbClr val="FFFFFF"/>
+              </a:clrFrom>
+              <a:clrTo>
+                <a:srgbClr val="FFFFFF">
+                  <a:alpha val="0"/>
+                </a:srgbClr>
+              </a:clrTo>
+            </a:clrChange>
+            <a:extLst>
+              <a:ext uri="{28A0092B-C50C-407E-A947-70E740481C1C}">
+                <a14:useLocalDpi xmlns:a14="http://schemas.microsoft.com/office/drawing/2010/main" val="0"/>
+              </a:ext>
+            </a:extLst>
+          </a:blip>
+          <a:stretch>
+            <a:fillRect/>
+          </a:stretch>
+        </p:blipFill>
+        <p:spPr>
           <a:xfrm>
-            <a:off x="838200" y="1705072"/>
-            <a:ext cx="8997598" cy="4300120"/>
-            <a:chOff x="-1756209" y="1366391"/>
-            <a:chExt cx="8997598" cy="4300120"/>
+            <a:off x="0" y="1966624"/>
+            <a:ext cx="12192000" cy="4113790"/>
           </a:xfrm>
-        </p:grpSpPr>
-        <mc:AlternateContent xmlns:mc="http://schemas.openxmlformats.org/markup-compatibility/2006">
-          <mc:Choice xmlns:a14="http://schemas.microsoft.com/office/drawing/2010/main" Requires="a14">
-            <p:sp>
-              <p:nvSpPr>
-                <p:cNvPr id="4" name="TextBox 3">
+          <a:prstGeom prst="rect">
+            <a:avLst/>
+          </a:prstGeom>
+        </p:spPr>
+      </p:pic>
+      <p:graphicFrame>
+        <p:nvGraphicFramePr>
+          <p:cNvPr id="1832" name="Table 1832">
+            <a:extLst>
+              <a:ext uri="{FF2B5EF4-FFF2-40B4-BE49-F238E27FC236}">
+                <a16:creationId xmlns:a16="http://schemas.microsoft.com/office/drawing/2014/main" id="{6D88EA68-71AA-A277-E605-19BCDE0202AB}"/>
+              </a:ext>
+            </a:extLst>
+          </p:cNvPr>
+          <p:cNvGraphicFramePr>
+            <a:graphicFrameLocks noGrp="1"/>
+          </p:cNvGraphicFramePr>
+          <p:nvPr>
+            <p:extLst>
+              <p:ext uri="{D42A27DB-BD31-4B8C-83A1-F6EECF244321}">
+                <p14:modId xmlns:p14="http://schemas.microsoft.com/office/powerpoint/2010/main" val="1600549559"/>
+              </p:ext>
+            </p:extLst>
+          </p:nvPr>
+        </p:nvGraphicFramePr>
+        <p:xfrm>
+          <a:off x="9199844" y="1549098"/>
+          <a:ext cx="2558486" cy="1472215"/>
+        </p:xfrm>
+        <a:graphic>
+          <a:graphicData uri="http://schemas.openxmlformats.org/drawingml/2006/table">
+            <a:tbl>
+              <a:tblPr firstRow="1" bandRow="1">
+                <a:tableStyleId>{5C22544A-7EE6-4342-B048-85BDC9FD1C3A}</a:tableStyleId>
+              </a:tblPr>
+              <a:tblGrid>
+                <a:gridCol w="1279243">
                   <a:extLst>
-                    <a:ext uri="{FF2B5EF4-FFF2-40B4-BE49-F238E27FC236}">
-                      <a16:creationId xmlns:a16="http://schemas.microsoft.com/office/drawing/2014/main" id="{53634838-459F-7A46-D2E4-3C0DF67EA9FB}"/>
+                    <a:ext uri="{9D8B030D-6E8A-4147-A177-3AD203B41FA5}">
+                      <a16:colId xmlns:a16="http://schemas.microsoft.com/office/drawing/2014/main" val="3757442658"/>
                     </a:ext>
                   </a:extLst>
-                </p:cNvPr>
-                <p:cNvSpPr txBox="1"/>
-                <p:nvPr/>
-              </p:nvSpPr>
-              <p:spPr>
-                <a:xfrm>
-                  <a:off x="1640917" y="1366391"/>
-                  <a:ext cx="1906548" cy="646331"/>
-                </a:xfrm>
-                <a:prstGeom prst="rect">
-                  <a:avLst/>
-                </a:prstGeom>
-                <a:ln w="19050"/>
-              </p:spPr>
-              <p:style>
-                <a:lnRef idx="2">
-                  <a:schemeClr val="accent1"/>
-                </a:lnRef>
-                <a:fillRef idx="1">
-                  <a:schemeClr val="lt1"/>
-                </a:fillRef>
-                <a:effectRef idx="0">
-                  <a:schemeClr val="accent1"/>
-                </a:effectRef>
-                <a:fontRef idx="minor">
-                  <a:schemeClr val="dk1"/>
-                </a:fontRef>
-              </p:style>
-              <p:txBody>
-                <a:bodyPr wrap="none" rtlCol="0">
-                  <a:spAutoFit/>
-                </a:bodyPr>
-                <a:lstStyle/>
-                <a:p>
-                  <a:pPr/>
-                  <a14:m>
-                    <m:oMathPara xmlns:m="http://schemas.openxmlformats.org/officeDocument/2006/math">
-                      <m:oMathParaPr>
-                        <m:jc m:val="centerGroup"/>
-                      </m:oMathParaPr>
-                      <m:oMath xmlns:m="http://schemas.openxmlformats.org/officeDocument/2006/math">
-                        <m:r>
-                          <a:rPr lang="en-US" b="0" i="1" dirty="0" smtClean="0">
-                            <a:latin typeface="Cambria Math" panose="02040503050406030204" pitchFamily="18" charset="0"/>
-                          </a:rPr>
-                          <m:t>𝐺𝑙𝑢𝑐𝑜𝑠𝑒</m:t>
-                        </m:r>
-                        <m:r>
-                          <a:rPr lang="en-US" i="1" dirty="0" smtClean="0">
-                            <a:latin typeface="Cambria Math" panose="02040503050406030204" pitchFamily="18" charset="0"/>
-                          </a:rPr>
-                          <m:t>≤</m:t>
-                        </m:r>
-                        <m:r>
-                          <a:rPr lang="en-US" b="0" i="1" dirty="0" smtClean="0">
-                            <a:latin typeface="Cambria Math" panose="02040503050406030204" pitchFamily="18" charset="0"/>
-                          </a:rPr>
-                          <m:t>1</m:t>
-                        </m:r>
-                        <m:r>
-                          <a:rPr lang="en-US" i="1" dirty="0" smtClean="0">
-                            <a:latin typeface="Cambria Math" panose="02040503050406030204" pitchFamily="18" charset="0"/>
-                          </a:rPr>
-                          <m:t>2</m:t>
-                        </m:r>
-                        <m:r>
-                          <a:rPr lang="en-US" b="0" i="1" dirty="0" smtClean="0">
-                            <a:latin typeface="Cambria Math" panose="02040503050406030204" pitchFamily="18" charset="0"/>
-                          </a:rPr>
-                          <m:t>3</m:t>
-                        </m:r>
-                        <m:r>
-                          <a:rPr lang="en-US" i="1" dirty="0" smtClean="0">
-                            <a:latin typeface="Cambria Math" panose="02040503050406030204" pitchFamily="18" charset="0"/>
-                          </a:rPr>
-                          <m:t>.5</m:t>
-                        </m:r>
-                      </m:oMath>
-                    </m:oMathPara>
-                  </a14:m>
-                  <a:endParaRPr lang="en-US" dirty="0"/>
-                </a:p>
-                <a:p>
-                  <a:pPr/>
-                  <a14:m>
-                    <m:oMathPara xmlns:m="http://schemas.openxmlformats.org/officeDocument/2006/math">
-                      <m:oMathParaPr>
-                        <m:jc m:val="centerGroup"/>
-                      </m:oMathParaPr>
-                      <m:oMath xmlns:m="http://schemas.openxmlformats.org/officeDocument/2006/math">
-                        <m:r>
-                          <a:rPr lang="en-US" i="1" dirty="0" smtClean="0">
-                            <a:latin typeface="Cambria Math" panose="02040503050406030204" pitchFamily="18" charset="0"/>
-                          </a:rPr>
-                          <m:t>𝐸𝑛𝑡𝑟𝑜𝑝𝑦</m:t>
-                        </m:r>
-                        <m:r>
-                          <a:rPr lang="en-US" i="1" dirty="0" smtClean="0">
-                            <a:latin typeface="Cambria Math" panose="02040503050406030204" pitchFamily="18" charset="0"/>
-                          </a:rPr>
-                          <m:t> =1.0</m:t>
-                        </m:r>
-                      </m:oMath>
-                    </m:oMathPara>
-                  </a14:m>
-                  <a:endParaRPr lang="en-US" dirty="0"/>
-                </a:p>
-              </p:txBody>
-            </p:sp>
-          </mc:Choice>
-          <mc:Fallback>
-            <p:sp>
-              <p:nvSpPr>
-                <p:cNvPr id="4" name="TextBox 3">
+                </a:gridCol>
+                <a:gridCol w="1279243">
                   <a:extLst>
-                    <a:ext uri="{FF2B5EF4-FFF2-40B4-BE49-F238E27FC236}">
-                      <a16:creationId xmlns:a16="http://schemas.microsoft.com/office/drawing/2014/main" id="{53634838-459F-7A46-D2E4-3C0DF67EA9FB}"/>
+                    <a:ext uri="{9D8B030D-6E8A-4147-A177-3AD203B41FA5}">
+                      <a16:colId xmlns:a16="http://schemas.microsoft.com/office/drawing/2014/main" val="216245063"/>
                     </a:ext>
                   </a:extLst>
-                </p:cNvPr>
-                <p:cNvSpPr txBox="1">
-                  <a:spLocks noRot="1" noChangeAspect="1" noMove="1" noResize="1" noEditPoints="1" noAdjustHandles="1" noChangeArrowheads="1" noChangeShapeType="1" noTextEdit="1"/>
-                </p:cNvSpPr>
-                <p:nvPr/>
-              </p:nvSpPr>
-              <p:spPr>
-                <a:xfrm>
-                  <a:off x="1640917" y="1366391"/>
-                  <a:ext cx="1906548" cy="646331"/>
-                </a:xfrm>
-                <a:prstGeom prst="rect">
-                  <a:avLst/>
-                </a:prstGeom>
-                <a:blipFill>
-                  <a:blip r:embed="rId3"/>
-                  <a:stretch>
-                    <a:fillRect b="-4587"/>
-                  </a:stretch>
-                </a:blipFill>
-                <a:ln w="19050"/>
-              </p:spPr>
-              <p:txBody>
-                <a:bodyPr/>
-                <a:lstStyle/>
-                <a:p>
-                  <a:r>
-                    <a:rPr lang="en-AU">
-                      <a:noFill/>
-                    </a:rPr>
-                    <a:t> </a:t>
-                  </a:r>
-                </a:p>
-              </p:txBody>
-            </p:sp>
-          </mc:Fallback>
-        </mc:AlternateContent>
-        <mc:AlternateContent xmlns:mc="http://schemas.openxmlformats.org/markup-compatibility/2006">
-          <mc:Choice xmlns:a14="http://schemas.microsoft.com/office/drawing/2010/main" Requires="a14">
-            <p:sp>
-              <p:nvSpPr>
-                <p:cNvPr id="5" name="TextBox 4">
-                  <a:extLst>
-                    <a:ext uri="{FF2B5EF4-FFF2-40B4-BE49-F238E27FC236}">
-                      <a16:creationId xmlns:a16="http://schemas.microsoft.com/office/drawing/2014/main" id="{A8770969-E353-3CA4-2EA3-1A3A20A82E76}"/>
-                    </a:ext>
-                  </a:extLst>
-                </p:cNvPr>
-                <p:cNvSpPr txBox="1"/>
-                <p:nvPr/>
-              </p:nvSpPr>
-              <p:spPr>
-                <a:xfrm>
-                  <a:off x="-750206" y="3328419"/>
-                  <a:ext cx="1859420" cy="646331"/>
-                </a:xfrm>
-                <a:prstGeom prst="rect">
-                  <a:avLst/>
-                </a:prstGeom>
-                <a:ln w="19050"/>
-              </p:spPr>
-              <p:style>
-                <a:lnRef idx="2">
-                  <a:schemeClr val="accent1"/>
-                </a:lnRef>
-                <a:fillRef idx="1">
-                  <a:schemeClr val="lt1"/>
-                </a:fillRef>
-                <a:effectRef idx="0">
-                  <a:schemeClr val="accent1"/>
-                </a:effectRef>
-                <a:fontRef idx="minor">
-                  <a:schemeClr val="dk1"/>
-                </a:fontRef>
-              </p:style>
-              <p:txBody>
-                <a:bodyPr wrap="none" rtlCol="0">
-                  <a:spAutoFit/>
-                </a:bodyPr>
-                <a:lstStyle/>
-                <a:p>
-                  <a:pPr/>
-                  <a14:m>
-                    <m:oMathPara xmlns:m="http://schemas.openxmlformats.org/officeDocument/2006/math">
-                      <m:oMathParaPr>
-                        <m:jc m:val="centerGroup"/>
-                      </m:oMathParaPr>
-                      <m:oMath xmlns:m="http://schemas.openxmlformats.org/officeDocument/2006/math">
-                        <m:r>
-                          <a:rPr lang="en-US" b="0" i="1" dirty="0" smtClean="0">
-                            <a:latin typeface="Cambria Math" panose="02040503050406030204" pitchFamily="18" charset="0"/>
-                          </a:rPr>
-                          <m:t>𝐵𝑀𝐼</m:t>
-                        </m:r>
-                        <m:r>
-                          <a:rPr lang="en-US" b="0" i="1" dirty="0" smtClean="0">
-                            <a:latin typeface="Cambria Math" panose="02040503050406030204" pitchFamily="18" charset="0"/>
-                          </a:rPr>
-                          <m:t>≤26.45</m:t>
-                        </m:r>
-                      </m:oMath>
-                    </m:oMathPara>
-                  </a14:m>
-                  <a:endParaRPr lang="en-US" b="0" i="1" dirty="0">
-                    <a:latin typeface="Cambria Math" panose="02040503050406030204" pitchFamily="18" charset="0"/>
-                  </a:endParaRPr>
-                </a:p>
-                <a:p>
-                  <a:r>
-                    <a:rPr lang="en-US" i="1" dirty="0">
-                      <a:latin typeface="Cambria Math" panose="02040503050406030204" pitchFamily="18" charset="0"/>
-                    </a:rPr>
-                    <a:t>Entropy = 0.872</a:t>
-                  </a:r>
-                </a:p>
-              </p:txBody>
-            </p:sp>
-          </mc:Choice>
-          <mc:Fallback>
-            <p:sp>
-              <p:nvSpPr>
-                <p:cNvPr id="5" name="TextBox 4">
-                  <a:extLst>
-                    <a:ext uri="{FF2B5EF4-FFF2-40B4-BE49-F238E27FC236}">
-                      <a16:creationId xmlns:a16="http://schemas.microsoft.com/office/drawing/2014/main" id="{A8770969-E353-3CA4-2EA3-1A3A20A82E76}"/>
-                    </a:ext>
-                  </a:extLst>
-                </p:cNvPr>
-                <p:cNvSpPr txBox="1">
-                  <a:spLocks noRot="1" noChangeAspect="1" noMove="1" noResize="1" noEditPoints="1" noAdjustHandles="1" noChangeArrowheads="1" noChangeShapeType="1" noTextEdit="1"/>
-                </p:cNvSpPr>
-                <p:nvPr/>
-              </p:nvSpPr>
-              <p:spPr>
-                <a:xfrm>
-                  <a:off x="-750206" y="3328419"/>
-                  <a:ext cx="1859420" cy="646331"/>
-                </a:xfrm>
-                <a:prstGeom prst="rect">
-                  <a:avLst/>
-                </a:prstGeom>
-                <a:blipFill>
-                  <a:blip r:embed="rId4"/>
-                  <a:stretch>
-                    <a:fillRect l="-2597" b="-11009"/>
-                  </a:stretch>
-                </a:blipFill>
-                <a:ln w="19050"/>
-              </p:spPr>
-              <p:txBody>
-                <a:bodyPr/>
-                <a:lstStyle/>
-                <a:p>
-                  <a:r>
-                    <a:rPr lang="en-AU">
-                      <a:noFill/>
-                    </a:rPr>
-                    <a:t> </a:t>
-                  </a:r>
-                </a:p>
-              </p:txBody>
-            </p:sp>
-          </mc:Fallback>
-        </mc:AlternateContent>
-        <mc:AlternateContent xmlns:mc="http://schemas.openxmlformats.org/markup-compatibility/2006">
-          <mc:Choice xmlns:a14="http://schemas.microsoft.com/office/drawing/2010/main" Requires="a14">
-            <p:sp>
-              <p:nvSpPr>
-                <p:cNvPr id="7" name="TextBox 6">
-                  <a:extLst>
-                    <a:ext uri="{FF2B5EF4-FFF2-40B4-BE49-F238E27FC236}">
-                      <a16:creationId xmlns:a16="http://schemas.microsoft.com/office/drawing/2014/main" id="{E50B4321-7BC9-0C9A-5769-7E95B40B37EC}"/>
-                    </a:ext>
-                  </a:extLst>
-                </p:cNvPr>
-                <p:cNvSpPr txBox="1"/>
-                <p:nvPr/>
-              </p:nvSpPr>
-              <p:spPr>
-                <a:xfrm>
-                  <a:off x="4232926" y="3328419"/>
-                  <a:ext cx="1963166" cy="646331"/>
-                </a:xfrm>
-                <a:prstGeom prst="rect">
-                  <a:avLst/>
-                </a:prstGeom>
-                <a:ln w="19050"/>
-              </p:spPr>
-              <p:style>
-                <a:lnRef idx="2">
-                  <a:schemeClr val="accent1"/>
-                </a:lnRef>
-                <a:fillRef idx="1">
-                  <a:schemeClr val="lt1"/>
-                </a:fillRef>
-                <a:effectRef idx="0">
-                  <a:schemeClr val="accent1"/>
-                </a:effectRef>
-                <a:fontRef idx="minor">
-                  <a:schemeClr val="dk1"/>
-                </a:fontRef>
-              </p:style>
-              <p:txBody>
-                <a:bodyPr wrap="none" rtlCol="0">
-                  <a:spAutoFit/>
-                </a:bodyPr>
-                <a:lstStyle/>
-                <a:p>
-                  <a:pPr/>
-                  <a14:m>
-                    <m:oMathPara xmlns:m="http://schemas.openxmlformats.org/officeDocument/2006/math">
-                      <m:oMathParaPr>
-                        <m:jc m:val="centerGroup"/>
-                      </m:oMathParaPr>
-                      <m:oMath xmlns:m="http://schemas.openxmlformats.org/officeDocument/2006/math">
-                        <m:r>
-                          <a:rPr lang="en-US" b="0" i="1" dirty="0" smtClean="0">
-                            <a:latin typeface="Cambria Math" panose="02040503050406030204" pitchFamily="18" charset="0"/>
-                          </a:rPr>
-                          <m:t>𝐺𝑙𝑢𝑐𝑜𝑠𝑒</m:t>
-                        </m:r>
-                        <m:r>
-                          <a:rPr lang="en-US" b="0" i="1" dirty="0" smtClean="0">
-                            <a:latin typeface="Cambria Math" panose="02040503050406030204" pitchFamily="18" charset="0"/>
-                          </a:rPr>
-                          <m:t>≤154.5</m:t>
-                        </m:r>
-                      </m:oMath>
-                    </m:oMathPara>
-                  </a14:m>
-                  <a:endParaRPr lang="en-US" dirty="0"/>
-                </a:p>
-                <a:p>
-                  <a:pPr/>
-                  <a14:m>
-                    <m:oMathPara xmlns:m="http://schemas.openxmlformats.org/officeDocument/2006/math">
-                      <m:oMathParaPr>
-                        <m:jc m:val="centerGroup"/>
-                      </m:oMathParaPr>
-                      <m:oMath xmlns:m="http://schemas.openxmlformats.org/officeDocument/2006/math">
-                        <m:r>
-                          <a:rPr lang="en-US" b="0" i="1" dirty="0" smtClean="0">
-                            <a:latin typeface="Cambria Math" panose="02040503050406030204" pitchFamily="18" charset="0"/>
-                          </a:rPr>
-                          <m:t>𝐸𝑛𝑡𝑟𝑜𝑝𝑦</m:t>
-                        </m:r>
-                        <m:r>
-                          <a:rPr lang="en-US" b="0" i="1" dirty="0" smtClean="0">
-                            <a:latin typeface="Cambria Math" panose="02040503050406030204" pitchFamily="18" charset="0"/>
-                          </a:rPr>
-                          <m:t>=0.865</m:t>
-                        </m:r>
-                      </m:oMath>
-                    </m:oMathPara>
-                  </a14:m>
-                  <a:endParaRPr lang="en-US" dirty="0"/>
-                </a:p>
-              </p:txBody>
-            </p:sp>
-          </mc:Choice>
-          <mc:Fallback>
-            <p:sp>
-              <p:nvSpPr>
-                <p:cNvPr id="7" name="TextBox 6">
-                  <a:extLst>
-                    <a:ext uri="{FF2B5EF4-FFF2-40B4-BE49-F238E27FC236}">
-                      <a16:creationId xmlns:a16="http://schemas.microsoft.com/office/drawing/2014/main" id="{E50B4321-7BC9-0C9A-5769-7E95B40B37EC}"/>
-                    </a:ext>
-                  </a:extLst>
-                </p:cNvPr>
-                <p:cNvSpPr txBox="1">
-                  <a:spLocks noRot="1" noChangeAspect="1" noMove="1" noResize="1" noEditPoints="1" noAdjustHandles="1" noChangeArrowheads="1" noChangeShapeType="1" noTextEdit="1"/>
-                </p:cNvSpPr>
-                <p:nvPr/>
-              </p:nvSpPr>
-              <p:spPr>
-                <a:xfrm>
-                  <a:off x="4232926" y="3328419"/>
-                  <a:ext cx="1963166" cy="646331"/>
-                </a:xfrm>
-                <a:prstGeom prst="rect">
-                  <a:avLst/>
-                </a:prstGeom>
-                <a:blipFill>
-                  <a:blip r:embed="rId5"/>
-                  <a:stretch>
-                    <a:fillRect b="-4587"/>
-                  </a:stretch>
-                </a:blipFill>
-                <a:ln w="19050"/>
-              </p:spPr>
-              <p:txBody>
-                <a:bodyPr/>
-                <a:lstStyle/>
-                <a:p>
-                  <a:r>
-                    <a:rPr lang="en-AU">
-                      <a:noFill/>
-                    </a:rPr>
-                    <a:t> </a:t>
-                  </a:r>
-                </a:p>
-              </p:txBody>
-            </p:sp>
-          </mc:Fallback>
-        </mc:AlternateContent>
-        <p:cxnSp>
-          <p:nvCxnSpPr>
-            <p:cNvPr id="8" name="Straight Arrow Connector 7">
-              <a:extLst>
-                <a:ext uri="{FF2B5EF4-FFF2-40B4-BE49-F238E27FC236}">
-                  <a16:creationId xmlns:a16="http://schemas.microsoft.com/office/drawing/2014/main" id="{E9DC2C04-5AFD-3D1C-73E6-218A7859CB55}"/>
-                </a:ext>
-              </a:extLst>
-            </p:cNvPr>
-            <p:cNvCxnSpPr>
-              <a:stCxn id="4" idx="2"/>
-              <a:endCxn id="5" idx="0"/>
-            </p:cNvCxnSpPr>
-            <p:nvPr/>
-          </p:nvCxnSpPr>
-          <p:spPr>
-            <a:xfrm flipH="1">
-              <a:off x="179504" y="2012722"/>
-              <a:ext cx="2414687" cy="1315697"/>
-            </a:xfrm>
-            <a:prstGeom prst="straightConnector1">
-              <a:avLst/>
-            </a:prstGeom>
-            <a:ln w="19050">
-              <a:tailEnd type="triangle"/>
-            </a:ln>
-          </p:spPr>
-          <p:style>
-            <a:lnRef idx="1">
-              <a:schemeClr val="accent1"/>
-            </a:lnRef>
-            <a:fillRef idx="0">
-              <a:schemeClr val="accent1"/>
-            </a:fillRef>
-            <a:effectRef idx="0">
-              <a:schemeClr val="accent1"/>
-            </a:effectRef>
-            <a:fontRef idx="minor">
-              <a:schemeClr val="tx1"/>
-            </a:fontRef>
-          </p:style>
-        </p:cxnSp>
-        <p:cxnSp>
-          <p:nvCxnSpPr>
-            <p:cNvPr id="10" name="Straight Arrow Connector 9">
-              <a:extLst>
-                <a:ext uri="{FF2B5EF4-FFF2-40B4-BE49-F238E27FC236}">
-                  <a16:creationId xmlns:a16="http://schemas.microsoft.com/office/drawing/2014/main" id="{A5DDBE92-E5D1-EC99-138E-CAB70E50438E}"/>
-                </a:ext>
-              </a:extLst>
-            </p:cNvPr>
-            <p:cNvCxnSpPr>
-              <a:stCxn id="4" idx="2"/>
-              <a:endCxn id="7" idx="0"/>
-            </p:cNvCxnSpPr>
-            <p:nvPr/>
-          </p:nvCxnSpPr>
-          <p:spPr>
-            <a:xfrm>
-              <a:off x="2594191" y="2012722"/>
-              <a:ext cx="2620318" cy="1315697"/>
-            </a:xfrm>
-            <a:prstGeom prst="straightConnector1">
-              <a:avLst/>
-            </a:prstGeom>
-            <a:ln w="19050">
-              <a:tailEnd type="triangle"/>
-            </a:ln>
-          </p:spPr>
-          <p:style>
-            <a:lnRef idx="1">
-              <a:schemeClr val="accent1"/>
-            </a:lnRef>
-            <a:fillRef idx="0">
-              <a:schemeClr val="accent1"/>
-            </a:fillRef>
-            <a:effectRef idx="0">
-              <a:schemeClr val="accent1"/>
-            </a:effectRef>
-            <a:fontRef idx="minor">
-              <a:schemeClr val="tx1"/>
-            </a:fontRef>
-          </p:style>
-        </p:cxnSp>
-        <p:sp>
-          <p:nvSpPr>
-            <p:cNvPr id="12" name="TextBox 11">
-              <a:extLst>
-                <a:ext uri="{FF2B5EF4-FFF2-40B4-BE49-F238E27FC236}">
-                  <a16:creationId xmlns:a16="http://schemas.microsoft.com/office/drawing/2014/main" id="{0F89A906-0768-6242-24DB-901A4B6EDB59}"/>
-                </a:ext>
-              </a:extLst>
-            </p:cNvPr>
-            <p:cNvSpPr txBox="1"/>
-            <p:nvPr/>
-          </p:nvSpPr>
-          <p:spPr>
-            <a:xfrm>
-              <a:off x="3298268" y="5280947"/>
-              <a:ext cx="1817742" cy="369332"/>
-            </a:xfrm>
-            <a:prstGeom prst="rect">
-              <a:avLst/>
-            </a:prstGeom>
-            <a:ln w="19050"/>
-          </p:spPr>
-          <p:style>
-            <a:lnRef idx="2">
-              <a:schemeClr val="accent1"/>
-            </a:lnRef>
-            <a:fillRef idx="1">
-              <a:schemeClr val="lt1"/>
-            </a:fillRef>
-            <a:effectRef idx="0">
-              <a:schemeClr val="accent1"/>
-            </a:effectRef>
-            <a:fontRef idx="minor">
-              <a:schemeClr val="dk1"/>
-            </a:fontRef>
-          </p:style>
-          <p:txBody>
-            <a:bodyPr wrap="none" rtlCol="0">
-              <a:spAutoFit/>
-            </a:bodyPr>
-            <a:lstStyle/>
-            <a:p>
-              <a:r>
-                <a:rPr lang="en-US" i="1" dirty="0">
-                  <a:latin typeface="Cambria Math" panose="02040503050406030204" pitchFamily="18" charset="0"/>
-                </a:rPr>
-                <a:t>Entropy = 0.974</a:t>
-              </a:r>
-            </a:p>
-          </p:txBody>
-        </p:sp>
-        <mc:AlternateContent xmlns:mc="http://schemas.openxmlformats.org/markup-compatibility/2006">
-          <mc:Choice xmlns:a14="http://schemas.microsoft.com/office/drawing/2010/main" Requires="a14">
-            <p:sp>
-              <p:nvSpPr>
-                <p:cNvPr id="13" name="TextBox 12">
-                  <a:extLst>
-                    <a:ext uri="{FF2B5EF4-FFF2-40B4-BE49-F238E27FC236}">
-                      <a16:creationId xmlns:a16="http://schemas.microsoft.com/office/drawing/2014/main" id="{0D183355-57BD-5E45-5D67-6ED37915B225}"/>
-                    </a:ext>
-                  </a:extLst>
-                </p:cNvPr>
-                <p:cNvSpPr txBox="1"/>
-                <p:nvPr/>
-              </p:nvSpPr>
-              <p:spPr>
-                <a:xfrm>
-                  <a:off x="5278223" y="5266204"/>
-                  <a:ext cx="1963166" cy="369332"/>
-                </a:xfrm>
-                <a:prstGeom prst="rect">
-                  <a:avLst/>
-                </a:prstGeom>
-                <a:ln w="19050"/>
-              </p:spPr>
-              <p:style>
-                <a:lnRef idx="2">
-                  <a:schemeClr val="accent1"/>
-                </a:lnRef>
-                <a:fillRef idx="1">
-                  <a:schemeClr val="lt1"/>
-                </a:fillRef>
-                <a:effectRef idx="0">
-                  <a:schemeClr val="accent1"/>
-                </a:effectRef>
-                <a:fontRef idx="minor">
-                  <a:schemeClr val="dk1"/>
-                </a:fontRef>
-              </p:style>
-              <p:txBody>
-                <a:bodyPr wrap="none" rtlCol="0">
-                  <a:spAutoFit/>
-                </a:bodyPr>
-                <a:lstStyle/>
-                <a:p>
-                  <a:pPr/>
-                  <a14:m>
-                    <m:oMathPara xmlns:m="http://schemas.openxmlformats.org/officeDocument/2006/math">
-                      <m:oMathParaPr>
-                        <m:jc m:val="centerGroup"/>
-                      </m:oMathParaPr>
-                      <m:oMath xmlns:m="http://schemas.openxmlformats.org/officeDocument/2006/math">
-                        <m:r>
-                          <a:rPr lang="en-US" b="0" i="1" dirty="0" smtClean="0">
-                            <a:latin typeface="Cambria Math" panose="02040503050406030204" pitchFamily="18" charset="0"/>
-                          </a:rPr>
-                          <m:t>𝐸𝑛𝑡𝑟𝑜𝑝𝑦</m:t>
-                        </m:r>
-                        <m:r>
-                          <a:rPr lang="en-US" b="0" i="1" dirty="0" smtClean="0">
-                            <a:latin typeface="Cambria Math" panose="02040503050406030204" pitchFamily="18" charset="0"/>
-                          </a:rPr>
-                          <m:t>=0.537</m:t>
-                        </m:r>
-                      </m:oMath>
-                    </m:oMathPara>
-                  </a14:m>
-                  <a:endParaRPr lang="en-US" dirty="0"/>
-                </a:p>
-              </p:txBody>
-            </p:sp>
-          </mc:Choice>
-          <mc:Fallback>
-            <p:sp>
-              <p:nvSpPr>
-                <p:cNvPr id="13" name="TextBox 12">
-                  <a:extLst>
-                    <a:ext uri="{FF2B5EF4-FFF2-40B4-BE49-F238E27FC236}">
-                      <a16:creationId xmlns:a16="http://schemas.microsoft.com/office/drawing/2014/main" id="{0D183355-57BD-5E45-5D67-6ED37915B225}"/>
-                    </a:ext>
-                  </a:extLst>
-                </p:cNvPr>
-                <p:cNvSpPr txBox="1">
-                  <a:spLocks noRot="1" noChangeAspect="1" noMove="1" noResize="1" noEditPoints="1" noAdjustHandles="1" noChangeArrowheads="1" noChangeShapeType="1" noTextEdit="1"/>
-                </p:cNvSpPr>
-                <p:nvPr/>
-              </p:nvSpPr>
-              <p:spPr>
-                <a:xfrm>
-                  <a:off x="5278223" y="5266204"/>
-                  <a:ext cx="1963166" cy="369332"/>
-                </a:xfrm>
-                <a:prstGeom prst="rect">
-                  <a:avLst/>
-                </a:prstGeom>
-                <a:blipFill>
-                  <a:blip r:embed="rId6"/>
-                  <a:stretch>
-                    <a:fillRect b="-7813"/>
-                  </a:stretch>
-                </a:blipFill>
-                <a:ln w="19050"/>
-              </p:spPr>
-              <p:txBody>
-                <a:bodyPr/>
-                <a:lstStyle/>
-                <a:p>
-                  <a:r>
-                    <a:rPr lang="en-AU">
-                      <a:noFill/>
-                    </a:rPr>
-                    <a:t> </a:t>
-                  </a:r>
-                </a:p>
-              </p:txBody>
-            </p:sp>
-          </mc:Fallback>
-        </mc:AlternateContent>
-        <p:cxnSp>
-          <p:nvCxnSpPr>
-            <p:cNvPr id="14" name="Straight Arrow Connector 13">
-              <a:extLst>
-                <a:ext uri="{FF2B5EF4-FFF2-40B4-BE49-F238E27FC236}">
-                  <a16:creationId xmlns:a16="http://schemas.microsoft.com/office/drawing/2014/main" id="{0C6167E6-E638-4DEA-5248-988B740A16E6}"/>
-                </a:ext>
-              </a:extLst>
-            </p:cNvPr>
-            <p:cNvCxnSpPr>
-              <a:cxnSpLocks/>
-              <a:stCxn id="7" idx="2"/>
-              <a:endCxn id="12" idx="0"/>
-            </p:cNvCxnSpPr>
-            <p:nvPr/>
-          </p:nvCxnSpPr>
-          <p:spPr>
-            <a:xfrm flipH="1">
-              <a:off x="4207139" y="3974750"/>
-              <a:ext cx="1007370" cy="1306197"/>
-            </a:xfrm>
-            <a:prstGeom prst="straightConnector1">
-              <a:avLst/>
-            </a:prstGeom>
-            <a:ln w="19050">
-              <a:tailEnd type="triangle"/>
-            </a:ln>
-          </p:spPr>
-          <p:style>
-            <a:lnRef idx="1">
-              <a:schemeClr val="accent1"/>
-            </a:lnRef>
-            <a:fillRef idx="0">
-              <a:schemeClr val="accent1"/>
-            </a:fillRef>
-            <a:effectRef idx="0">
-              <a:schemeClr val="accent1"/>
-            </a:effectRef>
-            <a:fontRef idx="minor">
-              <a:schemeClr val="tx1"/>
-            </a:fontRef>
-          </p:style>
-        </p:cxnSp>
-        <p:cxnSp>
-          <p:nvCxnSpPr>
-            <p:cNvPr id="15" name="Straight Arrow Connector 14">
-              <a:extLst>
-                <a:ext uri="{FF2B5EF4-FFF2-40B4-BE49-F238E27FC236}">
-                  <a16:creationId xmlns:a16="http://schemas.microsoft.com/office/drawing/2014/main" id="{3ACC5DDF-5A4B-9B63-2954-720DE65739EB}"/>
-                </a:ext>
-              </a:extLst>
-            </p:cNvPr>
-            <p:cNvCxnSpPr>
-              <a:cxnSpLocks/>
-              <a:stCxn id="7" idx="2"/>
-              <a:endCxn id="13" idx="0"/>
-            </p:cNvCxnSpPr>
-            <p:nvPr/>
-          </p:nvCxnSpPr>
-          <p:spPr>
-            <a:xfrm>
-              <a:off x="5214509" y="3974750"/>
-              <a:ext cx="1045297" cy="1291454"/>
-            </a:xfrm>
-            <a:prstGeom prst="straightConnector1">
-              <a:avLst/>
-            </a:prstGeom>
-            <a:ln w="19050">
-              <a:tailEnd type="triangle"/>
-            </a:ln>
-          </p:spPr>
-          <p:style>
-            <a:lnRef idx="1">
-              <a:schemeClr val="accent1"/>
-            </a:lnRef>
-            <a:fillRef idx="0">
-              <a:schemeClr val="accent1"/>
-            </a:fillRef>
-            <a:effectRef idx="0">
-              <a:schemeClr val="accent1"/>
-            </a:effectRef>
-            <a:fontRef idx="minor">
-              <a:schemeClr val="tx1"/>
-            </a:fontRef>
-          </p:style>
-        </p:cxnSp>
-        <p:sp>
-          <p:nvSpPr>
-            <p:cNvPr id="17" name="TextBox 16">
-              <a:extLst>
-                <a:ext uri="{FF2B5EF4-FFF2-40B4-BE49-F238E27FC236}">
-                  <a16:creationId xmlns:a16="http://schemas.microsoft.com/office/drawing/2014/main" id="{8EBCD9BF-37A8-8805-A1D9-053D3D1F74AB}"/>
-                </a:ext>
-              </a:extLst>
-            </p:cNvPr>
-            <p:cNvSpPr txBox="1"/>
-            <p:nvPr/>
-          </p:nvSpPr>
-          <p:spPr>
-            <a:xfrm>
-              <a:off x="-1756209" y="5297179"/>
-              <a:ext cx="1817742" cy="369332"/>
-            </a:xfrm>
-            <a:prstGeom prst="rect">
-              <a:avLst/>
-            </a:prstGeom>
-            <a:ln w="19050"/>
-          </p:spPr>
-          <p:style>
-            <a:lnRef idx="2">
-              <a:schemeClr val="accent1"/>
-            </a:lnRef>
-            <a:fillRef idx="1">
-              <a:schemeClr val="lt1"/>
-            </a:fillRef>
-            <a:effectRef idx="0">
-              <a:schemeClr val="accent1"/>
-            </a:effectRef>
-            <a:fontRef idx="minor">
-              <a:schemeClr val="dk1"/>
-            </a:fontRef>
-          </p:style>
-          <p:txBody>
-            <a:bodyPr wrap="none" rtlCol="0">
-              <a:spAutoFit/>
-            </a:bodyPr>
-            <a:lstStyle/>
-            <a:p>
-              <a:r>
-                <a:rPr lang="en-US" i="1" dirty="0">
-                  <a:latin typeface="Cambria Math" panose="02040503050406030204" pitchFamily="18" charset="0"/>
-                </a:rPr>
-                <a:t>Entropy = 0.144</a:t>
-              </a:r>
-            </a:p>
-          </p:txBody>
-        </p:sp>
-        <mc:AlternateContent xmlns:mc="http://schemas.openxmlformats.org/markup-compatibility/2006">
-          <mc:Choice xmlns:a14="http://schemas.microsoft.com/office/drawing/2010/main" Requires="a14">
-            <p:sp>
-              <p:nvSpPr>
-                <p:cNvPr id="18" name="TextBox 17">
-                  <a:extLst>
-                    <a:ext uri="{FF2B5EF4-FFF2-40B4-BE49-F238E27FC236}">
-                      <a16:creationId xmlns:a16="http://schemas.microsoft.com/office/drawing/2014/main" id="{FB2B96DE-8C80-9BC1-831D-EDBF98B0FBA5}"/>
-                    </a:ext>
-                  </a:extLst>
-                </p:cNvPr>
-                <p:cNvSpPr txBox="1"/>
-                <p:nvPr/>
-              </p:nvSpPr>
-              <p:spPr>
-                <a:xfrm>
-                  <a:off x="223746" y="5295237"/>
-                  <a:ext cx="1963166" cy="369332"/>
-                </a:xfrm>
-                <a:prstGeom prst="rect">
-                  <a:avLst/>
-                </a:prstGeom>
-                <a:ln w="19050"/>
-              </p:spPr>
-              <p:style>
-                <a:lnRef idx="2">
-                  <a:schemeClr val="accent1"/>
-                </a:lnRef>
-                <a:fillRef idx="1">
-                  <a:schemeClr val="lt1"/>
-                </a:fillRef>
-                <a:effectRef idx="0">
-                  <a:schemeClr val="accent1"/>
-                </a:effectRef>
-                <a:fontRef idx="minor">
-                  <a:schemeClr val="dk1"/>
-                </a:fontRef>
-              </p:style>
-              <p:txBody>
-                <a:bodyPr wrap="none" rtlCol="0">
-                  <a:spAutoFit/>
-                </a:bodyPr>
-                <a:lstStyle/>
-                <a:p>
-                  <a:pPr/>
-                  <a14:m>
-                    <m:oMathPara xmlns:m="http://schemas.openxmlformats.org/officeDocument/2006/math">
-                      <m:oMathParaPr>
-                        <m:jc m:val="centerGroup"/>
-                      </m:oMathParaPr>
-                      <m:oMath xmlns:m="http://schemas.openxmlformats.org/officeDocument/2006/math">
-                        <m:r>
-                          <a:rPr lang="en-US" b="0" i="1" dirty="0" smtClean="0">
-                            <a:latin typeface="Cambria Math" panose="02040503050406030204" pitchFamily="18" charset="0"/>
-                          </a:rPr>
-                          <m:t>𝐸𝑛𝑡𝑟𝑜𝑝𝑦</m:t>
-                        </m:r>
-                        <m:r>
-                          <a:rPr lang="en-US" b="0" i="1" dirty="0" smtClean="0">
-                            <a:latin typeface="Cambria Math" panose="02040503050406030204" pitchFamily="18" charset="0"/>
-                          </a:rPr>
-                          <m:t>=0.957</m:t>
-                        </m:r>
-                      </m:oMath>
-                    </m:oMathPara>
-                  </a14:m>
-                  <a:endParaRPr lang="en-US" dirty="0"/>
-                </a:p>
-              </p:txBody>
-            </p:sp>
-          </mc:Choice>
-          <mc:Fallback>
-            <p:sp>
-              <p:nvSpPr>
-                <p:cNvPr id="18" name="TextBox 17">
-                  <a:extLst>
-                    <a:ext uri="{FF2B5EF4-FFF2-40B4-BE49-F238E27FC236}">
-                      <a16:creationId xmlns:a16="http://schemas.microsoft.com/office/drawing/2014/main" id="{FB2B96DE-8C80-9BC1-831D-EDBF98B0FBA5}"/>
-                    </a:ext>
-                  </a:extLst>
-                </p:cNvPr>
-                <p:cNvSpPr txBox="1">
-                  <a:spLocks noRot="1" noChangeAspect="1" noMove="1" noResize="1" noEditPoints="1" noAdjustHandles="1" noChangeArrowheads="1" noChangeShapeType="1" noTextEdit="1"/>
-                </p:cNvSpPr>
-                <p:nvPr/>
-              </p:nvSpPr>
-              <p:spPr>
-                <a:xfrm>
-                  <a:off x="223746" y="5295237"/>
-                  <a:ext cx="1963166" cy="369332"/>
-                </a:xfrm>
-                <a:prstGeom prst="rect">
-                  <a:avLst/>
-                </a:prstGeom>
-                <a:blipFill>
-                  <a:blip r:embed="rId7"/>
-                  <a:stretch>
-                    <a:fillRect b="-7813"/>
-                  </a:stretch>
-                </a:blipFill>
-                <a:ln w="19050"/>
-              </p:spPr>
-              <p:txBody>
-                <a:bodyPr/>
-                <a:lstStyle/>
-                <a:p>
-                  <a:r>
-                    <a:rPr lang="en-AU">
-                      <a:noFill/>
-                    </a:rPr>
-                    <a:t> </a:t>
-                  </a:r>
-                </a:p>
-              </p:txBody>
-            </p:sp>
-          </mc:Fallback>
-        </mc:AlternateContent>
-        <p:cxnSp>
-          <p:nvCxnSpPr>
-            <p:cNvPr id="19" name="Straight Arrow Connector 18">
-              <a:extLst>
-                <a:ext uri="{FF2B5EF4-FFF2-40B4-BE49-F238E27FC236}">
-                  <a16:creationId xmlns:a16="http://schemas.microsoft.com/office/drawing/2014/main" id="{917B5954-D0FC-753A-7AEE-4A7D5DB20BD5}"/>
-                </a:ext>
-              </a:extLst>
-            </p:cNvPr>
-            <p:cNvCxnSpPr>
-              <a:cxnSpLocks/>
-              <a:stCxn id="5" idx="2"/>
-              <a:endCxn id="17" idx="0"/>
-            </p:cNvCxnSpPr>
-            <p:nvPr/>
-          </p:nvCxnSpPr>
-          <p:spPr>
-            <a:xfrm flipH="1">
-              <a:off x="-847338" y="3974750"/>
-              <a:ext cx="1026842" cy="1322429"/>
-            </a:xfrm>
-            <a:prstGeom prst="straightConnector1">
-              <a:avLst/>
-            </a:prstGeom>
-            <a:ln w="19050">
-              <a:tailEnd type="triangle"/>
-            </a:ln>
-          </p:spPr>
-          <p:style>
-            <a:lnRef idx="1">
-              <a:schemeClr val="accent1"/>
-            </a:lnRef>
-            <a:fillRef idx="0">
-              <a:schemeClr val="accent1"/>
-            </a:fillRef>
-            <a:effectRef idx="0">
-              <a:schemeClr val="accent1"/>
-            </a:effectRef>
-            <a:fontRef idx="minor">
-              <a:schemeClr val="tx1"/>
-            </a:fontRef>
-          </p:style>
-        </p:cxnSp>
-        <p:cxnSp>
-          <p:nvCxnSpPr>
-            <p:cNvPr id="20" name="Straight Arrow Connector 19">
-              <a:extLst>
-                <a:ext uri="{FF2B5EF4-FFF2-40B4-BE49-F238E27FC236}">
-                  <a16:creationId xmlns:a16="http://schemas.microsoft.com/office/drawing/2014/main" id="{BB933174-D4B6-02F1-9889-B4F44CAEAD0C}"/>
-                </a:ext>
-              </a:extLst>
-            </p:cNvPr>
-            <p:cNvCxnSpPr>
-              <a:cxnSpLocks/>
-              <a:stCxn id="5" idx="2"/>
-              <a:endCxn id="18" idx="0"/>
-            </p:cNvCxnSpPr>
-            <p:nvPr/>
-          </p:nvCxnSpPr>
-          <p:spPr>
-            <a:xfrm>
-              <a:off x="179504" y="3974750"/>
-              <a:ext cx="1025825" cy="1320487"/>
-            </a:xfrm>
-            <a:prstGeom prst="straightConnector1">
-              <a:avLst/>
-            </a:prstGeom>
-            <a:ln w="19050">
-              <a:tailEnd type="triangle"/>
-            </a:ln>
-          </p:spPr>
-          <p:style>
-            <a:lnRef idx="1">
-              <a:schemeClr val="accent1"/>
-            </a:lnRef>
-            <a:fillRef idx="0">
-              <a:schemeClr val="accent1"/>
-            </a:fillRef>
-            <a:effectRef idx="0">
-              <a:schemeClr val="accent1"/>
-            </a:effectRef>
-            <a:fontRef idx="minor">
-              <a:schemeClr val="tx1"/>
-            </a:fontRef>
-          </p:style>
-        </p:cxnSp>
-      </p:grpSp>
+                </a:gridCol>
+              </a:tblGrid>
+              <a:tr h="294443">
+                <a:tc>
+                  <a:txBody>
+                    <a:bodyPr/>
+                    <a:lstStyle/>
+                    <a:p>
+                      <a:r>
+                        <a:rPr lang="en-US" sz="1400" dirty="0"/>
+                        <a:t>Metrics</a:t>
+                      </a:r>
+                    </a:p>
+                  </a:txBody>
+                  <a:tcPr marL="73611" marR="73611" marT="36805" marB="36805"/>
+                </a:tc>
+                <a:tc>
+                  <a:txBody>
+                    <a:bodyPr/>
+                    <a:lstStyle/>
+                    <a:p>
+                      <a:r>
+                        <a:rPr lang="en-US" sz="1400" dirty="0"/>
+                        <a:t>Value on Test</a:t>
+                      </a:r>
+                    </a:p>
+                  </a:txBody>
+                  <a:tcPr marL="73611" marR="73611" marT="36805" marB="36805"/>
+                </a:tc>
+                <a:extLst>
+                  <a:ext uri="{0D108BD9-81ED-4DB2-BD59-A6C34878D82A}">
+                    <a16:rowId xmlns:a16="http://schemas.microsoft.com/office/drawing/2014/main" val="1139231213"/>
+                  </a:ext>
+                </a:extLst>
+              </a:tr>
+              <a:tr h="294443">
+                <a:tc>
+                  <a:txBody>
+                    <a:bodyPr/>
+                    <a:lstStyle/>
+                    <a:p>
+                      <a:r>
+                        <a:rPr lang="en-US" sz="1400" b="0" i="0" kern="1200" dirty="0">
+                          <a:solidFill>
+                            <a:schemeClr val="dk1"/>
+                          </a:solidFill>
+                          <a:effectLst/>
+                          <a:latin typeface="+mn-lt"/>
+                          <a:ea typeface="+mn-ea"/>
+                          <a:cs typeface="+mn-cs"/>
+                        </a:rPr>
+                        <a:t>Accuracy</a:t>
+                      </a:r>
+                      <a:endParaRPr lang="en-US" sz="1400" dirty="0"/>
+                    </a:p>
+                  </a:txBody>
+                  <a:tcPr marL="73611" marR="73611" marT="36805" marB="36805"/>
+                </a:tc>
+                <a:tc>
+                  <a:txBody>
+                    <a:bodyPr/>
+                    <a:lstStyle/>
+                    <a:p>
+                      <a:r>
+                        <a:rPr lang="en-US" sz="1400" b="0" i="0" kern="1200" dirty="0">
+                          <a:solidFill>
+                            <a:schemeClr val="dk1"/>
+                          </a:solidFill>
+                          <a:effectLst/>
+                          <a:latin typeface="+mn-lt"/>
+                          <a:ea typeface="+mn-ea"/>
+                          <a:cs typeface="+mn-cs"/>
+                        </a:rPr>
+                        <a:t>76.52</a:t>
+                      </a:r>
+                      <a:endParaRPr lang="en-US" sz="1400" dirty="0"/>
+                    </a:p>
+                  </a:txBody>
+                  <a:tcPr marL="73611" marR="73611" marT="36805" marB="36805"/>
+                </a:tc>
+                <a:extLst>
+                  <a:ext uri="{0D108BD9-81ED-4DB2-BD59-A6C34878D82A}">
+                    <a16:rowId xmlns:a16="http://schemas.microsoft.com/office/drawing/2014/main" val="171036476"/>
+                  </a:ext>
+                </a:extLst>
+              </a:tr>
+              <a:tr h="294443">
+                <a:tc>
+                  <a:txBody>
+                    <a:bodyPr/>
+                    <a:lstStyle/>
+                    <a:p>
+                      <a:r>
+                        <a:rPr lang="en-US" sz="1400" b="0" i="0" kern="1200" dirty="0">
+                          <a:solidFill>
+                            <a:schemeClr val="dk1"/>
+                          </a:solidFill>
+                          <a:effectLst/>
+                          <a:latin typeface="+mn-lt"/>
+                          <a:ea typeface="+mn-ea"/>
+                          <a:cs typeface="+mn-cs"/>
+                        </a:rPr>
+                        <a:t>Recall</a:t>
+                      </a:r>
+                      <a:endParaRPr lang="en-US" sz="1400" dirty="0"/>
+                    </a:p>
+                  </a:txBody>
+                  <a:tcPr marL="73611" marR="73611" marT="36805" marB="36805"/>
+                </a:tc>
+                <a:tc>
+                  <a:txBody>
+                    <a:bodyPr/>
+                    <a:lstStyle/>
+                    <a:p>
+                      <a:r>
+                        <a:rPr lang="en-US" sz="1400" dirty="0"/>
+                        <a:t>63.63</a:t>
+                      </a:r>
+                    </a:p>
+                  </a:txBody>
+                  <a:tcPr marL="73611" marR="73611" marT="36805" marB="36805"/>
+                </a:tc>
+                <a:extLst>
+                  <a:ext uri="{0D108BD9-81ED-4DB2-BD59-A6C34878D82A}">
+                    <a16:rowId xmlns:a16="http://schemas.microsoft.com/office/drawing/2014/main" val="692433044"/>
+                  </a:ext>
+                </a:extLst>
+              </a:tr>
+              <a:tr h="294443">
+                <a:tc>
+                  <a:txBody>
+                    <a:bodyPr/>
+                    <a:lstStyle/>
+                    <a:p>
+                      <a:r>
+                        <a:rPr lang="en-US" sz="1400" dirty="0"/>
+                        <a:t>Precision</a:t>
+                      </a:r>
+                    </a:p>
+                  </a:txBody>
+                  <a:tcPr marL="73611" marR="73611" marT="36805" marB="36805"/>
+                </a:tc>
+                <a:tc>
+                  <a:txBody>
+                    <a:bodyPr/>
+                    <a:lstStyle/>
+                    <a:p>
+                      <a:r>
+                        <a:rPr lang="en-US" sz="1400" dirty="0"/>
+                        <a:t>58.33</a:t>
+                      </a:r>
+                    </a:p>
+                  </a:txBody>
+                  <a:tcPr marL="73611" marR="73611" marT="36805" marB="36805"/>
+                </a:tc>
+                <a:extLst>
+                  <a:ext uri="{0D108BD9-81ED-4DB2-BD59-A6C34878D82A}">
+                    <a16:rowId xmlns:a16="http://schemas.microsoft.com/office/drawing/2014/main" val="197537275"/>
+                  </a:ext>
+                </a:extLst>
+              </a:tr>
+              <a:tr h="294443">
+                <a:tc>
+                  <a:txBody>
+                    <a:bodyPr/>
+                    <a:lstStyle/>
+                    <a:p>
+                      <a:r>
+                        <a:rPr lang="en-US" sz="1400" dirty="0"/>
+                        <a:t>FPR</a:t>
+                      </a:r>
+                    </a:p>
+                  </a:txBody>
+                  <a:tcPr marL="73611" marR="73611" marT="36805" marB="36805"/>
+                </a:tc>
+                <a:tc>
+                  <a:txBody>
+                    <a:bodyPr/>
+                    <a:lstStyle/>
+                    <a:p>
+                      <a:r>
+                        <a:rPr lang="en-US" sz="1400" dirty="0"/>
+                        <a:t>18.29</a:t>
+                      </a:r>
+                    </a:p>
+                  </a:txBody>
+                  <a:tcPr marL="73611" marR="73611" marT="36805" marB="36805"/>
+                </a:tc>
+                <a:extLst>
+                  <a:ext uri="{0D108BD9-81ED-4DB2-BD59-A6C34878D82A}">
+                    <a16:rowId xmlns:a16="http://schemas.microsoft.com/office/drawing/2014/main" val="2580739939"/>
+                  </a:ext>
+                </a:extLst>
+              </a:tr>
+            </a:tbl>
+          </a:graphicData>
+        </a:graphic>
+      </p:graphicFrame>
+      <p:pic>
+        <p:nvPicPr>
+          <p:cNvPr id="1836" name="Picture 1835">
+            <a:extLst>
+              <a:ext uri="{FF2B5EF4-FFF2-40B4-BE49-F238E27FC236}">
+                <a16:creationId xmlns:a16="http://schemas.microsoft.com/office/drawing/2014/main" id="{3285A726-4DB9-A94B-274C-C71201CB2E5F}"/>
+              </a:ext>
+            </a:extLst>
+          </p:cNvPr>
+          <p:cNvPicPr>
+            <a:picLocks noChangeAspect="1"/>
+          </p:cNvPicPr>
+          <p:nvPr/>
+        </p:nvPicPr>
+        <p:blipFill rotWithShape="1">
+          <a:blip r:embed="rId3">
+            <a:clrChange>
+              <a:clrFrom>
+                <a:srgbClr val="FFFFFF"/>
+              </a:clrFrom>
+              <a:clrTo>
+                <a:srgbClr val="FFFFFF">
+                  <a:alpha val="0"/>
+                </a:srgbClr>
+              </a:clrTo>
+            </a:clrChange>
+          </a:blip>
+          <a:srcRect r="18447"/>
+          <a:stretch/>
+        </p:blipFill>
+        <p:spPr>
+          <a:xfrm>
+            <a:off x="433670" y="1395124"/>
+            <a:ext cx="1601494" cy="1780164"/>
+          </a:xfrm>
+          <a:prstGeom prst="rect">
+            <a:avLst/>
+          </a:prstGeom>
+        </p:spPr>
+      </p:pic>
+      <p:sp>
+        <p:nvSpPr>
+          <p:cNvPr id="1837" name="TextBox 1836">
+            <a:extLst>
+              <a:ext uri="{FF2B5EF4-FFF2-40B4-BE49-F238E27FC236}">
+                <a16:creationId xmlns:a16="http://schemas.microsoft.com/office/drawing/2014/main" id="{A0473C21-E87F-0DF2-B13F-3A90DA4495D1}"/>
+              </a:ext>
+            </a:extLst>
+          </p:cNvPr>
+          <p:cNvSpPr txBox="1"/>
+          <p:nvPr/>
+        </p:nvSpPr>
+        <p:spPr>
+          <a:xfrm>
+            <a:off x="2035164" y="2057464"/>
+            <a:ext cx="2221185" cy="369332"/>
+          </a:xfrm>
+          <a:prstGeom prst="rect">
+            <a:avLst/>
+          </a:prstGeom>
+          <a:noFill/>
+        </p:spPr>
+        <p:txBody>
+          <a:bodyPr wrap="none" rtlCol="0">
+            <a:spAutoFit/>
+          </a:bodyPr>
+          <a:lstStyle/>
+          <a:p>
+            <a:r>
+              <a:rPr lang="en-US" dirty="0"/>
+              <a:t>Test Confusion Matrix</a:t>
+            </a:r>
+          </a:p>
+        </p:txBody>
+      </p:sp>
     </p:spTree>
     <p:extLst>
       <p:ext uri="{BB962C8B-B14F-4D97-AF65-F5344CB8AC3E}">

</xml_diff>

<commit_message>
Add random forest basic silde
</commit_message>
<xml_diff>
--- a/Notes/Decision_Trees.pptx
+++ b/Notes/Decision_Trees.pptx
@@ -5,10 +5,10 @@
     <p:sldMasterId id="2147483648" r:id="rId1"/>
   </p:sldMasterIdLst>
   <p:notesMasterIdLst>
-    <p:notesMasterId r:id="rId31"/>
+    <p:notesMasterId r:id="rId33"/>
   </p:notesMasterIdLst>
   <p:handoutMasterIdLst>
-    <p:handoutMasterId r:id="rId32"/>
+    <p:handoutMasterId r:id="rId34"/>
   </p:handoutMasterIdLst>
   <p:sldIdLst>
     <p:sldId id="274" r:id="rId2"/>
@@ -40,6 +40,8 @@
     <p:sldId id="328" r:id="rId28"/>
     <p:sldId id="325" r:id="rId29"/>
     <p:sldId id="317" r:id="rId30"/>
+    <p:sldId id="329" r:id="rId31"/>
+    <p:sldId id="330" r:id="rId32"/>
   </p:sldIdLst>
   <p:sldSz cx="12192000" cy="6858000"/>
   <p:notesSz cx="6858000" cy="9144000"/>
@@ -243,7 +245,7 @@
           <a:p>
             <a:fld id="{0BFC49C2-91E2-4019-9562-07422A279DAF}" type="datetimeFigureOut">
               <a:rPr lang="en-US" smtClean="0"/>
-              <a:t>9/11/2023</a:t>
+              <a:t>9/14/2023</a:t>
             </a:fld>
             <a:endParaRPr lang="en-US"/>
           </a:p>
@@ -420,7 +422,7 @@
           <a:p>
             <a:fld id="{1FEA3286-221C-418A-ABA5-8CBD2C4A5B25}" type="datetimeFigureOut">
               <a:rPr lang="en-US" smtClean="0"/>
-              <a:t>9/11/2023</a:t>
+              <a:t>9/14/2023</a:t>
             </a:fld>
             <a:endParaRPr lang="en-US"/>
           </a:p>
@@ -834,7 +836,7 @@
           <a:p>
             <a:fld id="{C536D5AE-0547-4B22-9FF1-61DC50066B07}" type="datetime1">
               <a:rPr lang="en-US" smtClean="0"/>
-              <a:t>9/11/2023</a:t>
+              <a:t>9/14/2023</a:t>
             </a:fld>
             <a:endParaRPr lang="en-US"/>
           </a:p>
@@ -1035,7 +1037,7 @@
           <a:p>
             <a:fld id="{340B8BF2-BD8A-41AE-9C1D-EB089E94831C}" type="datetime1">
               <a:rPr lang="en-US" smtClean="0"/>
-              <a:t>9/11/2023</a:t>
+              <a:t>9/14/2023</a:t>
             </a:fld>
             <a:endParaRPr lang="en-US"/>
           </a:p>
@@ -1246,7 +1248,7 @@
           <a:p>
             <a:fld id="{3EFD6C31-EB7B-4A64-ABE1-F0AB246A850A}" type="datetime1">
               <a:rPr lang="en-US" smtClean="0"/>
-              <a:t>9/11/2023</a:t>
+              <a:t>9/14/2023</a:t>
             </a:fld>
             <a:endParaRPr lang="en-US"/>
           </a:p>
@@ -1447,7 +1449,7 @@
           <a:p>
             <a:fld id="{668B0DC0-B3F2-439A-9114-5F53D4377D45}" type="datetime1">
               <a:rPr lang="en-US" smtClean="0"/>
-              <a:t>9/11/2023</a:t>
+              <a:t>9/14/2023</a:t>
             </a:fld>
             <a:endParaRPr lang="en-US"/>
           </a:p>
@@ -1725,7 +1727,7 @@
           <a:p>
             <a:fld id="{320A5CD0-6878-49B6-96F5-F20F192C0B0C}" type="datetime1">
               <a:rPr lang="en-US" smtClean="0"/>
-              <a:t>9/11/2023</a:t>
+              <a:t>9/14/2023</a:t>
             </a:fld>
             <a:endParaRPr lang="en-US"/>
           </a:p>
@@ -1993,7 +1995,7 @@
           <a:p>
             <a:fld id="{0FA53E43-3A16-4047-B486-C7A15A332A3C}" type="datetime1">
               <a:rPr lang="en-US" smtClean="0"/>
-              <a:t>9/11/2023</a:t>
+              <a:t>9/14/2023</a:t>
             </a:fld>
             <a:endParaRPr lang="en-US"/>
           </a:p>
@@ -2408,7 +2410,7 @@
           <a:p>
             <a:fld id="{47026F2D-B854-4AB5-B7E3-3EA6EE97A89A}" type="datetime1">
               <a:rPr lang="en-US" smtClean="0"/>
-              <a:t>9/11/2023</a:t>
+              <a:t>9/14/2023</a:t>
             </a:fld>
             <a:endParaRPr lang="en-US"/>
           </a:p>
@@ -2552,7 +2554,7 @@
           <a:p>
             <a:fld id="{E9234E8A-3332-401A-B443-35F0A68A1277}" type="datetime1">
               <a:rPr lang="en-US" smtClean="0"/>
-              <a:t>9/11/2023</a:t>
+              <a:t>9/14/2023</a:t>
             </a:fld>
             <a:endParaRPr lang="en-US"/>
           </a:p>
@@ -2668,7 +2670,7 @@
           <a:p>
             <a:fld id="{ACF48743-21A8-4AA2-9F78-5E14E55EAB74}" type="datetime1">
               <a:rPr lang="en-US" smtClean="0"/>
-              <a:t>9/11/2023</a:t>
+              <a:t>9/14/2023</a:t>
             </a:fld>
             <a:endParaRPr lang="en-US"/>
           </a:p>
@@ -2982,7 +2984,7 @@
           <a:p>
             <a:fld id="{45C93320-C53B-4F9C-A839-A4EECC5AEF8C}" type="datetime1">
               <a:rPr lang="en-US" smtClean="0"/>
-              <a:t>9/11/2023</a:t>
+              <a:t>9/14/2023</a:t>
             </a:fld>
             <a:endParaRPr lang="en-US"/>
           </a:p>
@@ -3273,7 +3275,7 @@
           <a:p>
             <a:fld id="{F967DE46-3299-4D41-94F8-85A67C9B0629}" type="datetime1">
               <a:rPr lang="en-US" smtClean="0"/>
-              <a:t>9/11/2023</a:t>
+              <a:t>9/14/2023</a:t>
             </a:fld>
             <a:endParaRPr lang="en-US"/>
           </a:p>
@@ -3517,7 +3519,7 @@
           <a:p>
             <a:fld id="{91D75FF1-919D-4037-93C8-1AE086EC194D}" type="datetime1">
               <a:rPr lang="en-US" smtClean="0"/>
-              <a:t>9/11/2023</a:t>
+              <a:t>9/14/2023</a:t>
             </a:fld>
             <a:endParaRPr lang="en-US"/>
           </a:p>
@@ -25253,6 +25255,352 @@
 </p:sld>
 </file>
 
+<file path=ppt/slides/slide30.xml><?xml version="1.0" encoding="utf-8"?>
+<p:sld xmlns:a="http://schemas.openxmlformats.org/drawingml/2006/main" xmlns:r="http://schemas.openxmlformats.org/officeDocument/2006/relationships" xmlns:p="http://schemas.openxmlformats.org/presentationml/2006/main">
+  <p:cSld>
+    <p:spTree>
+      <p:nvGrpSpPr>
+        <p:cNvPr id="1" name=""/>
+        <p:cNvGrpSpPr/>
+        <p:nvPr/>
+      </p:nvGrpSpPr>
+      <p:grpSpPr>
+        <a:xfrm>
+          <a:off x="0" y="0"/>
+          <a:ext cx="0" cy="0"/>
+          <a:chOff x="0" y="0"/>
+          <a:chExt cx="0" cy="0"/>
+        </a:xfrm>
+      </p:grpSpPr>
+      <p:sp>
+        <p:nvSpPr>
+          <p:cNvPr id="2" name="Title 1">
+            <a:extLst>
+              <a:ext uri="{FF2B5EF4-FFF2-40B4-BE49-F238E27FC236}">
+                <a16:creationId xmlns:a16="http://schemas.microsoft.com/office/drawing/2014/main" id="{C5ED5F0E-02C1-CBB1-480A-FDB624B7534A}"/>
+              </a:ext>
+            </a:extLst>
+          </p:cNvPr>
+          <p:cNvSpPr>
+            <a:spLocks noGrp="1"/>
+          </p:cNvSpPr>
+          <p:nvPr>
+            <p:ph type="title"/>
+          </p:nvPr>
+        </p:nvSpPr>
+        <p:spPr/>
+        <p:txBody>
+          <a:bodyPr/>
+          <a:lstStyle/>
+          <a:p>
+            <a:r>
+              <a:rPr lang="en-GB" dirty="0"/>
+              <a:t>Random Forest</a:t>
+            </a:r>
+            <a:endParaRPr lang="en-IN" dirty="0"/>
+          </a:p>
+        </p:txBody>
+      </p:sp>
+      <p:sp>
+        <p:nvSpPr>
+          <p:cNvPr id="3" name="Content Placeholder 2">
+            <a:extLst>
+              <a:ext uri="{FF2B5EF4-FFF2-40B4-BE49-F238E27FC236}">
+                <a16:creationId xmlns:a16="http://schemas.microsoft.com/office/drawing/2014/main" id="{52DEED9B-2D55-5AF3-C677-46A27FA14E5F}"/>
+              </a:ext>
+            </a:extLst>
+          </p:cNvPr>
+          <p:cNvSpPr>
+            <a:spLocks noGrp="1"/>
+          </p:cNvSpPr>
+          <p:nvPr>
+            <p:ph sz="half" idx="1"/>
+          </p:nvPr>
+        </p:nvSpPr>
+        <p:spPr/>
+        <p:txBody>
+          <a:bodyPr>
+            <a:normAutofit fontScale="92500" lnSpcReduction="20000"/>
+          </a:bodyPr>
+          <a:lstStyle/>
+          <a:p>
+            <a:r>
+              <a:rPr lang="en-GB" dirty="0"/>
+              <a:t>It is an ensemble learning method that combines the predictions of multiple decision trees to improve the accuracy and robustness of the model.</a:t>
+            </a:r>
+          </a:p>
+          <a:p>
+            <a:r>
+              <a:rPr lang="en-GB" dirty="0"/>
+              <a:t>For classification tasks, Random Forest combines the predictions of individual trees through majority voting. </a:t>
+            </a:r>
+          </a:p>
+          <a:p>
+            <a:r>
+              <a:rPr lang="en-GB" dirty="0"/>
+              <a:t>For regression tasks, it takes the average of the predictions from all the trees. </a:t>
+            </a:r>
+            <a:endParaRPr lang="en-IN" dirty="0"/>
+          </a:p>
+        </p:txBody>
+      </p:sp>
+      <p:sp>
+        <p:nvSpPr>
+          <p:cNvPr id="4" name="Content Placeholder 3">
+            <a:extLst>
+              <a:ext uri="{FF2B5EF4-FFF2-40B4-BE49-F238E27FC236}">
+                <a16:creationId xmlns:a16="http://schemas.microsoft.com/office/drawing/2014/main" id="{2D32080D-7992-B560-E489-15A0359C80A0}"/>
+              </a:ext>
+            </a:extLst>
+          </p:cNvPr>
+          <p:cNvSpPr>
+            <a:spLocks noGrp="1"/>
+          </p:cNvSpPr>
+          <p:nvPr>
+            <p:ph sz="half" idx="2"/>
+          </p:nvPr>
+        </p:nvSpPr>
+        <p:spPr/>
+        <p:txBody>
+          <a:bodyPr>
+            <a:normAutofit fontScale="92500" lnSpcReduction="20000"/>
+          </a:bodyPr>
+          <a:lstStyle/>
+          <a:p>
+            <a:r>
+              <a:rPr lang="en-GB" dirty="0"/>
+              <a:t>Two level of randomness:</a:t>
+            </a:r>
+          </a:p>
+          <a:p>
+            <a:pPr lvl="1"/>
+            <a:r>
+              <a:rPr lang="en-GB" dirty="0"/>
+              <a:t>Bootstrapping (Random Sampling): </a:t>
+            </a:r>
+          </a:p>
+          <a:p>
+            <a:pPr lvl="2"/>
+            <a:r>
+              <a:rPr lang="en-GB" dirty="0"/>
+              <a:t>When building each decision tree in the forest, Random Forest randomly selects a subset of the training data with replacement. </a:t>
+            </a:r>
+          </a:p>
+          <a:p>
+            <a:pPr lvl="1"/>
+            <a:r>
+              <a:rPr lang="en-GB" dirty="0"/>
+              <a:t>Feature Randomness: </a:t>
+            </a:r>
+          </a:p>
+          <a:p>
+            <a:pPr lvl="2"/>
+            <a:r>
+              <a:rPr lang="en-GB" dirty="0"/>
+              <a:t>Instead of considering all features for splitting at each node, it randomly selects a subset of features. This helps in reducing the correlation between individual trees. </a:t>
+            </a:r>
+          </a:p>
+          <a:p>
+            <a:r>
+              <a:rPr lang="en-GB" dirty="0"/>
+              <a:t>Advantages:</a:t>
+            </a:r>
+          </a:p>
+          <a:p>
+            <a:pPr lvl="1"/>
+            <a:r>
+              <a:rPr lang="en-GB" dirty="0"/>
+              <a:t>Compare to single decision tree, it has high accuracy and low variance.</a:t>
+            </a:r>
+          </a:p>
+          <a:p>
+            <a:pPr marL="0" indent="0">
+              <a:buNone/>
+            </a:pPr>
+            <a:r>
+              <a:rPr lang="en-GB" dirty="0"/>
+              <a:t>		</a:t>
+            </a:r>
+            <a:endParaRPr lang="en-IN" dirty="0"/>
+          </a:p>
+        </p:txBody>
+      </p:sp>
+      <p:sp>
+        <p:nvSpPr>
+          <p:cNvPr id="5" name="Footer Placeholder 4">
+            <a:extLst>
+              <a:ext uri="{FF2B5EF4-FFF2-40B4-BE49-F238E27FC236}">
+                <a16:creationId xmlns:a16="http://schemas.microsoft.com/office/drawing/2014/main" id="{DF9F3998-C0D3-5E4C-C7AC-EC7BE5782312}"/>
+              </a:ext>
+            </a:extLst>
+          </p:cNvPr>
+          <p:cNvSpPr>
+            <a:spLocks noGrp="1"/>
+          </p:cNvSpPr>
+          <p:nvPr>
+            <p:ph type="ftr" sz="quarter" idx="11"/>
+          </p:nvPr>
+        </p:nvSpPr>
+        <p:spPr/>
+        <p:txBody>
+          <a:bodyPr/>
+          <a:lstStyle/>
+          <a:p>
+            <a:r>
+              <a:rPr lang="en-US"/>
+              <a:t>M. Meenakshi Sundaram, S. Ganesh</a:t>
+            </a:r>
+            <a:endParaRPr lang="en-US" dirty="0"/>
+          </a:p>
+        </p:txBody>
+      </p:sp>
+    </p:spTree>
+    <p:extLst>
+      <p:ext uri="{BB962C8B-B14F-4D97-AF65-F5344CB8AC3E}">
+        <p14:creationId xmlns:p14="http://schemas.microsoft.com/office/powerpoint/2010/main" val="1293926443"/>
+      </p:ext>
+    </p:extLst>
+  </p:cSld>
+  <p:clrMapOvr>
+    <a:masterClrMapping/>
+  </p:clrMapOvr>
+</p:sld>
+</file>
+
+<file path=ppt/slides/slide31.xml><?xml version="1.0" encoding="utf-8"?>
+<p:sld xmlns:a="http://schemas.openxmlformats.org/drawingml/2006/main" xmlns:r="http://schemas.openxmlformats.org/officeDocument/2006/relationships" xmlns:p="http://schemas.openxmlformats.org/presentationml/2006/main">
+  <p:cSld>
+    <p:spTree>
+      <p:nvGrpSpPr>
+        <p:cNvPr id="1" name=""/>
+        <p:cNvGrpSpPr/>
+        <p:nvPr/>
+      </p:nvGrpSpPr>
+      <p:grpSpPr>
+        <a:xfrm>
+          <a:off x="0" y="0"/>
+          <a:ext cx="0" cy="0"/>
+          <a:chOff x="0" y="0"/>
+          <a:chExt cx="0" cy="0"/>
+        </a:xfrm>
+      </p:grpSpPr>
+      <p:sp>
+        <p:nvSpPr>
+          <p:cNvPr id="2" name="Title 1">
+            <a:extLst>
+              <a:ext uri="{FF2B5EF4-FFF2-40B4-BE49-F238E27FC236}">
+                <a16:creationId xmlns:a16="http://schemas.microsoft.com/office/drawing/2014/main" id="{90DC0B50-A402-D291-90F8-3486078477C2}"/>
+              </a:ext>
+            </a:extLst>
+          </p:cNvPr>
+          <p:cNvSpPr>
+            <a:spLocks noGrp="1"/>
+          </p:cNvSpPr>
+          <p:nvPr>
+            <p:ph type="title"/>
+          </p:nvPr>
+        </p:nvSpPr>
+        <p:spPr/>
+        <p:txBody>
+          <a:bodyPr/>
+          <a:lstStyle/>
+          <a:p>
+            <a:endParaRPr lang="en-IN" dirty="0"/>
+          </a:p>
+        </p:txBody>
+      </p:sp>
+      <p:sp>
+        <p:nvSpPr>
+          <p:cNvPr id="3" name="Content Placeholder 2">
+            <a:extLst>
+              <a:ext uri="{FF2B5EF4-FFF2-40B4-BE49-F238E27FC236}">
+                <a16:creationId xmlns:a16="http://schemas.microsoft.com/office/drawing/2014/main" id="{FC905F5E-380D-DD90-6062-F6F3655F6DD0}"/>
+              </a:ext>
+            </a:extLst>
+          </p:cNvPr>
+          <p:cNvSpPr>
+            <a:spLocks noGrp="1"/>
+          </p:cNvSpPr>
+          <p:nvPr>
+            <p:ph sz="half" idx="1"/>
+          </p:nvPr>
+        </p:nvSpPr>
+        <p:spPr/>
+        <p:txBody>
+          <a:bodyPr/>
+          <a:lstStyle/>
+          <a:p>
+            <a:endParaRPr lang="en-IN"/>
+          </a:p>
+        </p:txBody>
+      </p:sp>
+      <p:sp>
+        <p:nvSpPr>
+          <p:cNvPr id="4" name="Content Placeholder 3">
+            <a:extLst>
+              <a:ext uri="{FF2B5EF4-FFF2-40B4-BE49-F238E27FC236}">
+                <a16:creationId xmlns:a16="http://schemas.microsoft.com/office/drawing/2014/main" id="{7247DB31-B911-6E47-CC69-E595813BA78C}"/>
+              </a:ext>
+            </a:extLst>
+          </p:cNvPr>
+          <p:cNvSpPr>
+            <a:spLocks noGrp="1"/>
+          </p:cNvSpPr>
+          <p:nvPr>
+            <p:ph sz="half" idx="2"/>
+          </p:nvPr>
+        </p:nvSpPr>
+        <p:spPr/>
+        <p:txBody>
+          <a:bodyPr/>
+          <a:lstStyle/>
+          <a:p>
+            <a:endParaRPr lang="en-IN"/>
+          </a:p>
+        </p:txBody>
+      </p:sp>
+      <p:sp>
+        <p:nvSpPr>
+          <p:cNvPr id="5" name="Footer Placeholder 4">
+            <a:extLst>
+              <a:ext uri="{FF2B5EF4-FFF2-40B4-BE49-F238E27FC236}">
+                <a16:creationId xmlns:a16="http://schemas.microsoft.com/office/drawing/2014/main" id="{AFB54E2B-A047-8A61-0F28-402CED7B5D32}"/>
+              </a:ext>
+            </a:extLst>
+          </p:cNvPr>
+          <p:cNvSpPr>
+            <a:spLocks noGrp="1"/>
+          </p:cNvSpPr>
+          <p:nvPr>
+            <p:ph type="ftr" sz="quarter" idx="11"/>
+          </p:nvPr>
+        </p:nvSpPr>
+        <p:spPr/>
+        <p:txBody>
+          <a:bodyPr/>
+          <a:lstStyle/>
+          <a:p>
+            <a:r>
+              <a:rPr lang="en-US"/>
+              <a:t>M. Meenakshi Sundaram, S. Ganesh</a:t>
+            </a:r>
+            <a:endParaRPr lang="en-US" dirty="0"/>
+          </a:p>
+        </p:txBody>
+      </p:sp>
+    </p:spTree>
+    <p:extLst>
+      <p:ext uri="{BB962C8B-B14F-4D97-AF65-F5344CB8AC3E}">
+        <p14:creationId xmlns:p14="http://schemas.microsoft.com/office/powerpoint/2010/main" val="3966015884"/>
+      </p:ext>
+    </p:extLst>
+  </p:cSld>
+  <p:clrMapOvr>
+    <a:masterClrMapping/>
+  </p:clrMapOvr>
+</p:sld>
+</file>
+
 <file path=ppt/slides/slide4.xml><?xml version="1.0" encoding="utf-8"?>
 <p:sld xmlns:a="http://schemas.openxmlformats.org/drawingml/2006/main" xmlns:r="http://schemas.openxmlformats.org/officeDocument/2006/relationships" xmlns:p="http://schemas.openxmlformats.org/presentationml/2006/main">
   <p:cSld>

</xml_diff>

<commit_message>
Guidance for completion of Basic Decision Trees PPT
</commit_message>
<xml_diff>
--- a/Notes/Decision_Trees.pptx
+++ b/Notes/Decision_Trees.pptx
@@ -5,10 +5,10 @@
     <p:sldMasterId id="2147483648" r:id="rId1"/>
   </p:sldMasterIdLst>
   <p:notesMasterIdLst>
-    <p:notesMasterId r:id="rId33"/>
+    <p:notesMasterId r:id="rId35"/>
   </p:notesMasterIdLst>
   <p:handoutMasterIdLst>
-    <p:handoutMasterId r:id="rId34"/>
+    <p:handoutMasterId r:id="rId36"/>
   </p:handoutMasterIdLst>
   <p:sldIdLst>
     <p:sldId id="274" r:id="rId2"/>
@@ -38,10 +38,12 @@
     <p:sldId id="326" r:id="rId26"/>
     <p:sldId id="327" r:id="rId27"/>
     <p:sldId id="328" r:id="rId28"/>
-    <p:sldId id="325" r:id="rId29"/>
-    <p:sldId id="317" r:id="rId30"/>
-    <p:sldId id="329" r:id="rId31"/>
-    <p:sldId id="330" r:id="rId32"/>
+    <p:sldId id="331" r:id="rId29"/>
+    <p:sldId id="332" r:id="rId30"/>
+    <p:sldId id="325" r:id="rId31"/>
+    <p:sldId id="317" r:id="rId32"/>
+    <p:sldId id="329" r:id="rId33"/>
+    <p:sldId id="330" r:id="rId34"/>
   </p:sldIdLst>
   <p:sldSz cx="12192000" cy="6858000"/>
   <p:notesSz cx="6858000" cy="9144000"/>
@@ -23903,6 +23905,41 @@
           </a:p>
         </p:txBody>
       </p:sp>
+      <p:sp>
+        <p:nvSpPr>
+          <p:cNvPr id="4" name="TextBox 3">
+            <a:extLst>
+              <a:ext uri="{FF2B5EF4-FFF2-40B4-BE49-F238E27FC236}">
+                <a16:creationId xmlns:a16="http://schemas.microsoft.com/office/drawing/2014/main" id="{5A16CED8-6601-A467-FD0D-14E1626A8DF2}"/>
+              </a:ext>
+            </a:extLst>
+          </p:cNvPr>
+          <p:cNvSpPr txBox="1"/>
+          <p:nvPr/>
+        </p:nvSpPr>
+        <p:spPr>
+          <a:xfrm>
+            <a:off x="1224793" y="2869035"/>
+            <a:ext cx="2089803" cy="369332"/>
+          </a:xfrm>
+          <a:prstGeom prst="rect">
+            <a:avLst/>
+          </a:prstGeom>
+          <a:noFill/>
+        </p:spPr>
+        <p:txBody>
+          <a:bodyPr wrap="none" rtlCol="0">
+            <a:spAutoFit/>
+          </a:bodyPr>
+          <a:lstStyle/>
+          <a:p>
+            <a:r>
+              <a:rPr lang="en-US" dirty="0"/>
+              <a:t>Draw the best graph</a:t>
+            </a:r>
+          </a:p>
+        </p:txBody>
+      </p:sp>
     </p:spTree>
     <p:extLst>
       <p:ext uri="{BB962C8B-B14F-4D97-AF65-F5344CB8AC3E}">
@@ -24352,6 +24389,41 @@
           </a:p>
         </p:txBody>
       </p:sp>
+      <p:sp>
+        <p:nvSpPr>
+          <p:cNvPr id="4" name="TextBox 3">
+            <a:extLst>
+              <a:ext uri="{FF2B5EF4-FFF2-40B4-BE49-F238E27FC236}">
+                <a16:creationId xmlns:a16="http://schemas.microsoft.com/office/drawing/2014/main" id="{84C65F7A-5E09-8735-A5BE-4B2536F26CE1}"/>
+              </a:ext>
+            </a:extLst>
+          </p:cNvPr>
+          <p:cNvSpPr txBox="1"/>
+          <p:nvPr/>
+        </p:nvSpPr>
+        <p:spPr>
+          <a:xfrm>
+            <a:off x="5051098" y="3175288"/>
+            <a:ext cx="2307811" cy="369332"/>
+          </a:xfrm>
+          <a:prstGeom prst="rect">
+            <a:avLst/>
+          </a:prstGeom>
+          <a:noFill/>
+        </p:spPr>
+        <p:txBody>
+          <a:bodyPr wrap="none" rtlCol="0">
+            <a:spAutoFit/>
+          </a:bodyPr>
+          <a:lstStyle/>
+          <a:p>
+            <a:r>
+              <a:rPr lang="en-US" dirty="0"/>
+              <a:t>Provide the best graph</a:t>
+            </a:r>
+          </a:p>
+        </p:txBody>
+      </p:sp>
     </p:spTree>
     <p:extLst>
       <p:ext uri="{BB962C8B-B14F-4D97-AF65-F5344CB8AC3E}">
@@ -24366,6 +24438,398 @@
 </file>
 
 <file path=ppt/slides/slide28.xml><?xml version="1.0" encoding="utf-8"?>
+<p:sld xmlns:a="http://schemas.openxmlformats.org/drawingml/2006/main" xmlns:r="http://schemas.openxmlformats.org/officeDocument/2006/relationships" xmlns:p="http://schemas.openxmlformats.org/presentationml/2006/main">
+  <p:cSld>
+    <p:spTree>
+      <p:nvGrpSpPr>
+        <p:cNvPr id="1" name=""/>
+        <p:cNvGrpSpPr/>
+        <p:nvPr/>
+      </p:nvGrpSpPr>
+      <p:grpSpPr>
+        <a:xfrm>
+          <a:off x="0" y="0"/>
+          <a:ext cx="0" cy="0"/>
+          <a:chOff x="0" y="0"/>
+          <a:chExt cx="0" cy="0"/>
+        </a:xfrm>
+      </p:grpSpPr>
+      <p:sp>
+        <p:nvSpPr>
+          <p:cNvPr id="2" name="Title 1">
+            <a:extLst>
+              <a:ext uri="{FF2B5EF4-FFF2-40B4-BE49-F238E27FC236}">
+                <a16:creationId xmlns:a16="http://schemas.microsoft.com/office/drawing/2014/main" id="{0C6D9833-B1BB-E8BF-625C-F8E18BBD3AA6}"/>
+              </a:ext>
+            </a:extLst>
+          </p:cNvPr>
+          <p:cNvSpPr>
+            <a:spLocks noGrp="1"/>
+          </p:cNvSpPr>
+          <p:nvPr>
+            <p:ph type="title"/>
+          </p:nvPr>
+        </p:nvSpPr>
+        <p:spPr/>
+        <p:txBody>
+          <a:bodyPr/>
+          <a:lstStyle/>
+          <a:p>
+            <a:r>
+              <a:rPr lang="en-US" dirty="0"/>
+              <a:t>Shows the – CV based ROC, Precision Recall Curves</a:t>
+            </a:r>
+          </a:p>
+        </p:txBody>
+      </p:sp>
+      <p:sp>
+        <p:nvSpPr>
+          <p:cNvPr id="3" name="Content Placeholder 2">
+            <a:extLst>
+              <a:ext uri="{FF2B5EF4-FFF2-40B4-BE49-F238E27FC236}">
+                <a16:creationId xmlns:a16="http://schemas.microsoft.com/office/drawing/2014/main" id="{7B232063-ACBC-7E33-9C58-C1FF36EA94EC}"/>
+              </a:ext>
+            </a:extLst>
+          </p:cNvPr>
+          <p:cNvSpPr>
+            <a:spLocks noGrp="1"/>
+          </p:cNvSpPr>
+          <p:nvPr>
+            <p:ph sz="half" idx="1"/>
+          </p:nvPr>
+        </p:nvSpPr>
+        <p:spPr/>
+        <p:txBody>
+          <a:bodyPr/>
+          <a:lstStyle/>
+          <a:p>
+            <a:endParaRPr lang="en-US"/>
+          </a:p>
+        </p:txBody>
+      </p:sp>
+      <p:sp>
+        <p:nvSpPr>
+          <p:cNvPr id="4" name="Content Placeholder 3">
+            <a:extLst>
+              <a:ext uri="{FF2B5EF4-FFF2-40B4-BE49-F238E27FC236}">
+                <a16:creationId xmlns:a16="http://schemas.microsoft.com/office/drawing/2014/main" id="{8268F166-2188-DA19-FBFB-BD29A8D6A316}"/>
+              </a:ext>
+            </a:extLst>
+          </p:cNvPr>
+          <p:cNvSpPr>
+            <a:spLocks noGrp="1"/>
+          </p:cNvSpPr>
+          <p:nvPr>
+            <p:ph sz="half" idx="2"/>
+          </p:nvPr>
+        </p:nvSpPr>
+        <p:spPr/>
+        <p:txBody>
+          <a:bodyPr/>
+          <a:lstStyle/>
+          <a:p>
+            <a:endParaRPr lang="en-US"/>
+          </a:p>
+        </p:txBody>
+      </p:sp>
+      <p:sp>
+        <p:nvSpPr>
+          <p:cNvPr id="5" name="Footer Placeholder 4">
+            <a:extLst>
+              <a:ext uri="{FF2B5EF4-FFF2-40B4-BE49-F238E27FC236}">
+                <a16:creationId xmlns:a16="http://schemas.microsoft.com/office/drawing/2014/main" id="{8BDEDE69-FBDB-8402-FCA6-53FF4910290F}"/>
+              </a:ext>
+            </a:extLst>
+          </p:cNvPr>
+          <p:cNvSpPr>
+            <a:spLocks noGrp="1"/>
+          </p:cNvSpPr>
+          <p:nvPr>
+            <p:ph type="ftr" sz="quarter" idx="11"/>
+          </p:nvPr>
+        </p:nvSpPr>
+        <p:spPr/>
+        <p:txBody>
+          <a:bodyPr/>
+          <a:lstStyle/>
+          <a:p>
+            <a:r>
+              <a:rPr lang="en-US"/>
+              <a:t>M. Meenakshi Sundaram, S. Ganesh</a:t>
+            </a:r>
+            <a:endParaRPr lang="en-US" dirty="0"/>
+          </a:p>
+        </p:txBody>
+      </p:sp>
+    </p:spTree>
+    <p:extLst>
+      <p:ext uri="{BB962C8B-B14F-4D97-AF65-F5344CB8AC3E}">
+        <p14:creationId xmlns:p14="http://schemas.microsoft.com/office/powerpoint/2010/main" val="2232412426"/>
+      </p:ext>
+    </p:extLst>
+  </p:cSld>
+  <p:clrMapOvr>
+    <a:masterClrMapping/>
+  </p:clrMapOvr>
+</p:sld>
+</file>
+
+<file path=ppt/slides/slide29.xml><?xml version="1.0" encoding="utf-8"?>
+<p:sld xmlns:a="http://schemas.openxmlformats.org/drawingml/2006/main" xmlns:r="http://schemas.openxmlformats.org/officeDocument/2006/relationships" xmlns:p="http://schemas.openxmlformats.org/presentationml/2006/main">
+  <p:cSld>
+    <p:spTree>
+      <p:nvGrpSpPr>
+        <p:cNvPr id="1" name=""/>
+        <p:cNvGrpSpPr/>
+        <p:nvPr/>
+      </p:nvGrpSpPr>
+      <p:grpSpPr>
+        <a:xfrm>
+          <a:off x="0" y="0"/>
+          <a:ext cx="0" cy="0"/>
+          <a:chOff x="0" y="0"/>
+          <a:chExt cx="0" cy="0"/>
+        </a:xfrm>
+      </p:grpSpPr>
+      <p:sp>
+        <p:nvSpPr>
+          <p:cNvPr id="2" name="Title 1">
+            <a:extLst>
+              <a:ext uri="{FF2B5EF4-FFF2-40B4-BE49-F238E27FC236}">
+                <a16:creationId xmlns:a16="http://schemas.microsoft.com/office/drawing/2014/main" id="{F96BFCA2-6377-B1F3-08B3-BCD89F8DF5C8}"/>
+              </a:ext>
+            </a:extLst>
+          </p:cNvPr>
+          <p:cNvSpPr>
+            <a:spLocks noGrp="1"/>
+          </p:cNvSpPr>
+          <p:nvPr>
+            <p:ph type="title"/>
+          </p:nvPr>
+        </p:nvSpPr>
+        <p:spPr/>
+        <p:txBody>
+          <a:bodyPr/>
+          <a:lstStyle/>
+          <a:p>
+            <a:r>
+              <a:rPr lang="en-US" dirty="0" err="1"/>
+              <a:t>Nmin</a:t>
+            </a:r>
+            <a:r>
+              <a:rPr lang="en-US" dirty="0"/>
+              <a:t> Leaf</a:t>
+            </a:r>
+          </a:p>
+        </p:txBody>
+      </p:sp>
+      <p:sp>
+        <p:nvSpPr>
+          <p:cNvPr id="3" name="Content Placeholder 2">
+            <a:extLst>
+              <a:ext uri="{FF2B5EF4-FFF2-40B4-BE49-F238E27FC236}">
+                <a16:creationId xmlns:a16="http://schemas.microsoft.com/office/drawing/2014/main" id="{9A81C563-2193-BD19-A8A0-4B62B631DBFA}"/>
+              </a:ext>
+            </a:extLst>
+          </p:cNvPr>
+          <p:cNvSpPr>
+            <a:spLocks noGrp="1"/>
+          </p:cNvSpPr>
+          <p:nvPr>
+            <p:ph sz="half" idx="1"/>
+          </p:nvPr>
+        </p:nvSpPr>
+        <p:spPr/>
+        <p:txBody>
+          <a:bodyPr/>
+          <a:lstStyle/>
+          <a:p>
+            <a:endParaRPr lang="en-US"/>
+          </a:p>
+        </p:txBody>
+      </p:sp>
+      <p:sp>
+        <p:nvSpPr>
+          <p:cNvPr id="4" name="Content Placeholder 3">
+            <a:extLst>
+              <a:ext uri="{FF2B5EF4-FFF2-40B4-BE49-F238E27FC236}">
+                <a16:creationId xmlns:a16="http://schemas.microsoft.com/office/drawing/2014/main" id="{F96283FC-7952-FBA6-CAC7-4F5DC4FD0EE0}"/>
+              </a:ext>
+            </a:extLst>
+          </p:cNvPr>
+          <p:cNvSpPr>
+            <a:spLocks noGrp="1"/>
+          </p:cNvSpPr>
+          <p:nvPr>
+            <p:ph sz="half" idx="2"/>
+          </p:nvPr>
+        </p:nvSpPr>
+        <p:spPr/>
+        <p:txBody>
+          <a:bodyPr/>
+          <a:lstStyle/>
+          <a:p>
+            <a:endParaRPr lang="en-US"/>
+          </a:p>
+        </p:txBody>
+      </p:sp>
+      <p:sp>
+        <p:nvSpPr>
+          <p:cNvPr id="5" name="Footer Placeholder 4">
+            <a:extLst>
+              <a:ext uri="{FF2B5EF4-FFF2-40B4-BE49-F238E27FC236}">
+                <a16:creationId xmlns:a16="http://schemas.microsoft.com/office/drawing/2014/main" id="{13BA4512-0FF1-2E5A-39D6-04175BE81FE6}"/>
+              </a:ext>
+            </a:extLst>
+          </p:cNvPr>
+          <p:cNvSpPr>
+            <a:spLocks noGrp="1"/>
+          </p:cNvSpPr>
+          <p:nvPr>
+            <p:ph type="ftr" sz="quarter" idx="11"/>
+          </p:nvPr>
+        </p:nvSpPr>
+        <p:spPr/>
+        <p:txBody>
+          <a:bodyPr/>
+          <a:lstStyle/>
+          <a:p>
+            <a:r>
+              <a:rPr lang="en-US"/>
+              <a:t>M. Meenakshi Sundaram, S. Ganesh</a:t>
+            </a:r>
+            <a:endParaRPr lang="en-US" dirty="0"/>
+          </a:p>
+        </p:txBody>
+      </p:sp>
+    </p:spTree>
+    <p:extLst>
+      <p:ext uri="{BB962C8B-B14F-4D97-AF65-F5344CB8AC3E}">
+        <p14:creationId xmlns:p14="http://schemas.microsoft.com/office/powerpoint/2010/main" val="1408382742"/>
+      </p:ext>
+    </p:extLst>
+  </p:cSld>
+  <p:clrMapOvr>
+    <a:masterClrMapping/>
+  </p:clrMapOvr>
+</p:sld>
+</file>
+
+<file path=ppt/slides/slide3.xml><?xml version="1.0" encoding="utf-8"?>
+<p:sld xmlns:a="http://schemas.openxmlformats.org/drawingml/2006/main" xmlns:r="http://schemas.openxmlformats.org/officeDocument/2006/relationships" xmlns:p="http://schemas.openxmlformats.org/presentationml/2006/main">
+  <p:cSld>
+    <p:spTree>
+      <p:nvGrpSpPr>
+        <p:cNvPr id="1" name=""/>
+        <p:cNvGrpSpPr/>
+        <p:nvPr/>
+      </p:nvGrpSpPr>
+      <p:grpSpPr>
+        <a:xfrm>
+          <a:off x="0" y="0"/>
+          <a:ext cx="0" cy="0"/>
+          <a:chOff x="0" y="0"/>
+          <a:chExt cx="0" cy="0"/>
+        </a:xfrm>
+      </p:grpSpPr>
+      <p:sp>
+        <p:nvSpPr>
+          <p:cNvPr id="2" name="Title 1">
+            <a:extLst>
+              <a:ext uri="{FF2B5EF4-FFF2-40B4-BE49-F238E27FC236}">
+                <a16:creationId xmlns:a16="http://schemas.microsoft.com/office/drawing/2014/main" id="{8E5880B9-3062-A96C-307C-4559348E1CAC}"/>
+              </a:ext>
+            </a:extLst>
+          </p:cNvPr>
+          <p:cNvSpPr>
+            <a:spLocks noGrp="1"/>
+          </p:cNvSpPr>
+          <p:nvPr>
+            <p:ph type="title"/>
+          </p:nvPr>
+        </p:nvSpPr>
+        <p:spPr/>
+        <p:txBody>
+          <a:bodyPr/>
+          <a:lstStyle/>
+          <a:p>
+            <a:r>
+              <a:rPr lang="en-US" dirty="0"/>
+              <a:t>Loss Metrics</a:t>
+            </a:r>
+          </a:p>
+        </p:txBody>
+      </p:sp>
+      <p:sp>
+        <p:nvSpPr>
+          <p:cNvPr id="4" name="Text Placeholder 3">
+            <a:extLst>
+              <a:ext uri="{FF2B5EF4-FFF2-40B4-BE49-F238E27FC236}">
+                <a16:creationId xmlns:a16="http://schemas.microsoft.com/office/drawing/2014/main" id="{E281E417-5D33-1113-5CF9-A9AC5DBEF1BC}"/>
+              </a:ext>
+            </a:extLst>
+          </p:cNvPr>
+          <p:cNvSpPr>
+            <a:spLocks noGrp="1"/>
+          </p:cNvSpPr>
+          <p:nvPr>
+            <p:ph type="body" idx="1"/>
+          </p:nvPr>
+        </p:nvSpPr>
+        <p:spPr/>
+        <p:txBody>
+          <a:bodyPr/>
+          <a:lstStyle/>
+          <a:p>
+            <a:r>
+              <a:rPr lang="en-AU" dirty="0"/>
+              <a:t>Indicators of probability of miss-classification minimizing which helps us build tree classifiers. </a:t>
+            </a:r>
+          </a:p>
+        </p:txBody>
+      </p:sp>
+      <p:sp>
+        <p:nvSpPr>
+          <p:cNvPr id="3" name="Footer Placeholder 2">
+            <a:extLst>
+              <a:ext uri="{FF2B5EF4-FFF2-40B4-BE49-F238E27FC236}">
+                <a16:creationId xmlns:a16="http://schemas.microsoft.com/office/drawing/2014/main" id="{8B0BAB4A-8CDE-4DEC-A44E-CF1E88326B5A}"/>
+              </a:ext>
+            </a:extLst>
+          </p:cNvPr>
+          <p:cNvSpPr>
+            <a:spLocks noGrp="1"/>
+          </p:cNvSpPr>
+          <p:nvPr>
+            <p:ph type="ftr" sz="quarter" idx="11"/>
+          </p:nvPr>
+        </p:nvSpPr>
+        <p:spPr/>
+        <p:txBody>
+          <a:bodyPr/>
+          <a:lstStyle/>
+          <a:p>
+            <a:r>
+              <a:rPr lang="en-US"/>
+              <a:t>M. Meenakshi Sundaram, S. Ganesh</a:t>
+            </a:r>
+          </a:p>
+        </p:txBody>
+      </p:sp>
+    </p:spTree>
+    <p:extLst>
+      <p:ext uri="{BB962C8B-B14F-4D97-AF65-F5344CB8AC3E}">
+        <p14:creationId xmlns:p14="http://schemas.microsoft.com/office/powerpoint/2010/main" val="1274289020"/>
+      </p:ext>
+    </p:extLst>
+  </p:cSld>
+  <p:clrMapOvr>
+    <a:masterClrMapping/>
+  </p:clrMapOvr>
+</p:sld>
+</file>
+
+<file path=ppt/slides/slide30.xml><?xml version="1.0" encoding="utf-8"?>
 <p:sld xmlns:a="http://schemas.openxmlformats.org/drawingml/2006/main" xmlns:r="http://schemas.openxmlformats.org/officeDocument/2006/relationships" xmlns:p="http://schemas.openxmlformats.org/presentationml/2006/main">
   <p:cSld>
     <p:spTree>
@@ -25014,7 +25478,7 @@
 </p:sld>
 </file>
 
-<file path=ppt/slides/slide29.xml><?xml version="1.0" encoding="utf-8"?>
+<file path=ppt/slides/slide31.xml><?xml version="1.0" encoding="utf-8"?>
 <p:sld xmlns:a="http://schemas.openxmlformats.org/drawingml/2006/main" xmlns:r="http://schemas.openxmlformats.org/officeDocument/2006/relationships" xmlns:p="http://schemas.openxmlformats.org/presentationml/2006/main">
   <p:cSld>
     <p:spTree>
@@ -25141,121 +25605,7 @@
 </p:sld>
 </file>
 
-<file path=ppt/slides/slide3.xml><?xml version="1.0" encoding="utf-8"?>
-<p:sld xmlns:a="http://schemas.openxmlformats.org/drawingml/2006/main" xmlns:r="http://schemas.openxmlformats.org/officeDocument/2006/relationships" xmlns:p="http://schemas.openxmlformats.org/presentationml/2006/main">
-  <p:cSld>
-    <p:spTree>
-      <p:nvGrpSpPr>
-        <p:cNvPr id="1" name=""/>
-        <p:cNvGrpSpPr/>
-        <p:nvPr/>
-      </p:nvGrpSpPr>
-      <p:grpSpPr>
-        <a:xfrm>
-          <a:off x="0" y="0"/>
-          <a:ext cx="0" cy="0"/>
-          <a:chOff x="0" y="0"/>
-          <a:chExt cx="0" cy="0"/>
-        </a:xfrm>
-      </p:grpSpPr>
-      <p:sp>
-        <p:nvSpPr>
-          <p:cNvPr id="2" name="Title 1">
-            <a:extLst>
-              <a:ext uri="{FF2B5EF4-FFF2-40B4-BE49-F238E27FC236}">
-                <a16:creationId xmlns:a16="http://schemas.microsoft.com/office/drawing/2014/main" id="{8E5880B9-3062-A96C-307C-4559348E1CAC}"/>
-              </a:ext>
-            </a:extLst>
-          </p:cNvPr>
-          <p:cNvSpPr>
-            <a:spLocks noGrp="1"/>
-          </p:cNvSpPr>
-          <p:nvPr>
-            <p:ph type="title"/>
-          </p:nvPr>
-        </p:nvSpPr>
-        <p:spPr/>
-        <p:txBody>
-          <a:bodyPr/>
-          <a:lstStyle/>
-          <a:p>
-            <a:r>
-              <a:rPr lang="en-US" dirty="0"/>
-              <a:t>Loss Metrics</a:t>
-            </a:r>
-          </a:p>
-        </p:txBody>
-      </p:sp>
-      <p:sp>
-        <p:nvSpPr>
-          <p:cNvPr id="4" name="Text Placeholder 3">
-            <a:extLst>
-              <a:ext uri="{FF2B5EF4-FFF2-40B4-BE49-F238E27FC236}">
-                <a16:creationId xmlns:a16="http://schemas.microsoft.com/office/drawing/2014/main" id="{E281E417-5D33-1113-5CF9-A9AC5DBEF1BC}"/>
-              </a:ext>
-            </a:extLst>
-          </p:cNvPr>
-          <p:cNvSpPr>
-            <a:spLocks noGrp="1"/>
-          </p:cNvSpPr>
-          <p:nvPr>
-            <p:ph type="body" idx="1"/>
-          </p:nvPr>
-        </p:nvSpPr>
-        <p:spPr/>
-        <p:txBody>
-          <a:bodyPr/>
-          <a:lstStyle/>
-          <a:p>
-            <a:r>
-              <a:rPr lang="en-AU" dirty="0"/>
-              <a:t>Indicators of probability of miss-classification minimizing which helps us build tree classifiers. </a:t>
-            </a:r>
-          </a:p>
-        </p:txBody>
-      </p:sp>
-      <p:sp>
-        <p:nvSpPr>
-          <p:cNvPr id="3" name="Footer Placeholder 2">
-            <a:extLst>
-              <a:ext uri="{FF2B5EF4-FFF2-40B4-BE49-F238E27FC236}">
-                <a16:creationId xmlns:a16="http://schemas.microsoft.com/office/drawing/2014/main" id="{8B0BAB4A-8CDE-4DEC-A44E-CF1E88326B5A}"/>
-              </a:ext>
-            </a:extLst>
-          </p:cNvPr>
-          <p:cNvSpPr>
-            <a:spLocks noGrp="1"/>
-          </p:cNvSpPr>
-          <p:nvPr>
-            <p:ph type="ftr" sz="quarter" idx="11"/>
-          </p:nvPr>
-        </p:nvSpPr>
-        <p:spPr/>
-        <p:txBody>
-          <a:bodyPr/>
-          <a:lstStyle/>
-          <a:p>
-            <a:r>
-              <a:rPr lang="en-US"/>
-              <a:t>M. Meenakshi Sundaram, S. Ganesh</a:t>
-            </a:r>
-          </a:p>
-        </p:txBody>
-      </p:sp>
-    </p:spTree>
-    <p:extLst>
-      <p:ext uri="{BB962C8B-B14F-4D97-AF65-F5344CB8AC3E}">
-        <p14:creationId xmlns:p14="http://schemas.microsoft.com/office/powerpoint/2010/main" val="1274289020"/>
-      </p:ext>
-    </p:extLst>
-  </p:cSld>
-  <p:clrMapOvr>
-    <a:masterClrMapping/>
-  </p:clrMapOvr>
-</p:sld>
-</file>
-
-<file path=ppt/slides/slide30.xml><?xml version="1.0" encoding="utf-8"?>
+<file path=ppt/slides/slide32.xml><?xml version="1.0" encoding="utf-8"?>
 <p:sld xmlns:a="http://schemas.openxmlformats.org/drawingml/2006/main" xmlns:r="http://schemas.openxmlformats.org/officeDocument/2006/relationships" xmlns:p="http://schemas.openxmlformats.org/presentationml/2006/main">
   <p:cSld>
     <p:spTree>
@@ -25467,7 +25817,7 @@
 </p:sld>
 </file>
 
-<file path=ppt/slides/slide31.xml><?xml version="1.0" encoding="utf-8"?>
+<file path=ppt/slides/slide33.xml><?xml version="1.0" encoding="utf-8"?>
 <p:sld xmlns:a="http://schemas.openxmlformats.org/drawingml/2006/main" xmlns:r="http://schemas.openxmlformats.org/officeDocument/2006/relationships" xmlns:p="http://schemas.openxmlformats.org/presentationml/2006/main">
   <p:cSld>
     <p:spTree>

</xml_diff>